<commit_message>
Added some slides and pictures.
</commit_message>
<xml_diff>
--- a/Presentations/Slides/Presentation_Feb_17.pptx
+++ b/Presentations/Slides/Presentation_Feb_17.pptx
@@ -126,6 +126,7 @@
 <file path=ppt/revisionInfo.xml><?xml version="1.0" encoding="utf-8"?>
 <p1510:revInfo xmlns:a="http://schemas.openxmlformats.org/drawingml/2006/main" xmlns:r="http://schemas.openxmlformats.org/officeDocument/2006/relationships" xmlns:p1510="http://schemas.microsoft.com/office/powerpoint/2015/10/main">
   <p1510:revLst>
+    <p1510:client id="{26CA37BE-C863-470F-BA02-FBC6B35E370C}" v="7" dt="2022-02-16T17:16:46.462"/>
     <p1510:client id="{D10F9C3D-97E4-40C3-B272-5E6AAD36CA25}" v="163" dt="2022-02-16T00:44:28.298"/>
   </p1510:revLst>
 </p1510:revInfo>
@@ -133,6 +134,1068 @@
 
 <file path=ppt/changesInfos/changesInfo1.xml><?xml version="1.0" encoding="utf-8"?>
 <pc:chgInfo xmlns:a="http://schemas.openxmlformats.org/drawingml/2006/main" xmlns:r="http://schemas.openxmlformats.org/officeDocument/2006/relationships" xmlns:ac="http://schemas.microsoft.com/office/drawing/2013/main/command" xmlns:pc="http://schemas.microsoft.com/office/powerpoint/2013/main/command">
+  <pc:docChgLst>
+    <pc:chgData name="Erik Manis" userId="88af51049543f108" providerId="LiveId" clId="{26CA37BE-C863-470F-BA02-FBC6B35E370C}"/>
+    <pc:docChg chg="undo custSel modSld">
+      <pc:chgData name="Erik Manis" userId="88af51049543f108" providerId="LiveId" clId="{26CA37BE-C863-470F-BA02-FBC6B35E370C}" dt="2022-02-16T17:17:16.041" v="88" actId="1076"/>
+      <pc:docMkLst>
+        <pc:docMk/>
+      </pc:docMkLst>
+      <pc:sldChg chg="addSp delSp modSp mod">
+        <pc:chgData name="Erik Manis" userId="88af51049543f108" providerId="LiveId" clId="{26CA37BE-C863-470F-BA02-FBC6B35E370C}" dt="2022-02-16T16:35:05.930" v="0" actId="26606"/>
+        <pc:sldMkLst>
+          <pc:docMk/>
+          <pc:sldMk cId="2909048310" sldId="272"/>
+        </pc:sldMkLst>
+        <pc:spChg chg="mod">
+          <ac:chgData name="Erik Manis" userId="88af51049543f108" providerId="LiveId" clId="{26CA37BE-C863-470F-BA02-FBC6B35E370C}" dt="2022-02-16T16:35:05.930" v="0" actId="26606"/>
+          <ac:spMkLst>
+            <pc:docMk/>
+            <pc:sldMk cId="2909048310" sldId="272"/>
+            <ac:spMk id="2" creationId="{D8DA8A77-3D5C-4128-8B2B-79B94B6CB9CE}"/>
+          </ac:spMkLst>
+        </pc:spChg>
+        <pc:spChg chg="mod">
+          <ac:chgData name="Erik Manis" userId="88af51049543f108" providerId="LiveId" clId="{26CA37BE-C863-470F-BA02-FBC6B35E370C}" dt="2022-02-16T16:35:05.930" v="0" actId="26606"/>
+          <ac:spMkLst>
+            <pc:docMk/>
+            <pc:sldMk cId="2909048310" sldId="272"/>
+            <ac:spMk id="3" creationId="{F38787CF-E34F-434A-88EB-F854CA168C88}"/>
+          </ac:spMkLst>
+        </pc:spChg>
+        <pc:spChg chg="mod">
+          <ac:chgData name="Erik Manis" userId="88af51049543f108" providerId="LiveId" clId="{26CA37BE-C863-470F-BA02-FBC6B35E370C}" dt="2022-02-16T16:35:05.930" v="0" actId="26606"/>
+          <ac:spMkLst>
+            <pc:docMk/>
+            <pc:sldMk cId="2909048310" sldId="272"/>
+            <ac:spMk id="4" creationId="{24B6F35E-3464-40B1-9ADD-8CC3CEE8D694}"/>
+          </ac:spMkLst>
+        </pc:spChg>
+        <pc:spChg chg="mod">
+          <ac:chgData name="Erik Manis" userId="88af51049543f108" providerId="LiveId" clId="{26CA37BE-C863-470F-BA02-FBC6B35E370C}" dt="2022-02-16T16:35:05.930" v="0" actId="26606"/>
+          <ac:spMkLst>
+            <pc:docMk/>
+            <pc:sldMk cId="2909048310" sldId="272"/>
+            <ac:spMk id="5" creationId="{4D22F2C5-A1C5-4698-8F8C-30ACEF1CF019}"/>
+          </ac:spMkLst>
+        </pc:spChg>
+        <pc:spChg chg="del">
+          <ac:chgData name="Erik Manis" userId="88af51049543f108" providerId="LiveId" clId="{26CA37BE-C863-470F-BA02-FBC6B35E370C}" dt="2022-02-16T16:35:05.930" v="0" actId="26606"/>
+          <ac:spMkLst>
+            <pc:docMk/>
+            <pc:sldMk cId="2909048310" sldId="272"/>
+            <ac:spMk id="70" creationId="{8D06CE56-3881-4ADA-8CEF-D18B02C242A3}"/>
+          </ac:spMkLst>
+        </pc:spChg>
+        <pc:spChg chg="del">
+          <ac:chgData name="Erik Manis" userId="88af51049543f108" providerId="LiveId" clId="{26CA37BE-C863-470F-BA02-FBC6B35E370C}" dt="2022-02-16T16:35:05.930" v="0" actId="26606"/>
+          <ac:spMkLst>
+            <pc:docMk/>
+            <pc:sldMk cId="2909048310" sldId="272"/>
+            <ac:spMk id="72" creationId="{79F3C543-62EC-4433-9C93-A2CD8764E9B4}"/>
+          </ac:spMkLst>
+        </pc:spChg>
+        <pc:spChg chg="del">
+          <ac:chgData name="Erik Manis" userId="88af51049543f108" providerId="LiveId" clId="{26CA37BE-C863-470F-BA02-FBC6B35E370C}" dt="2022-02-16T16:35:05.930" v="0" actId="26606"/>
+          <ac:spMkLst>
+            <pc:docMk/>
+            <pc:sldMk cId="2909048310" sldId="272"/>
+            <ac:spMk id="74" creationId="{68AF5748-FED8-45BA-8631-26D1D10F3246}"/>
+          </ac:spMkLst>
+        </pc:spChg>
+        <pc:spChg chg="del">
+          <ac:chgData name="Erik Manis" userId="88af51049543f108" providerId="LiveId" clId="{26CA37BE-C863-470F-BA02-FBC6B35E370C}" dt="2022-02-16T16:35:05.930" v="0" actId="26606"/>
+          <ac:spMkLst>
+            <pc:docMk/>
+            <pc:sldMk cId="2909048310" sldId="272"/>
+            <ac:spMk id="76" creationId="{AF2F604E-43BE-4DC3-B983-E071523364F8}"/>
+          </ac:spMkLst>
+        </pc:spChg>
+        <pc:spChg chg="del">
+          <ac:chgData name="Erik Manis" userId="88af51049543f108" providerId="LiveId" clId="{26CA37BE-C863-470F-BA02-FBC6B35E370C}" dt="2022-02-16T16:35:05.930" v="0" actId="26606"/>
+          <ac:spMkLst>
+            <pc:docMk/>
+            <pc:sldMk cId="2909048310" sldId="272"/>
+            <ac:spMk id="78" creationId="{08C9B587-E65E-4B52-B37C-ABEBB6E87928}"/>
+          </ac:spMkLst>
+        </pc:spChg>
+        <pc:spChg chg="add">
+          <ac:chgData name="Erik Manis" userId="88af51049543f108" providerId="LiveId" clId="{26CA37BE-C863-470F-BA02-FBC6B35E370C}" dt="2022-02-16T16:35:05.930" v="0" actId="26606"/>
+          <ac:spMkLst>
+            <pc:docMk/>
+            <pc:sldMk cId="2909048310" sldId="272"/>
+            <ac:spMk id="83" creationId="{1C799903-48D5-4A31-A1A2-541072D9771E}"/>
+          </ac:spMkLst>
+        </pc:spChg>
+        <pc:spChg chg="add">
+          <ac:chgData name="Erik Manis" userId="88af51049543f108" providerId="LiveId" clId="{26CA37BE-C863-470F-BA02-FBC6B35E370C}" dt="2022-02-16T16:35:05.930" v="0" actId="26606"/>
+          <ac:spMkLst>
+            <pc:docMk/>
+            <pc:sldMk cId="2909048310" sldId="272"/>
+            <ac:spMk id="85" creationId="{8EFFF109-FC58-4FD3-BE05-9775A1310F55}"/>
+          </ac:spMkLst>
+        </pc:spChg>
+        <pc:spChg chg="add">
+          <ac:chgData name="Erik Manis" userId="88af51049543f108" providerId="LiveId" clId="{26CA37BE-C863-470F-BA02-FBC6B35E370C}" dt="2022-02-16T16:35:05.930" v="0" actId="26606"/>
+          <ac:spMkLst>
+            <pc:docMk/>
+            <pc:sldMk cId="2909048310" sldId="272"/>
+            <ac:spMk id="87" creationId="{E1B96AD6-92A9-4273-A62B-96A1C3E0BA95}"/>
+          </ac:spMkLst>
+        </pc:spChg>
+        <pc:spChg chg="add">
+          <ac:chgData name="Erik Manis" userId="88af51049543f108" providerId="LiveId" clId="{26CA37BE-C863-470F-BA02-FBC6B35E370C}" dt="2022-02-16T16:35:05.930" v="0" actId="26606"/>
+          <ac:spMkLst>
+            <pc:docMk/>
+            <pc:sldMk cId="2909048310" sldId="272"/>
+            <ac:spMk id="89" creationId="{463EEC44-1BA3-44ED-81FC-A644B04B2A44}"/>
+          </ac:spMkLst>
+        </pc:spChg>
+      </pc:sldChg>
+      <pc:sldChg chg="addSp delSp modSp mod">
+        <pc:chgData name="Erik Manis" userId="88af51049543f108" providerId="LiveId" clId="{26CA37BE-C863-470F-BA02-FBC6B35E370C}" dt="2022-02-16T17:17:16.041" v="88" actId="1076"/>
+        <pc:sldMkLst>
+          <pc:docMk/>
+          <pc:sldMk cId="2086654361" sldId="273"/>
+        </pc:sldMkLst>
+        <pc:spChg chg="mod">
+          <ac:chgData name="Erik Manis" userId="88af51049543f108" providerId="LiveId" clId="{26CA37BE-C863-470F-BA02-FBC6B35E370C}" dt="2022-02-16T17:03:12.738" v="61" actId="26606"/>
+          <ac:spMkLst>
+            <pc:docMk/>
+            <pc:sldMk cId="2086654361" sldId="273"/>
+            <ac:spMk id="2" creationId="{176630BE-B2CD-4315-B187-0E55B8DE490D}"/>
+          </ac:spMkLst>
+        </pc:spChg>
+        <pc:spChg chg="mod ord">
+          <ac:chgData name="Erik Manis" userId="88af51049543f108" providerId="LiveId" clId="{26CA37BE-C863-470F-BA02-FBC6B35E370C}" dt="2022-02-16T17:03:12.738" v="61" actId="26606"/>
+          <ac:spMkLst>
+            <pc:docMk/>
+            <pc:sldMk cId="2086654361" sldId="273"/>
+            <ac:spMk id="4" creationId="{34ABAFFD-EC79-41CB-BF61-6F44AE15D414}"/>
+          </ac:spMkLst>
+        </pc:spChg>
+        <pc:spChg chg="mod ord">
+          <ac:chgData name="Erik Manis" userId="88af51049543f108" providerId="LiveId" clId="{26CA37BE-C863-470F-BA02-FBC6B35E370C}" dt="2022-02-16T17:03:12.738" v="61" actId="26606"/>
+          <ac:spMkLst>
+            <pc:docMk/>
+            <pc:sldMk cId="2086654361" sldId="273"/>
+            <ac:spMk id="6" creationId="{E816B3EC-23F6-42E4-8F67-EF353FC2D5F9}"/>
+          </ac:spMkLst>
+        </pc:spChg>
+        <pc:spChg chg="add del">
+          <ac:chgData name="Erik Manis" userId="88af51049543f108" providerId="LiveId" clId="{26CA37BE-C863-470F-BA02-FBC6B35E370C}" dt="2022-02-16T16:51:40.458" v="12" actId="26606"/>
+          <ac:spMkLst>
+            <pc:docMk/>
+            <pc:sldMk cId="2086654361" sldId="273"/>
+            <ac:spMk id="64" creationId="{AF2F604E-43BE-4DC3-B983-E071523364F8}"/>
+          </ac:spMkLst>
+        </pc:spChg>
+        <pc:spChg chg="add del">
+          <ac:chgData name="Erik Manis" userId="88af51049543f108" providerId="LiveId" clId="{26CA37BE-C863-470F-BA02-FBC6B35E370C}" dt="2022-02-16T16:51:40.458" v="12" actId="26606"/>
+          <ac:spMkLst>
+            <pc:docMk/>
+            <pc:sldMk cId="2086654361" sldId="273"/>
+            <ac:spMk id="65" creationId="{8D06CE56-3881-4ADA-8CEF-D18B02C242A3}"/>
+          </ac:spMkLst>
+        </pc:spChg>
+        <pc:spChg chg="add del">
+          <ac:chgData name="Erik Manis" userId="88af51049543f108" providerId="LiveId" clId="{26CA37BE-C863-470F-BA02-FBC6B35E370C}" dt="2022-02-16T16:51:40.458" v="12" actId="26606"/>
+          <ac:spMkLst>
+            <pc:docMk/>
+            <pc:sldMk cId="2086654361" sldId="273"/>
+            <ac:spMk id="66" creationId="{08C9B587-E65E-4B52-B37C-ABEBB6E87928}"/>
+          </ac:spMkLst>
+        </pc:spChg>
+        <pc:spChg chg="add del">
+          <ac:chgData name="Erik Manis" userId="88af51049543f108" providerId="LiveId" clId="{26CA37BE-C863-470F-BA02-FBC6B35E370C}" dt="2022-02-16T16:51:40.458" v="12" actId="26606"/>
+          <ac:spMkLst>
+            <pc:docMk/>
+            <pc:sldMk cId="2086654361" sldId="273"/>
+            <ac:spMk id="67" creationId="{79F3C543-62EC-4433-9C93-A2CD8764E9B4}"/>
+          </ac:spMkLst>
+        </pc:spChg>
+        <pc:spChg chg="add del">
+          <ac:chgData name="Erik Manis" userId="88af51049543f108" providerId="LiveId" clId="{26CA37BE-C863-470F-BA02-FBC6B35E370C}" dt="2022-02-16T16:51:40.458" v="12" actId="26606"/>
+          <ac:spMkLst>
+            <pc:docMk/>
+            <pc:sldMk cId="2086654361" sldId="273"/>
+            <ac:spMk id="68" creationId="{55666830-9A19-4E01-8505-D6C7F9AC5665}"/>
+          </ac:spMkLst>
+        </pc:spChg>
+        <pc:spChg chg="add del">
+          <ac:chgData name="Erik Manis" userId="88af51049543f108" providerId="LiveId" clId="{26CA37BE-C863-470F-BA02-FBC6B35E370C}" dt="2022-02-16T16:51:40.458" v="12" actId="26606"/>
+          <ac:spMkLst>
+            <pc:docMk/>
+            <pc:sldMk cId="2086654361" sldId="273"/>
+            <ac:spMk id="69" creationId="{AE9FC877-7FB6-4D22-9988-35420644E202}"/>
+          </ac:spMkLst>
+        </pc:spChg>
+        <pc:spChg chg="add del">
+          <ac:chgData name="Erik Manis" userId="88af51049543f108" providerId="LiveId" clId="{26CA37BE-C863-470F-BA02-FBC6B35E370C}" dt="2022-02-16T16:51:40.458" v="12" actId="26606"/>
+          <ac:spMkLst>
+            <pc:docMk/>
+            <pc:sldMk cId="2086654361" sldId="273"/>
+            <ac:spMk id="70" creationId="{E41809D1-F12E-46BB-B804-5F209D325E8B}"/>
+          </ac:spMkLst>
+        </pc:spChg>
+        <pc:spChg chg="add del">
+          <ac:chgData name="Erik Manis" userId="88af51049543f108" providerId="LiveId" clId="{26CA37BE-C863-470F-BA02-FBC6B35E370C}" dt="2022-02-16T16:51:14.925" v="7" actId="26606"/>
+          <ac:spMkLst>
+            <pc:docMk/>
+            <pc:sldMk cId="2086654361" sldId="273"/>
+            <ac:spMk id="75" creationId="{8D06CE56-3881-4ADA-8CEF-D18B02C242A3}"/>
+          </ac:spMkLst>
+        </pc:spChg>
+        <pc:spChg chg="add del">
+          <ac:chgData name="Erik Manis" userId="88af51049543f108" providerId="LiveId" clId="{26CA37BE-C863-470F-BA02-FBC6B35E370C}" dt="2022-02-16T16:51:14.925" v="7" actId="26606"/>
+          <ac:spMkLst>
+            <pc:docMk/>
+            <pc:sldMk cId="2086654361" sldId="273"/>
+            <ac:spMk id="77" creationId="{79F3C543-62EC-4433-9C93-A2CD8764E9B4}"/>
+          </ac:spMkLst>
+        </pc:spChg>
+        <pc:spChg chg="add del">
+          <ac:chgData name="Erik Manis" userId="88af51049543f108" providerId="LiveId" clId="{26CA37BE-C863-470F-BA02-FBC6B35E370C}" dt="2022-02-16T16:51:14.925" v="7" actId="26606"/>
+          <ac:spMkLst>
+            <pc:docMk/>
+            <pc:sldMk cId="2086654361" sldId="273"/>
+            <ac:spMk id="79" creationId="{D0394FE2-BDDA-4ECE-B320-81AE19E90566}"/>
+          </ac:spMkLst>
+        </pc:spChg>
+        <pc:spChg chg="add del">
+          <ac:chgData name="Erik Manis" userId="88af51049543f108" providerId="LiveId" clId="{26CA37BE-C863-470F-BA02-FBC6B35E370C}" dt="2022-02-16T16:51:14.925" v="7" actId="26606"/>
+          <ac:spMkLst>
+            <pc:docMk/>
+            <pc:sldMk cId="2086654361" sldId="273"/>
+            <ac:spMk id="81" creationId="{0625AAC5-802A-4197-8804-2B78FF65CEE8}"/>
+          </ac:spMkLst>
+        </pc:spChg>
+        <pc:spChg chg="add del">
+          <ac:chgData name="Erik Manis" userId="88af51049543f108" providerId="LiveId" clId="{26CA37BE-C863-470F-BA02-FBC6B35E370C}" dt="2022-02-16T16:51:14.925" v="7" actId="26606"/>
+          <ac:spMkLst>
+            <pc:docMk/>
+            <pc:sldMk cId="2086654361" sldId="273"/>
+            <ac:spMk id="83" creationId="{A1B139DD-0E8D-42FA-9171-C5F001754A88}"/>
+          </ac:spMkLst>
+        </pc:spChg>
+        <pc:spChg chg="add del">
+          <ac:chgData name="Erik Manis" userId="88af51049543f108" providerId="LiveId" clId="{26CA37BE-C863-470F-BA02-FBC6B35E370C}" dt="2022-02-16T16:51:35.960" v="9" actId="26606"/>
+          <ac:spMkLst>
+            <pc:docMk/>
+            <pc:sldMk cId="2086654361" sldId="273"/>
+            <ac:spMk id="85" creationId="{8D06CE56-3881-4ADA-8CEF-D18B02C242A3}"/>
+          </ac:spMkLst>
+        </pc:spChg>
+        <pc:spChg chg="add del">
+          <ac:chgData name="Erik Manis" userId="88af51049543f108" providerId="LiveId" clId="{26CA37BE-C863-470F-BA02-FBC6B35E370C}" dt="2022-02-16T16:51:35.960" v="9" actId="26606"/>
+          <ac:spMkLst>
+            <pc:docMk/>
+            <pc:sldMk cId="2086654361" sldId="273"/>
+            <ac:spMk id="86" creationId="{79F3C543-62EC-4433-9C93-A2CD8764E9B4}"/>
+          </ac:spMkLst>
+        </pc:spChg>
+        <pc:spChg chg="add del">
+          <ac:chgData name="Erik Manis" userId="88af51049543f108" providerId="LiveId" clId="{26CA37BE-C863-470F-BA02-FBC6B35E370C}" dt="2022-02-16T16:51:35.960" v="9" actId="26606"/>
+          <ac:spMkLst>
+            <pc:docMk/>
+            <pc:sldMk cId="2086654361" sldId="273"/>
+            <ac:spMk id="87" creationId="{D7D03296-BABA-47AD-A5D5-ED156727016E}"/>
+          </ac:spMkLst>
+        </pc:spChg>
+        <pc:spChg chg="add del">
+          <ac:chgData name="Erik Manis" userId="88af51049543f108" providerId="LiveId" clId="{26CA37BE-C863-470F-BA02-FBC6B35E370C}" dt="2022-02-16T16:51:35.960" v="9" actId="26606"/>
+          <ac:spMkLst>
+            <pc:docMk/>
+            <pc:sldMk cId="2086654361" sldId="273"/>
+            <ac:spMk id="88" creationId="{284A8429-F65A-490D-96E4-1158D3E8A026}"/>
+          </ac:spMkLst>
+        </pc:spChg>
+        <pc:spChg chg="add del">
+          <ac:chgData name="Erik Manis" userId="88af51049543f108" providerId="LiveId" clId="{26CA37BE-C863-470F-BA02-FBC6B35E370C}" dt="2022-02-16T16:51:35.960" v="9" actId="26606"/>
+          <ac:spMkLst>
+            <pc:docMk/>
+            <pc:sldMk cId="2086654361" sldId="273"/>
+            <ac:spMk id="89" creationId="{0F022291-A82B-4D23-A1E0-5F9BD684669E}"/>
+          </ac:spMkLst>
+        </pc:spChg>
+        <pc:spChg chg="add del">
+          <ac:chgData name="Erik Manis" userId="88af51049543f108" providerId="LiveId" clId="{26CA37BE-C863-470F-BA02-FBC6B35E370C}" dt="2022-02-16T16:51:40.414" v="11" actId="26606"/>
+          <ac:spMkLst>
+            <pc:docMk/>
+            <pc:sldMk cId="2086654361" sldId="273"/>
+            <ac:spMk id="91" creationId="{8D06CE56-3881-4ADA-8CEF-D18B02C242A3}"/>
+          </ac:spMkLst>
+        </pc:spChg>
+        <pc:spChg chg="add del">
+          <ac:chgData name="Erik Manis" userId="88af51049543f108" providerId="LiveId" clId="{26CA37BE-C863-470F-BA02-FBC6B35E370C}" dt="2022-02-16T16:51:40.414" v="11" actId="26606"/>
+          <ac:spMkLst>
+            <pc:docMk/>
+            <pc:sldMk cId="2086654361" sldId="273"/>
+            <ac:spMk id="92" creationId="{79F3C543-62EC-4433-9C93-A2CD8764E9B4}"/>
+          </ac:spMkLst>
+        </pc:spChg>
+        <pc:spChg chg="add del">
+          <ac:chgData name="Erik Manis" userId="88af51049543f108" providerId="LiveId" clId="{26CA37BE-C863-470F-BA02-FBC6B35E370C}" dt="2022-02-16T16:51:40.414" v="11" actId="26606"/>
+          <ac:spMkLst>
+            <pc:docMk/>
+            <pc:sldMk cId="2086654361" sldId="273"/>
+            <ac:spMk id="93" creationId="{FB33DC6A-1F1C-4A06-834E-CFF88F1C0BB9}"/>
+          </ac:spMkLst>
+        </pc:spChg>
+        <pc:spChg chg="add del">
+          <ac:chgData name="Erik Manis" userId="88af51049543f108" providerId="LiveId" clId="{26CA37BE-C863-470F-BA02-FBC6B35E370C}" dt="2022-02-16T16:51:40.414" v="11" actId="26606"/>
+          <ac:spMkLst>
+            <pc:docMk/>
+            <pc:sldMk cId="2086654361" sldId="273"/>
+            <ac:spMk id="94" creationId="{0FE1D5CF-87B8-4A8A-AD3C-01D06A60769B}"/>
+          </ac:spMkLst>
+        </pc:spChg>
+        <pc:spChg chg="add del">
+          <ac:chgData name="Erik Manis" userId="88af51049543f108" providerId="LiveId" clId="{26CA37BE-C863-470F-BA02-FBC6B35E370C}" dt="2022-02-16T16:51:40.414" v="11" actId="26606"/>
+          <ac:spMkLst>
+            <pc:docMk/>
+            <pc:sldMk cId="2086654361" sldId="273"/>
+            <ac:spMk id="95" creationId="{60926200-45C2-41E9-839F-31CD5FE4CD59}"/>
+          </ac:spMkLst>
+        </pc:spChg>
+        <pc:spChg chg="add del">
+          <ac:chgData name="Erik Manis" userId="88af51049543f108" providerId="LiveId" clId="{26CA37BE-C863-470F-BA02-FBC6B35E370C}" dt="2022-02-16T16:51:40.414" v="11" actId="26606"/>
+          <ac:spMkLst>
+            <pc:docMk/>
+            <pc:sldMk cId="2086654361" sldId="273"/>
+            <ac:spMk id="96" creationId="{AF2F604E-43BE-4DC3-B983-E071523364F8}"/>
+          </ac:spMkLst>
+        </pc:spChg>
+        <pc:spChg chg="add del">
+          <ac:chgData name="Erik Manis" userId="88af51049543f108" providerId="LiveId" clId="{26CA37BE-C863-470F-BA02-FBC6B35E370C}" dt="2022-02-16T16:51:40.414" v="11" actId="26606"/>
+          <ac:spMkLst>
+            <pc:docMk/>
+            <pc:sldMk cId="2086654361" sldId="273"/>
+            <ac:spMk id="97" creationId="{08C9B587-E65E-4B52-B37C-ABEBB6E87928}"/>
+          </ac:spMkLst>
+        </pc:spChg>
+        <pc:spChg chg="add del">
+          <ac:chgData name="Erik Manis" userId="88af51049543f108" providerId="LiveId" clId="{26CA37BE-C863-470F-BA02-FBC6B35E370C}" dt="2022-02-16T16:52:31.824" v="16" actId="26606"/>
+          <ac:spMkLst>
+            <pc:docMk/>
+            <pc:sldMk cId="2086654361" sldId="273"/>
+            <ac:spMk id="99" creationId="{8D06CE56-3881-4ADA-8CEF-D18B02C242A3}"/>
+          </ac:spMkLst>
+        </pc:spChg>
+        <pc:spChg chg="add del">
+          <ac:chgData name="Erik Manis" userId="88af51049543f108" providerId="LiveId" clId="{26CA37BE-C863-470F-BA02-FBC6B35E370C}" dt="2022-02-16T16:52:31.824" v="16" actId="26606"/>
+          <ac:spMkLst>
+            <pc:docMk/>
+            <pc:sldMk cId="2086654361" sldId="273"/>
+            <ac:spMk id="100" creationId="{79F3C543-62EC-4433-9C93-A2CD8764E9B4}"/>
+          </ac:spMkLst>
+        </pc:spChg>
+        <pc:spChg chg="add del">
+          <ac:chgData name="Erik Manis" userId="88af51049543f108" providerId="LiveId" clId="{26CA37BE-C863-470F-BA02-FBC6B35E370C}" dt="2022-02-16T16:52:31.824" v="16" actId="26606"/>
+          <ac:spMkLst>
+            <pc:docMk/>
+            <pc:sldMk cId="2086654361" sldId="273"/>
+            <ac:spMk id="101" creationId="{88263A24-0C1F-4677-B43C-4AE14E276B27}"/>
+          </ac:spMkLst>
+        </pc:spChg>
+        <pc:spChg chg="add del">
+          <ac:chgData name="Erik Manis" userId="88af51049543f108" providerId="LiveId" clId="{26CA37BE-C863-470F-BA02-FBC6B35E370C}" dt="2022-02-16T16:52:31.824" v="16" actId="26606"/>
+          <ac:spMkLst>
+            <pc:docMk/>
+            <pc:sldMk cId="2086654361" sldId="273"/>
+            <ac:spMk id="102" creationId="{0ADDB668-2CA4-4D2B-9C34-3487CA330BA8}"/>
+          </ac:spMkLst>
+        </pc:spChg>
+        <pc:spChg chg="add del">
+          <ac:chgData name="Erik Manis" userId="88af51049543f108" providerId="LiveId" clId="{26CA37BE-C863-470F-BA02-FBC6B35E370C}" dt="2022-02-16T16:52:31.824" v="16" actId="26606"/>
+          <ac:spMkLst>
+            <pc:docMk/>
+            <pc:sldMk cId="2086654361" sldId="273"/>
+            <ac:spMk id="103" creationId="{2568BC19-F052-4108-93E1-6A3D1DEC072F}"/>
+          </ac:spMkLst>
+        </pc:spChg>
+        <pc:spChg chg="add del">
+          <ac:chgData name="Erik Manis" userId="88af51049543f108" providerId="LiveId" clId="{26CA37BE-C863-470F-BA02-FBC6B35E370C}" dt="2022-02-16T16:52:31.824" v="16" actId="26606"/>
+          <ac:spMkLst>
+            <pc:docMk/>
+            <pc:sldMk cId="2086654361" sldId="273"/>
+            <ac:spMk id="104" creationId="{D5FD337D-4D6B-4C8B-B6F5-121097E09881}"/>
+          </ac:spMkLst>
+        </pc:spChg>
+        <pc:spChg chg="add del">
+          <ac:chgData name="Erik Manis" userId="88af51049543f108" providerId="LiveId" clId="{26CA37BE-C863-470F-BA02-FBC6B35E370C}" dt="2022-02-16T16:52:31.788" v="15" actId="26606"/>
+          <ac:spMkLst>
+            <pc:docMk/>
+            <pc:sldMk cId="2086654361" sldId="273"/>
+            <ac:spMk id="109" creationId="{8D06CE56-3881-4ADA-8CEF-D18B02C242A3}"/>
+          </ac:spMkLst>
+        </pc:spChg>
+        <pc:spChg chg="add del">
+          <ac:chgData name="Erik Manis" userId="88af51049543f108" providerId="LiveId" clId="{26CA37BE-C863-470F-BA02-FBC6B35E370C}" dt="2022-02-16T16:52:31.788" v="15" actId="26606"/>
+          <ac:spMkLst>
+            <pc:docMk/>
+            <pc:sldMk cId="2086654361" sldId="273"/>
+            <ac:spMk id="111" creationId="{79F3C543-62EC-4433-9C93-A2CD8764E9B4}"/>
+          </ac:spMkLst>
+        </pc:spChg>
+        <pc:spChg chg="add del">
+          <ac:chgData name="Erik Manis" userId="88af51049543f108" providerId="LiveId" clId="{26CA37BE-C863-470F-BA02-FBC6B35E370C}" dt="2022-02-16T16:52:31.788" v="15" actId="26606"/>
+          <ac:spMkLst>
+            <pc:docMk/>
+            <pc:sldMk cId="2086654361" sldId="273"/>
+            <ac:spMk id="113" creationId="{88263A24-0C1F-4677-B43C-4AE14E276B27}"/>
+          </ac:spMkLst>
+        </pc:spChg>
+        <pc:spChg chg="add del">
+          <ac:chgData name="Erik Manis" userId="88af51049543f108" providerId="LiveId" clId="{26CA37BE-C863-470F-BA02-FBC6B35E370C}" dt="2022-02-16T16:52:31.788" v="15" actId="26606"/>
+          <ac:spMkLst>
+            <pc:docMk/>
+            <pc:sldMk cId="2086654361" sldId="273"/>
+            <ac:spMk id="115" creationId="{0ADDB668-2CA4-4D2B-9C34-3487CA330BA8}"/>
+          </ac:spMkLst>
+        </pc:spChg>
+        <pc:spChg chg="add del">
+          <ac:chgData name="Erik Manis" userId="88af51049543f108" providerId="LiveId" clId="{26CA37BE-C863-470F-BA02-FBC6B35E370C}" dt="2022-02-16T16:52:31.788" v="15" actId="26606"/>
+          <ac:spMkLst>
+            <pc:docMk/>
+            <pc:sldMk cId="2086654361" sldId="273"/>
+            <ac:spMk id="117" creationId="{2568BC19-F052-4108-93E1-6A3D1DEC072F}"/>
+          </ac:spMkLst>
+        </pc:spChg>
+        <pc:spChg chg="add del">
+          <ac:chgData name="Erik Manis" userId="88af51049543f108" providerId="LiveId" clId="{26CA37BE-C863-470F-BA02-FBC6B35E370C}" dt="2022-02-16T16:52:31.788" v="15" actId="26606"/>
+          <ac:spMkLst>
+            <pc:docMk/>
+            <pc:sldMk cId="2086654361" sldId="273"/>
+            <ac:spMk id="119" creationId="{D5FD337D-4D6B-4C8B-B6F5-121097E09881}"/>
+          </ac:spMkLst>
+        </pc:spChg>
+        <pc:spChg chg="add del">
+          <ac:chgData name="Erik Manis" userId="88af51049543f108" providerId="LiveId" clId="{26CA37BE-C863-470F-BA02-FBC6B35E370C}" dt="2022-02-16T16:58:54.295" v="51" actId="26606"/>
+          <ac:spMkLst>
+            <pc:docMk/>
+            <pc:sldMk cId="2086654361" sldId="273"/>
+            <ac:spMk id="121" creationId="{8D06CE56-3881-4ADA-8CEF-D18B02C242A3}"/>
+          </ac:spMkLst>
+        </pc:spChg>
+        <pc:spChg chg="add del">
+          <ac:chgData name="Erik Manis" userId="88af51049543f108" providerId="LiveId" clId="{26CA37BE-C863-470F-BA02-FBC6B35E370C}" dt="2022-02-16T16:58:54.295" v="51" actId="26606"/>
+          <ac:spMkLst>
+            <pc:docMk/>
+            <pc:sldMk cId="2086654361" sldId="273"/>
+            <ac:spMk id="122" creationId="{79F3C543-62EC-4433-9C93-A2CD8764E9B4}"/>
+          </ac:spMkLst>
+        </pc:spChg>
+        <pc:spChg chg="add del">
+          <ac:chgData name="Erik Manis" userId="88af51049543f108" providerId="LiveId" clId="{26CA37BE-C863-470F-BA02-FBC6B35E370C}" dt="2022-02-16T16:58:54.295" v="51" actId="26606"/>
+          <ac:spMkLst>
+            <pc:docMk/>
+            <pc:sldMk cId="2086654361" sldId="273"/>
+            <ac:spMk id="123" creationId="{96646FC9-C66D-4EC7-8310-0DD4ACC49C6C}"/>
+          </ac:spMkLst>
+        </pc:spChg>
+        <pc:spChg chg="add del">
+          <ac:chgData name="Erik Manis" userId="88af51049543f108" providerId="LiveId" clId="{26CA37BE-C863-470F-BA02-FBC6B35E370C}" dt="2022-02-16T16:58:54.295" v="51" actId="26606"/>
+          <ac:spMkLst>
+            <pc:docMk/>
+            <pc:sldMk cId="2086654361" sldId="273"/>
+            <ac:spMk id="124" creationId="{A3473CF9-37EB-43E7-89EF-D2D1C53D1DAC}"/>
+          </ac:spMkLst>
+        </pc:spChg>
+        <pc:spChg chg="add del">
+          <ac:chgData name="Erik Manis" userId="88af51049543f108" providerId="LiveId" clId="{26CA37BE-C863-470F-BA02-FBC6B35E370C}" dt="2022-02-16T16:58:54.295" v="51" actId="26606"/>
+          <ac:spMkLst>
+            <pc:docMk/>
+            <pc:sldMk cId="2086654361" sldId="273"/>
+            <ac:spMk id="125" creationId="{586B4EF9-43BA-4655-A6FF-1D8E21574C95}"/>
+          </ac:spMkLst>
+        </pc:spChg>
+        <pc:spChg chg="add del">
+          <ac:chgData name="Erik Manis" userId="88af51049543f108" providerId="LiveId" clId="{26CA37BE-C863-470F-BA02-FBC6B35E370C}" dt="2022-02-16T17:01:07.215" v="55" actId="26606"/>
+          <ac:spMkLst>
+            <pc:docMk/>
+            <pc:sldMk cId="2086654361" sldId="273"/>
+            <ac:spMk id="130" creationId="{8D06CE56-3881-4ADA-8CEF-D18B02C242A3}"/>
+          </ac:spMkLst>
+        </pc:spChg>
+        <pc:spChg chg="add del">
+          <ac:chgData name="Erik Manis" userId="88af51049543f108" providerId="LiveId" clId="{26CA37BE-C863-470F-BA02-FBC6B35E370C}" dt="2022-02-16T17:01:07.215" v="55" actId="26606"/>
+          <ac:spMkLst>
+            <pc:docMk/>
+            <pc:sldMk cId="2086654361" sldId="273"/>
+            <ac:spMk id="132" creationId="{79F3C543-62EC-4433-9C93-A2CD8764E9B4}"/>
+          </ac:spMkLst>
+        </pc:spChg>
+        <pc:spChg chg="add del">
+          <ac:chgData name="Erik Manis" userId="88af51049543f108" providerId="LiveId" clId="{26CA37BE-C863-470F-BA02-FBC6B35E370C}" dt="2022-02-16T17:01:07.215" v="55" actId="26606"/>
+          <ac:spMkLst>
+            <pc:docMk/>
+            <pc:sldMk cId="2086654361" sldId="273"/>
+            <ac:spMk id="134" creationId="{96646FC9-C66D-4EC7-8310-0DD4ACC49C6C}"/>
+          </ac:spMkLst>
+        </pc:spChg>
+        <pc:spChg chg="add del">
+          <ac:chgData name="Erik Manis" userId="88af51049543f108" providerId="LiveId" clId="{26CA37BE-C863-470F-BA02-FBC6B35E370C}" dt="2022-02-16T17:01:07.215" v="55" actId="26606"/>
+          <ac:spMkLst>
+            <pc:docMk/>
+            <pc:sldMk cId="2086654361" sldId="273"/>
+            <ac:spMk id="136" creationId="{A3473CF9-37EB-43E7-89EF-D2D1C53D1DAC}"/>
+          </ac:spMkLst>
+        </pc:spChg>
+        <pc:spChg chg="add del">
+          <ac:chgData name="Erik Manis" userId="88af51049543f108" providerId="LiveId" clId="{26CA37BE-C863-470F-BA02-FBC6B35E370C}" dt="2022-02-16T17:01:07.215" v="55" actId="26606"/>
+          <ac:spMkLst>
+            <pc:docMk/>
+            <pc:sldMk cId="2086654361" sldId="273"/>
+            <ac:spMk id="138" creationId="{586B4EF9-43BA-4655-A6FF-1D8E21574C95}"/>
+          </ac:spMkLst>
+        </pc:spChg>
+        <pc:spChg chg="add del">
+          <ac:chgData name="Erik Manis" userId="88af51049543f108" providerId="LiveId" clId="{26CA37BE-C863-470F-BA02-FBC6B35E370C}" dt="2022-02-16T17:03:12.738" v="61" actId="26606"/>
+          <ac:spMkLst>
+            <pc:docMk/>
+            <pc:sldMk cId="2086654361" sldId="273"/>
+            <ac:spMk id="140" creationId="{8D06CE56-3881-4ADA-8CEF-D18B02C242A3}"/>
+          </ac:spMkLst>
+        </pc:spChg>
+        <pc:spChg chg="add del">
+          <ac:chgData name="Erik Manis" userId="88af51049543f108" providerId="LiveId" clId="{26CA37BE-C863-470F-BA02-FBC6B35E370C}" dt="2022-02-16T17:03:12.738" v="61" actId="26606"/>
+          <ac:spMkLst>
+            <pc:docMk/>
+            <pc:sldMk cId="2086654361" sldId="273"/>
+            <ac:spMk id="141" creationId="{79F3C543-62EC-4433-9C93-A2CD8764E9B4}"/>
+          </ac:spMkLst>
+        </pc:spChg>
+        <pc:spChg chg="add del">
+          <ac:chgData name="Erik Manis" userId="88af51049543f108" providerId="LiveId" clId="{26CA37BE-C863-470F-BA02-FBC6B35E370C}" dt="2022-02-16T17:03:12.738" v="61" actId="26606"/>
+          <ac:spMkLst>
+            <pc:docMk/>
+            <pc:sldMk cId="2086654361" sldId="273"/>
+            <ac:spMk id="142" creationId="{D7D12574-25F0-4BB1-AA48-9DE7527AF5F4}"/>
+          </ac:spMkLst>
+        </pc:spChg>
+        <pc:spChg chg="add del">
+          <ac:chgData name="Erik Manis" userId="88af51049543f108" providerId="LiveId" clId="{26CA37BE-C863-470F-BA02-FBC6B35E370C}" dt="2022-02-16T17:03:12.738" v="61" actId="26606"/>
+          <ac:spMkLst>
+            <pc:docMk/>
+            <pc:sldMk cId="2086654361" sldId="273"/>
+            <ac:spMk id="143" creationId="{A3473CF9-37EB-43E7-89EF-D2D1C53D1DAC}"/>
+          </ac:spMkLst>
+        </pc:spChg>
+        <pc:spChg chg="add del">
+          <ac:chgData name="Erik Manis" userId="88af51049543f108" providerId="LiveId" clId="{26CA37BE-C863-470F-BA02-FBC6B35E370C}" dt="2022-02-16T17:03:12.738" v="61" actId="26606"/>
+          <ac:spMkLst>
+            <pc:docMk/>
+            <pc:sldMk cId="2086654361" sldId="273"/>
+            <ac:spMk id="144" creationId="{586B4EF9-43BA-4655-A6FF-1D8E21574C95}"/>
+          </ac:spMkLst>
+        </pc:spChg>
+        <pc:spChg chg="add del">
+          <ac:chgData name="Erik Manis" userId="88af51049543f108" providerId="LiveId" clId="{26CA37BE-C863-470F-BA02-FBC6B35E370C}" dt="2022-02-16T17:03:12.689" v="60" actId="26606"/>
+          <ac:spMkLst>
+            <pc:docMk/>
+            <pc:sldMk cId="2086654361" sldId="273"/>
+            <ac:spMk id="146" creationId="{8D06CE56-3881-4ADA-8CEF-D18B02C242A3}"/>
+          </ac:spMkLst>
+        </pc:spChg>
+        <pc:spChg chg="add del">
+          <ac:chgData name="Erik Manis" userId="88af51049543f108" providerId="LiveId" clId="{26CA37BE-C863-470F-BA02-FBC6B35E370C}" dt="2022-02-16T17:03:12.689" v="60" actId="26606"/>
+          <ac:spMkLst>
+            <pc:docMk/>
+            <pc:sldMk cId="2086654361" sldId="273"/>
+            <ac:spMk id="147" creationId="{79F3C543-62EC-4433-9C93-A2CD8764E9B4}"/>
+          </ac:spMkLst>
+        </pc:spChg>
+        <pc:spChg chg="add del">
+          <ac:chgData name="Erik Manis" userId="88af51049543f108" providerId="LiveId" clId="{26CA37BE-C863-470F-BA02-FBC6B35E370C}" dt="2022-02-16T17:03:12.689" v="60" actId="26606"/>
+          <ac:spMkLst>
+            <pc:docMk/>
+            <pc:sldMk cId="2086654361" sldId="273"/>
+            <ac:spMk id="148" creationId="{7958F8D2-E168-45AA-84D7-14C902177EB0}"/>
+          </ac:spMkLst>
+        </pc:spChg>
+        <pc:spChg chg="add del">
+          <ac:chgData name="Erik Manis" userId="88af51049543f108" providerId="LiveId" clId="{26CA37BE-C863-470F-BA02-FBC6B35E370C}" dt="2022-02-16T17:03:12.689" v="60" actId="26606"/>
+          <ac:spMkLst>
+            <pc:docMk/>
+            <pc:sldMk cId="2086654361" sldId="273"/>
+            <ac:spMk id="149" creationId="{A3473CF9-37EB-43E7-89EF-D2D1C53D1DAC}"/>
+          </ac:spMkLst>
+        </pc:spChg>
+        <pc:spChg chg="add del">
+          <ac:chgData name="Erik Manis" userId="88af51049543f108" providerId="LiveId" clId="{26CA37BE-C863-470F-BA02-FBC6B35E370C}" dt="2022-02-16T17:03:12.689" v="60" actId="26606"/>
+          <ac:spMkLst>
+            <pc:docMk/>
+            <pc:sldMk cId="2086654361" sldId="273"/>
+            <ac:spMk id="150" creationId="{586B4EF9-43BA-4655-A6FF-1D8E21574C95}"/>
+          </ac:spMkLst>
+        </pc:spChg>
+        <pc:spChg chg="add">
+          <ac:chgData name="Erik Manis" userId="88af51049543f108" providerId="LiveId" clId="{26CA37BE-C863-470F-BA02-FBC6B35E370C}" dt="2022-02-16T17:03:12.738" v="61" actId="26606"/>
+          <ac:spMkLst>
+            <pc:docMk/>
+            <pc:sldMk cId="2086654361" sldId="273"/>
+            <ac:spMk id="152" creationId="{8D06CE56-3881-4ADA-8CEF-D18B02C242A3}"/>
+          </ac:spMkLst>
+        </pc:spChg>
+        <pc:spChg chg="add">
+          <ac:chgData name="Erik Manis" userId="88af51049543f108" providerId="LiveId" clId="{26CA37BE-C863-470F-BA02-FBC6B35E370C}" dt="2022-02-16T17:03:12.738" v="61" actId="26606"/>
+          <ac:spMkLst>
+            <pc:docMk/>
+            <pc:sldMk cId="2086654361" sldId="273"/>
+            <ac:spMk id="153" creationId="{79F3C543-62EC-4433-9C93-A2CD8764E9B4}"/>
+          </ac:spMkLst>
+        </pc:spChg>
+        <pc:spChg chg="add">
+          <ac:chgData name="Erik Manis" userId="88af51049543f108" providerId="LiveId" clId="{26CA37BE-C863-470F-BA02-FBC6B35E370C}" dt="2022-02-16T17:03:12.738" v="61" actId="26606"/>
+          <ac:spMkLst>
+            <pc:docMk/>
+            <pc:sldMk cId="2086654361" sldId="273"/>
+            <ac:spMk id="154" creationId="{D898B8EB-E53C-4E72-9817-B4BFCAD73600}"/>
+          </ac:spMkLst>
+        </pc:spChg>
+        <pc:spChg chg="add">
+          <ac:chgData name="Erik Manis" userId="88af51049543f108" providerId="LiveId" clId="{26CA37BE-C863-470F-BA02-FBC6B35E370C}" dt="2022-02-16T17:03:12.738" v="61" actId="26606"/>
+          <ac:spMkLst>
+            <pc:docMk/>
+            <pc:sldMk cId="2086654361" sldId="273"/>
+            <ac:spMk id="155" creationId="{4E130362-2F35-4AB7-9EA5-DBC0F771A58D}"/>
+          </ac:spMkLst>
+        </pc:spChg>
+        <pc:spChg chg="add">
+          <ac:chgData name="Erik Manis" userId="88af51049543f108" providerId="LiveId" clId="{26CA37BE-C863-470F-BA02-FBC6B35E370C}" dt="2022-02-16T17:03:12.738" v="61" actId="26606"/>
+          <ac:spMkLst>
+            <pc:docMk/>
+            <pc:sldMk cId="2086654361" sldId="273"/>
+            <ac:spMk id="156" creationId="{56BE988C-7A5B-41EC-A46C-AEA93D8D32FD}"/>
+          </ac:spMkLst>
+        </pc:spChg>
+        <pc:spChg chg="add">
+          <ac:chgData name="Erik Manis" userId="88af51049543f108" providerId="LiveId" clId="{26CA37BE-C863-470F-BA02-FBC6B35E370C}" dt="2022-02-16T17:03:12.738" v="61" actId="26606"/>
+          <ac:spMkLst>
+            <pc:docMk/>
+            <pc:sldMk cId="2086654361" sldId="273"/>
+            <ac:spMk id="157" creationId="{E3CB1EC0-40A9-4D5E-B7E2-6E3423CE28B2}"/>
+          </ac:spMkLst>
+        </pc:spChg>
+        <pc:spChg chg="add">
+          <ac:chgData name="Erik Manis" userId="88af51049543f108" providerId="LiveId" clId="{26CA37BE-C863-470F-BA02-FBC6B35E370C}" dt="2022-02-16T17:03:12.738" v="61" actId="26606"/>
+          <ac:spMkLst>
+            <pc:docMk/>
+            <pc:sldMk cId="2086654361" sldId="273"/>
+            <ac:spMk id="158" creationId="{DCBE52EF-2889-423F-947C-0E44A760D696}"/>
+          </ac:spMkLst>
+        </pc:spChg>
+        <pc:picChg chg="add mod ord">
+          <ac:chgData name="Erik Manis" userId="88af51049543f108" providerId="LiveId" clId="{26CA37BE-C863-470F-BA02-FBC6B35E370C}" dt="2022-02-16T17:09:48.208" v="78" actId="1076"/>
+          <ac:picMkLst>
+            <pc:docMk/>
+            <pc:sldMk cId="2086654361" sldId="273"/>
+            <ac:picMk id="5" creationId="{0CDA4094-7ED9-4B52-A059-43635606B92D}"/>
+          </ac:picMkLst>
+        </pc:picChg>
+        <pc:picChg chg="add del mod ord modCrop">
+          <ac:chgData name="Erik Manis" userId="88af51049543f108" providerId="LiveId" clId="{26CA37BE-C863-470F-BA02-FBC6B35E370C}" dt="2022-02-16T16:52:45.892" v="18" actId="478"/>
+          <ac:picMkLst>
+            <pc:docMk/>
+            <pc:sldMk cId="2086654361" sldId="273"/>
+            <ac:picMk id="8" creationId="{41EE9134-E1B9-4560-9A0F-54E9884BD04F}"/>
+          </ac:picMkLst>
+        </pc:picChg>
+        <pc:picChg chg="add mod ord">
+          <ac:chgData name="Erik Manis" userId="88af51049543f108" providerId="LiveId" clId="{26CA37BE-C863-470F-BA02-FBC6B35E370C}" dt="2022-02-16T17:09:48.208" v="78" actId="1076"/>
+          <ac:picMkLst>
+            <pc:docMk/>
+            <pc:sldMk cId="2086654361" sldId="273"/>
+            <ac:picMk id="10" creationId="{B7292ACD-CD12-4F8D-93B0-1FA049722873}"/>
+          </ac:picMkLst>
+        </pc:picChg>
+        <pc:picChg chg="add mod ord">
+          <ac:chgData name="Erik Manis" userId="88af51049543f108" providerId="LiveId" clId="{26CA37BE-C863-470F-BA02-FBC6B35E370C}" dt="2022-02-16T17:16:58.868" v="84" actId="1076"/>
+          <ac:picMkLst>
+            <pc:docMk/>
+            <pc:sldMk cId="2086654361" sldId="273"/>
+            <ac:picMk id="12" creationId="{92A8F141-0ABB-4C05-8ECE-768A4ABD014E}"/>
+          </ac:picMkLst>
+        </pc:picChg>
+        <pc:picChg chg="add mod ord">
+          <ac:chgData name="Erik Manis" userId="88af51049543f108" providerId="LiveId" clId="{26CA37BE-C863-470F-BA02-FBC6B35E370C}" dt="2022-02-16T17:09:48.208" v="78" actId="1076"/>
+          <ac:picMkLst>
+            <pc:docMk/>
+            <pc:sldMk cId="2086654361" sldId="273"/>
+            <ac:picMk id="14" creationId="{F531CD27-F670-4877-B5F9-19D4950DE495}"/>
+          </ac:picMkLst>
+        </pc:picChg>
+        <pc:picChg chg="add mod">
+          <ac:chgData name="Erik Manis" userId="88af51049543f108" providerId="LiveId" clId="{26CA37BE-C863-470F-BA02-FBC6B35E370C}" dt="2022-02-16T17:17:08.974" v="86" actId="1076"/>
+          <ac:picMkLst>
+            <pc:docMk/>
+            <pc:sldMk cId="2086654361" sldId="273"/>
+            <ac:picMk id="16" creationId="{63C8C322-B479-4AF8-B1D5-C72D2EB45164}"/>
+          </ac:picMkLst>
+        </pc:picChg>
+        <pc:picChg chg="add mod">
+          <ac:chgData name="Erik Manis" userId="88af51049543f108" providerId="LiveId" clId="{26CA37BE-C863-470F-BA02-FBC6B35E370C}" dt="2022-02-16T17:17:16.041" v="88" actId="1076"/>
+          <ac:picMkLst>
+            <pc:docMk/>
+            <pc:sldMk cId="2086654361" sldId="273"/>
+            <ac:picMk id="18" creationId="{8F0C703D-558F-4A16-AC28-74AD569FD58C}"/>
+          </ac:picMkLst>
+        </pc:picChg>
+      </pc:sldChg>
+      <pc:sldChg chg="addSp delSp modSp mod">
+        <pc:chgData name="Erik Manis" userId="88af51049543f108" providerId="LiveId" clId="{26CA37BE-C863-470F-BA02-FBC6B35E370C}" dt="2022-02-16T16:55:31.055" v="48" actId="1076"/>
+        <pc:sldMkLst>
+          <pc:docMk/>
+          <pc:sldMk cId="553810613" sldId="280"/>
+        </pc:sldMkLst>
+        <pc:spChg chg="mod">
+          <ac:chgData name="Erik Manis" userId="88af51049543f108" providerId="LiveId" clId="{26CA37BE-C863-470F-BA02-FBC6B35E370C}" dt="2022-02-16T16:53:41.007" v="31" actId="26606"/>
+          <ac:spMkLst>
+            <pc:docMk/>
+            <pc:sldMk cId="553810613" sldId="280"/>
+            <ac:spMk id="2" creationId="{D5DB5DBF-0759-49DD-8EB7-B5D09D6500EC}"/>
+          </ac:spMkLst>
+        </pc:spChg>
+        <pc:spChg chg="del">
+          <ac:chgData name="Erik Manis" userId="88af51049543f108" providerId="LiveId" clId="{26CA37BE-C863-470F-BA02-FBC6B35E370C}" dt="2022-02-16T16:52:58.107" v="19" actId="931"/>
+          <ac:spMkLst>
+            <pc:docMk/>
+            <pc:sldMk cId="553810613" sldId="280"/>
+            <ac:spMk id="3" creationId="{6F020079-CAA6-47D7-86A5-6EE4E5AFFF65}"/>
+          </ac:spMkLst>
+        </pc:spChg>
+        <pc:spChg chg="mod">
+          <ac:chgData name="Erik Manis" userId="88af51049543f108" providerId="LiveId" clId="{26CA37BE-C863-470F-BA02-FBC6B35E370C}" dt="2022-02-16T16:53:41.007" v="31" actId="26606"/>
+          <ac:spMkLst>
+            <pc:docMk/>
+            <pc:sldMk cId="553810613" sldId="280"/>
+            <ac:spMk id="4" creationId="{8CA1E675-9E0E-453C-912A-F3A6E3DE5FA7}"/>
+          </ac:spMkLst>
+        </pc:spChg>
+        <pc:spChg chg="mod">
+          <ac:chgData name="Erik Manis" userId="88af51049543f108" providerId="LiveId" clId="{26CA37BE-C863-470F-BA02-FBC6B35E370C}" dt="2022-02-16T16:53:41.007" v="31" actId="26606"/>
+          <ac:spMkLst>
+            <pc:docMk/>
+            <pc:sldMk cId="553810613" sldId="280"/>
+            <ac:spMk id="5" creationId="{110D54E4-2654-4905-AD29-DAF52E0E1FBB}"/>
+          </ac:spMkLst>
+        </pc:spChg>
+        <pc:spChg chg="add del">
+          <ac:chgData name="Erik Manis" userId="88af51049543f108" providerId="LiveId" clId="{26CA37BE-C863-470F-BA02-FBC6B35E370C}" dt="2022-02-16T16:53:18.132" v="26" actId="26606"/>
+          <ac:spMkLst>
+            <pc:docMk/>
+            <pc:sldMk cId="553810613" sldId="280"/>
+            <ac:spMk id="7" creationId="{1C799903-48D5-4A31-A1A2-541072D9771E}"/>
+          </ac:spMkLst>
+        </pc:spChg>
+        <pc:spChg chg="add del">
+          <ac:chgData name="Erik Manis" userId="88af51049543f108" providerId="LiveId" clId="{26CA37BE-C863-470F-BA02-FBC6B35E370C}" dt="2022-02-16T16:53:18.132" v="26" actId="26606"/>
+          <ac:spMkLst>
+            <pc:docMk/>
+            <pc:sldMk cId="553810613" sldId="280"/>
+            <ac:spMk id="9" creationId="{8EFFF109-FC58-4FD3-BE05-9775A1310F55}"/>
+          </ac:spMkLst>
+        </pc:spChg>
+        <pc:spChg chg="add del">
+          <ac:chgData name="Erik Manis" userId="88af51049543f108" providerId="LiveId" clId="{26CA37BE-C863-470F-BA02-FBC6B35E370C}" dt="2022-02-16T16:53:18.132" v="26" actId="26606"/>
+          <ac:spMkLst>
+            <pc:docMk/>
+            <pc:sldMk cId="553810613" sldId="280"/>
+            <ac:spMk id="11" creationId="{E1B96AD6-92A9-4273-A62B-96A1C3E0BA95}"/>
+          </ac:spMkLst>
+        </pc:spChg>
+        <pc:spChg chg="add del">
+          <ac:chgData name="Erik Manis" userId="88af51049543f108" providerId="LiveId" clId="{26CA37BE-C863-470F-BA02-FBC6B35E370C}" dt="2022-02-16T16:53:18.132" v="26" actId="26606"/>
+          <ac:spMkLst>
+            <pc:docMk/>
+            <pc:sldMk cId="553810613" sldId="280"/>
+            <ac:spMk id="16" creationId="{463EEC44-1BA3-44ED-81FC-A644B04B2A44}"/>
+          </ac:spMkLst>
+        </pc:spChg>
+        <pc:spChg chg="add del">
+          <ac:chgData name="Erik Manis" userId="88af51049543f108" providerId="LiveId" clId="{26CA37BE-C863-470F-BA02-FBC6B35E370C}" dt="2022-02-16T16:53:13.215" v="23" actId="26606"/>
+          <ac:spMkLst>
+            <pc:docMk/>
+            <pc:sldMk cId="553810613" sldId="280"/>
+            <ac:spMk id="20" creationId="{921CC4FD-56DD-46CC-BBB5-2A74DB8C1EED}"/>
+          </ac:spMkLst>
+        </pc:spChg>
+        <pc:spChg chg="add del">
+          <ac:chgData name="Erik Manis" userId="88af51049543f108" providerId="LiveId" clId="{26CA37BE-C863-470F-BA02-FBC6B35E370C}" dt="2022-02-16T16:53:41.045" v="32" actId="26606"/>
+          <ac:spMkLst>
+            <pc:docMk/>
+            <pc:sldMk cId="553810613" sldId="280"/>
+            <ac:spMk id="21" creationId="{8D06CE56-3881-4ADA-8CEF-D18B02C242A3}"/>
+          </ac:spMkLst>
+        </pc:spChg>
+        <pc:spChg chg="add del">
+          <ac:chgData name="Erik Manis" userId="88af51049543f108" providerId="LiveId" clId="{26CA37BE-C863-470F-BA02-FBC6B35E370C}" dt="2022-02-16T16:53:13.215" v="23" actId="26606"/>
+          <ac:spMkLst>
+            <pc:docMk/>
+            <pc:sldMk cId="553810613" sldId="280"/>
+            <ac:spMk id="23" creationId="{8108D317-7CBD-4897-BD1F-959436D2A3BE}"/>
+          </ac:spMkLst>
+        </pc:spChg>
+        <pc:spChg chg="add del">
+          <ac:chgData name="Erik Manis" userId="88af51049543f108" providerId="LiveId" clId="{26CA37BE-C863-470F-BA02-FBC6B35E370C}" dt="2022-02-16T16:53:13.215" v="23" actId="26606"/>
+          <ac:spMkLst>
+            <pc:docMk/>
+            <pc:sldMk cId="553810613" sldId="280"/>
+            <ac:spMk id="25" creationId="{D6297641-8B9F-4767-9606-8A11313227BF}"/>
+          </ac:spMkLst>
+        </pc:spChg>
+        <pc:spChg chg="add del">
+          <ac:chgData name="Erik Manis" userId="88af51049543f108" providerId="LiveId" clId="{26CA37BE-C863-470F-BA02-FBC6B35E370C}" dt="2022-02-16T16:53:13.215" v="23" actId="26606"/>
+          <ac:spMkLst>
+            <pc:docMk/>
+            <pc:sldMk cId="553810613" sldId="280"/>
+            <ac:spMk id="27" creationId="{D8F3CA65-EA00-46B4-9616-39E6853F7BED}"/>
+          </ac:spMkLst>
+        </pc:spChg>
+        <pc:spChg chg="add del">
+          <ac:chgData name="Erik Manis" userId="88af51049543f108" providerId="LiveId" clId="{26CA37BE-C863-470F-BA02-FBC6B35E370C}" dt="2022-02-16T16:53:18.077" v="25" actId="26606"/>
+          <ac:spMkLst>
+            <pc:docMk/>
+            <pc:sldMk cId="553810613" sldId="280"/>
+            <ac:spMk id="29" creationId="{E45CA849-654C-4173-AD99-B3A2528275F5}"/>
+          </ac:spMkLst>
+        </pc:spChg>
+        <pc:spChg chg="add del">
+          <ac:chgData name="Erik Manis" userId="88af51049543f108" providerId="LiveId" clId="{26CA37BE-C863-470F-BA02-FBC6B35E370C}" dt="2022-02-16T16:53:18.077" v="25" actId="26606"/>
+          <ac:spMkLst>
+            <pc:docMk/>
+            <pc:sldMk cId="553810613" sldId="280"/>
+            <ac:spMk id="30" creationId="{3E23A947-2D45-4208-AE2B-64948C87A3EB}"/>
+          </ac:spMkLst>
+        </pc:spChg>
+        <pc:spChg chg="add del">
+          <ac:chgData name="Erik Manis" userId="88af51049543f108" providerId="LiveId" clId="{26CA37BE-C863-470F-BA02-FBC6B35E370C}" dt="2022-02-16T16:53:18.077" v="25" actId="26606"/>
+          <ac:spMkLst>
+            <pc:docMk/>
+            <pc:sldMk cId="553810613" sldId="280"/>
+            <ac:spMk id="31" creationId="{E5BBB0F9-6A59-4D02-A9C7-A2D6516684CE}"/>
+          </ac:spMkLst>
+        </pc:spChg>
+        <pc:spChg chg="add del">
+          <ac:chgData name="Erik Manis" userId="88af51049543f108" providerId="LiveId" clId="{26CA37BE-C863-470F-BA02-FBC6B35E370C}" dt="2022-02-16T16:53:18.077" v="25" actId="26606"/>
+          <ac:spMkLst>
+            <pc:docMk/>
+            <pc:sldMk cId="553810613" sldId="280"/>
+            <ac:spMk id="32" creationId="{5A56B854-27C3-40C9-827D-AD5C3EA6DF89}"/>
+          </ac:spMkLst>
+        </pc:spChg>
+        <pc:spChg chg="add del">
+          <ac:chgData name="Erik Manis" userId="88af51049543f108" providerId="LiveId" clId="{26CA37BE-C863-470F-BA02-FBC6B35E370C}" dt="2022-02-16T16:53:41.045" v="32" actId="26606"/>
+          <ac:spMkLst>
+            <pc:docMk/>
+            <pc:sldMk cId="553810613" sldId="280"/>
+            <ac:spMk id="33" creationId="{08C9B587-E65E-4B52-B37C-ABEBB6E87928}"/>
+          </ac:spMkLst>
+        </pc:spChg>
+        <pc:spChg chg="add del">
+          <ac:chgData name="Erik Manis" userId="88af51049543f108" providerId="LiveId" clId="{26CA37BE-C863-470F-BA02-FBC6B35E370C}" dt="2022-02-16T16:53:41.045" v="32" actId="26606"/>
+          <ac:spMkLst>
+            <pc:docMk/>
+            <pc:sldMk cId="553810613" sldId="280"/>
+            <ac:spMk id="34" creationId="{79F3C543-62EC-4433-9C93-A2CD8764E9B4}"/>
+          </ac:spMkLst>
+        </pc:spChg>
+        <pc:spChg chg="add del">
+          <ac:chgData name="Erik Manis" userId="88af51049543f108" providerId="LiveId" clId="{26CA37BE-C863-470F-BA02-FBC6B35E370C}" dt="2022-02-16T16:53:41.045" v="32" actId="26606"/>
+          <ac:spMkLst>
+            <pc:docMk/>
+            <pc:sldMk cId="553810613" sldId="280"/>
+            <ac:spMk id="35" creationId="{5DCB5928-DC7D-4612-9922-441966E15627}"/>
+          </ac:spMkLst>
+        </pc:spChg>
+        <pc:spChg chg="add del">
+          <ac:chgData name="Erik Manis" userId="88af51049543f108" providerId="LiveId" clId="{26CA37BE-C863-470F-BA02-FBC6B35E370C}" dt="2022-02-16T16:53:41.045" v="32" actId="26606"/>
+          <ac:spMkLst>
+            <pc:docMk/>
+            <pc:sldMk cId="553810613" sldId="280"/>
+            <ac:spMk id="36" creationId="{682C1161-1736-45EC-99B7-33F3CAE9D517}"/>
+          </ac:spMkLst>
+        </pc:spChg>
+        <pc:spChg chg="add del">
+          <ac:chgData name="Erik Manis" userId="88af51049543f108" providerId="LiveId" clId="{26CA37BE-C863-470F-BA02-FBC6B35E370C}" dt="2022-02-16T16:53:41.045" v="32" actId="26606"/>
+          <ac:spMkLst>
+            <pc:docMk/>
+            <pc:sldMk cId="553810613" sldId="280"/>
+            <ac:spMk id="37" creationId="{84D4DDB8-B68F-45B0-9F62-C4279996F672}"/>
+          </ac:spMkLst>
+        </pc:spChg>
+        <pc:spChg chg="add del">
+          <ac:chgData name="Erik Manis" userId="88af51049543f108" providerId="LiveId" clId="{26CA37BE-C863-470F-BA02-FBC6B35E370C}" dt="2022-02-16T16:53:41.045" v="32" actId="26606"/>
+          <ac:spMkLst>
+            <pc:docMk/>
+            <pc:sldMk cId="553810613" sldId="280"/>
+            <ac:spMk id="38" creationId="{AF2F604E-43BE-4DC3-B983-E071523364F8}"/>
+          </ac:spMkLst>
+        </pc:spChg>
+        <pc:spChg chg="add del">
+          <ac:chgData name="Erik Manis" userId="88af51049543f108" providerId="LiveId" clId="{26CA37BE-C863-470F-BA02-FBC6B35E370C}" dt="2022-02-16T16:53:36.689" v="29" actId="26606"/>
+          <ac:spMkLst>
+            <pc:docMk/>
+            <pc:sldMk cId="553810613" sldId="280"/>
+            <ac:spMk id="43" creationId="{8D06CE56-3881-4ADA-8CEF-D18B02C242A3}"/>
+          </ac:spMkLst>
+        </pc:spChg>
+        <pc:spChg chg="add del">
+          <ac:chgData name="Erik Manis" userId="88af51049543f108" providerId="LiveId" clId="{26CA37BE-C863-470F-BA02-FBC6B35E370C}" dt="2022-02-16T16:53:36.689" v="29" actId="26606"/>
+          <ac:spMkLst>
+            <pc:docMk/>
+            <pc:sldMk cId="553810613" sldId="280"/>
+            <ac:spMk id="45" creationId="{79F3C543-62EC-4433-9C93-A2CD8764E9B4}"/>
+          </ac:spMkLst>
+        </pc:spChg>
+        <pc:spChg chg="add del">
+          <ac:chgData name="Erik Manis" userId="88af51049543f108" providerId="LiveId" clId="{26CA37BE-C863-470F-BA02-FBC6B35E370C}" dt="2022-02-16T16:53:36.689" v="29" actId="26606"/>
+          <ac:spMkLst>
+            <pc:docMk/>
+            <pc:sldMk cId="553810613" sldId="280"/>
+            <ac:spMk id="47" creationId="{5DCB5928-DC7D-4612-9922-441966E15627}"/>
+          </ac:spMkLst>
+        </pc:spChg>
+        <pc:spChg chg="add del">
+          <ac:chgData name="Erik Manis" userId="88af51049543f108" providerId="LiveId" clId="{26CA37BE-C863-470F-BA02-FBC6B35E370C}" dt="2022-02-16T16:53:36.689" v="29" actId="26606"/>
+          <ac:spMkLst>
+            <pc:docMk/>
+            <pc:sldMk cId="553810613" sldId="280"/>
+            <ac:spMk id="49" creationId="{682C1161-1736-45EC-99B7-33F3CAE9D517}"/>
+          </ac:spMkLst>
+        </pc:spChg>
+        <pc:spChg chg="add del">
+          <ac:chgData name="Erik Manis" userId="88af51049543f108" providerId="LiveId" clId="{26CA37BE-C863-470F-BA02-FBC6B35E370C}" dt="2022-02-16T16:53:36.689" v="29" actId="26606"/>
+          <ac:spMkLst>
+            <pc:docMk/>
+            <pc:sldMk cId="553810613" sldId="280"/>
+            <ac:spMk id="51" creationId="{84D4DDB8-B68F-45B0-9F62-C4279996F672}"/>
+          </ac:spMkLst>
+        </pc:spChg>
+        <pc:spChg chg="add del">
+          <ac:chgData name="Erik Manis" userId="88af51049543f108" providerId="LiveId" clId="{26CA37BE-C863-470F-BA02-FBC6B35E370C}" dt="2022-02-16T16:53:36.689" v="29" actId="26606"/>
+          <ac:spMkLst>
+            <pc:docMk/>
+            <pc:sldMk cId="553810613" sldId="280"/>
+            <ac:spMk id="53" creationId="{AF2F604E-43BE-4DC3-B983-E071523364F8}"/>
+          </ac:spMkLst>
+        </pc:spChg>
+        <pc:spChg chg="add del">
+          <ac:chgData name="Erik Manis" userId="88af51049543f108" providerId="LiveId" clId="{26CA37BE-C863-470F-BA02-FBC6B35E370C}" dt="2022-02-16T16:53:36.689" v="29" actId="26606"/>
+          <ac:spMkLst>
+            <pc:docMk/>
+            <pc:sldMk cId="553810613" sldId="280"/>
+            <ac:spMk id="55" creationId="{08C9B587-E65E-4B52-B37C-ABEBB6E87928}"/>
+          </ac:spMkLst>
+        </pc:spChg>
+        <pc:spChg chg="add del">
+          <ac:chgData name="Erik Manis" userId="88af51049543f108" providerId="LiveId" clId="{26CA37BE-C863-470F-BA02-FBC6B35E370C}" dt="2022-02-16T16:53:41.007" v="31" actId="26606"/>
+          <ac:spMkLst>
+            <pc:docMk/>
+            <pc:sldMk cId="553810613" sldId="280"/>
+            <ac:spMk id="57" creationId="{8D06CE56-3881-4ADA-8CEF-D18B02C242A3}"/>
+          </ac:spMkLst>
+        </pc:spChg>
+        <pc:spChg chg="add del">
+          <ac:chgData name="Erik Manis" userId="88af51049543f108" providerId="LiveId" clId="{26CA37BE-C863-470F-BA02-FBC6B35E370C}" dt="2022-02-16T16:53:41.007" v="31" actId="26606"/>
+          <ac:spMkLst>
+            <pc:docMk/>
+            <pc:sldMk cId="553810613" sldId="280"/>
+            <ac:spMk id="58" creationId="{79F3C543-62EC-4433-9C93-A2CD8764E9B4}"/>
+          </ac:spMkLst>
+        </pc:spChg>
+        <pc:spChg chg="add del">
+          <ac:chgData name="Erik Manis" userId="88af51049543f108" providerId="LiveId" clId="{26CA37BE-C863-470F-BA02-FBC6B35E370C}" dt="2022-02-16T16:53:41.007" v="31" actId="26606"/>
+          <ac:spMkLst>
+            <pc:docMk/>
+            <pc:sldMk cId="553810613" sldId="280"/>
+            <ac:spMk id="59" creationId="{8EE94D8D-BC47-413E-91AB-A2FCCE172B57}"/>
+          </ac:spMkLst>
+        </pc:spChg>
+        <pc:spChg chg="add del">
+          <ac:chgData name="Erik Manis" userId="88af51049543f108" providerId="LiveId" clId="{26CA37BE-C863-470F-BA02-FBC6B35E370C}" dt="2022-02-16T16:53:41.007" v="31" actId="26606"/>
+          <ac:spMkLst>
+            <pc:docMk/>
+            <pc:sldMk cId="553810613" sldId="280"/>
+            <ac:spMk id="60" creationId="{284A8429-F65A-490D-96E4-1158D3E8A026}"/>
+          </ac:spMkLst>
+        </pc:spChg>
+        <pc:spChg chg="add del">
+          <ac:chgData name="Erik Manis" userId="88af51049543f108" providerId="LiveId" clId="{26CA37BE-C863-470F-BA02-FBC6B35E370C}" dt="2022-02-16T16:53:41.007" v="31" actId="26606"/>
+          <ac:spMkLst>
+            <pc:docMk/>
+            <pc:sldMk cId="553810613" sldId="280"/>
+            <ac:spMk id="61" creationId="{0F022291-A82B-4D23-A1E0-5F9BD684669E}"/>
+          </ac:spMkLst>
+        </pc:spChg>
+        <pc:spChg chg="add">
+          <ac:chgData name="Erik Manis" userId="88af51049543f108" providerId="LiveId" clId="{26CA37BE-C863-470F-BA02-FBC6B35E370C}" dt="2022-02-16T16:53:41.045" v="32" actId="26606"/>
+          <ac:spMkLst>
+            <pc:docMk/>
+            <pc:sldMk cId="553810613" sldId="280"/>
+            <ac:spMk id="63" creationId="{8D06CE56-3881-4ADA-8CEF-D18B02C242A3}"/>
+          </ac:spMkLst>
+        </pc:spChg>
+        <pc:spChg chg="add">
+          <ac:chgData name="Erik Manis" userId="88af51049543f108" providerId="LiveId" clId="{26CA37BE-C863-470F-BA02-FBC6B35E370C}" dt="2022-02-16T16:53:41.045" v="32" actId="26606"/>
+          <ac:spMkLst>
+            <pc:docMk/>
+            <pc:sldMk cId="553810613" sldId="280"/>
+            <ac:spMk id="64" creationId="{79F3C543-62EC-4433-9C93-A2CD8764E9B4}"/>
+          </ac:spMkLst>
+        </pc:spChg>
+        <pc:spChg chg="add">
+          <ac:chgData name="Erik Manis" userId="88af51049543f108" providerId="LiveId" clId="{26CA37BE-C863-470F-BA02-FBC6B35E370C}" dt="2022-02-16T16:53:41.045" v="32" actId="26606"/>
+          <ac:spMkLst>
+            <pc:docMk/>
+            <pc:sldMk cId="553810613" sldId="280"/>
+            <ac:spMk id="65" creationId="{5DCB5928-DC7D-4612-9922-441966E15627}"/>
+          </ac:spMkLst>
+        </pc:spChg>
+        <pc:spChg chg="add">
+          <ac:chgData name="Erik Manis" userId="88af51049543f108" providerId="LiveId" clId="{26CA37BE-C863-470F-BA02-FBC6B35E370C}" dt="2022-02-16T16:53:41.045" v="32" actId="26606"/>
+          <ac:spMkLst>
+            <pc:docMk/>
+            <pc:sldMk cId="553810613" sldId="280"/>
+            <ac:spMk id="66" creationId="{682C1161-1736-45EC-99B7-33F3CAE9D517}"/>
+          </ac:spMkLst>
+        </pc:spChg>
+        <pc:spChg chg="add">
+          <ac:chgData name="Erik Manis" userId="88af51049543f108" providerId="LiveId" clId="{26CA37BE-C863-470F-BA02-FBC6B35E370C}" dt="2022-02-16T16:53:41.045" v="32" actId="26606"/>
+          <ac:spMkLst>
+            <pc:docMk/>
+            <pc:sldMk cId="553810613" sldId="280"/>
+            <ac:spMk id="67" creationId="{84D4DDB8-B68F-45B0-9F62-C4279996F672}"/>
+          </ac:spMkLst>
+        </pc:spChg>
+        <pc:spChg chg="add">
+          <ac:chgData name="Erik Manis" userId="88af51049543f108" providerId="LiveId" clId="{26CA37BE-C863-470F-BA02-FBC6B35E370C}" dt="2022-02-16T16:53:41.045" v="32" actId="26606"/>
+          <ac:spMkLst>
+            <pc:docMk/>
+            <pc:sldMk cId="553810613" sldId="280"/>
+            <ac:spMk id="68" creationId="{AF2F604E-43BE-4DC3-B983-E071523364F8}"/>
+          </ac:spMkLst>
+        </pc:spChg>
+        <pc:spChg chg="add">
+          <ac:chgData name="Erik Manis" userId="88af51049543f108" providerId="LiveId" clId="{26CA37BE-C863-470F-BA02-FBC6B35E370C}" dt="2022-02-16T16:53:41.045" v="32" actId="26606"/>
+          <ac:spMkLst>
+            <pc:docMk/>
+            <pc:sldMk cId="553810613" sldId="280"/>
+            <ac:spMk id="69" creationId="{08C9B587-E65E-4B52-B37C-ABEBB6E87928}"/>
+          </ac:spMkLst>
+        </pc:spChg>
+        <pc:picChg chg="add mod ord modCrop">
+          <ac:chgData name="Erik Manis" userId="88af51049543f108" providerId="LiveId" clId="{26CA37BE-C863-470F-BA02-FBC6B35E370C}" dt="2022-02-16T16:55:31.055" v="48" actId="1076"/>
+          <ac:picMkLst>
+            <pc:docMk/>
+            <pc:sldMk cId="553810613" sldId="280"/>
+            <ac:picMk id="8" creationId="{C0BF9186-0A5F-46DC-8779-C5D19B707AA8}"/>
+          </ac:picMkLst>
+        </pc:picChg>
+      </pc:sldChg>
+    </pc:docChg>
+  </pc:docChgLst>
   <pc:docChgLst>
     <pc:chgData name="Erik Manis" userId="88af51049543f108" providerId="LiveId" clId="{D10F9C3D-97E4-40C3-B272-5E6AAD36CA25}"/>
     <pc:docChg chg="custSel addSld delSld modSld sldOrd">
@@ -3678,7 +4741,7 @@
           <a:p>
             <a:fld id="{A2AF5FFE-13F6-4005-A8DC-3D74F47F0B7A}" type="datetime1">
               <a:rPr lang="en-US" smtClean="0"/>
-              <a:t>2/15/2022</a:t>
+              <a:t>2/16/2022</a:t>
             </a:fld>
             <a:endParaRPr lang="en-US"/>
           </a:p>
@@ -4050,7 +5113,7 @@
           <a:p>
             <a:fld id="{3D2F9C94-370D-45C4-AF7B-564A3871EB16}" type="datetime1">
               <a:rPr lang="en-US" smtClean="0"/>
-              <a:t>2/15/2022</a:t>
+              <a:t>2/16/2022</a:t>
             </a:fld>
             <a:endParaRPr lang="en-US"/>
           </a:p>
@@ -4261,7 +5324,7 @@
           <a:p>
             <a:fld id="{1B1ED6EC-9C13-4B1E-8D74-A2C9DC60E119}" type="datetime1">
               <a:rPr lang="en-US" smtClean="0"/>
-              <a:t>2/15/2022</a:t>
+              <a:t>2/16/2022</a:t>
             </a:fld>
             <a:endParaRPr lang="en-US"/>
           </a:p>
@@ -4734,7 +5797,7 @@
           <a:p>
             <a:fld id="{CAABD92D-3B6A-410D-B980-87CAE7B9FC00}" type="datetime1">
               <a:rPr lang="en-US" smtClean="0"/>
-              <a:t>2/15/2022</a:t>
+              <a:t>2/16/2022</a:t>
             </a:fld>
             <a:endParaRPr lang="en-US"/>
           </a:p>
@@ -5191,7 +6254,7 @@
           <a:p>
             <a:fld id="{3C77BA88-B581-4562-AE1C-CC6B3CA69375}" type="datetime1">
               <a:rPr lang="en-US" smtClean="0"/>
-              <a:t>2/15/2022</a:t>
+              <a:t>2/16/2022</a:t>
             </a:fld>
             <a:endParaRPr lang="en-US"/>
           </a:p>
@@ -5726,7 +6789,7 @@
           <a:p>
             <a:fld id="{F09F7D06-66B6-41C5-8FA5-CD7ACC96B639}" type="datetime1">
               <a:rPr lang="en-US" smtClean="0"/>
-              <a:t>2/15/2022</a:t>
+              <a:t>2/16/2022</a:t>
             </a:fld>
             <a:endParaRPr lang="en-US"/>
           </a:p>
@@ -6428,7 +7491,7 @@
           <a:p>
             <a:fld id="{B537DD61-F9CE-47F3-ABBD-C06D73839A42}" type="datetime1">
               <a:rPr lang="en-US" smtClean="0"/>
-              <a:t>2/15/2022</a:t>
+              <a:t>2/16/2022</a:t>
             </a:fld>
             <a:endParaRPr lang="en-US"/>
           </a:p>
@@ -6760,7 +7823,7 @@
           <a:p>
             <a:fld id="{B5C8AAAE-F7AA-4E6B-A3B7-8B46F12BE03E}" type="datetime1">
               <a:rPr lang="en-US" smtClean="0"/>
-              <a:t>2/15/2022</a:t>
+              <a:t>2/16/2022</a:t>
             </a:fld>
             <a:endParaRPr lang="en-US"/>
           </a:p>
@@ -6876,7 +7939,7 @@
           <a:p>
             <a:fld id="{2EA05152-D11D-4885-9E25-3CF068820E92}" type="datetime1">
               <a:rPr lang="en-US" smtClean="0"/>
-              <a:t>2/15/2022</a:t>
+              <a:t>2/16/2022</a:t>
             </a:fld>
             <a:endParaRPr lang="en-US"/>
           </a:p>
@@ -7374,7 +8437,7 @@
           <a:p>
             <a:fld id="{08531568-F3BF-464B-B798-39310419FEFD}" type="datetime1">
               <a:rPr lang="en-US" smtClean="0"/>
-              <a:t>2/15/2022</a:t>
+              <a:t>2/16/2022</a:t>
             </a:fld>
             <a:endParaRPr lang="en-US"/>
           </a:p>
@@ -7854,7 +8917,7 @@
           <a:p>
             <a:fld id="{725183BF-A09E-4816-914C-73D9D107D447}" type="datetime1">
               <a:rPr lang="en-US" smtClean="0"/>
-              <a:t>2/15/2022</a:t>
+              <a:t>2/16/2022</a:t>
             </a:fld>
             <a:endParaRPr lang="en-US"/>
           </a:p>
@@ -8098,7 +9161,7 @@
           <a:p>
             <a:fld id="{4B3BA613-CA70-4972-9090-F077F3F0903C}" type="datetime1">
               <a:rPr lang="en-US" smtClean="0"/>
-              <a:t>2/15/2022</a:t>
+              <a:t>2/16/2022</a:t>
             </a:fld>
             <a:endParaRPr lang="en-US"/>
           </a:p>
@@ -13504,12 +14567,12 @@
           <a:chExt cx="0" cy="0"/>
         </a:xfrm>
       </p:grpSpPr>
-      <p:sp>
+      <p:sp useBgFill="1">
         <p:nvSpPr>
-          <p:cNvPr id="70" name="Rectangle 69">
+          <p:cNvPr id="83" name="Rectangle 82">
             <a:extLst>
               <a:ext uri="{FF2B5EF4-FFF2-40B4-BE49-F238E27FC236}">
-                <a16:creationId xmlns:a16="http://schemas.microsoft.com/office/drawing/2014/main" id="{8D06CE56-3881-4ADA-8CEF-D18B02C242A3}"/>
+                <a16:creationId xmlns:a16="http://schemas.microsoft.com/office/drawing/2014/main" id="{1C799903-48D5-4A31-A1A2-541072D9771E}"/>
               </a:ext>
               <a:ext uri="{C183D7F6-B498-43B3-948B-1728B52AA6E4}">
                 <adec:decorative xmlns:adec="http://schemas.microsoft.com/office/drawing/2017/decorative" val="1"/>
@@ -13528,16 +14591,13 @@
           </p:nvPr>
         </p:nvSpPr>
         <p:spPr>
-          <a:xfrm rot="5400000">
-            <a:off x="857544" y="346791"/>
-            <a:ext cx="146304" cy="704088"/>
+          <a:xfrm>
+            <a:off x="0" y="0"/>
+            <a:ext cx="12192002" cy="6858000"/>
           </a:xfrm>
           <a:prstGeom prst="rect">
             <a:avLst/>
           </a:prstGeom>
-          <a:solidFill>
-            <a:schemeClr val="accent1"/>
-          </a:solidFill>
           <a:ln>
             <a:noFill/>
           </a:ln>
@@ -13560,6 +14620,152 @@
         </p:style>
         <p:txBody>
           <a:bodyPr rtlCol="0" anchor="ctr"/>
+          <a:lstStyle/>
+          <a:p>
+            <a:pPr algn="ctr"/>
+            <a:endParaRPr lang="en-US"/>
+          </a:p>
+        </p:txBody>
+      </p:sp>
+      <p:sp useBgFill="1">
+        <p:nvSpPr>
+          <p:cNvPr id="85" name="Freeform: Shape 84">
+            <a:extLst>
+              <a:ext uri="{FF2B5EF4-FFF2-40B4-BE49-F238E27FC236}">
+                <a16:creationId xmlns:a16="http://schemas.microsoft.com/office/drawing/2014/main" id="{8EFFF109-FC58-4FD3-BE05-9775A1310F55}"/>
+              </a:ext>
+              <a:ext uri="{C183D7F6-B498-43B3-948B-1728B52AA6E4}">
+                <adec:decorative xmlns:adec="http://schemas.microsoft.com/office/drawing/2017/decorative" val="1"/>
+              </a:ext>
+            </a:extLst>
+          </p:cNvPr>
+          <p:cNvSpPr>
+            <a:spLocks noGrp="1" noRot="1" noChangeAspect="1" noMove="1" noResize="1" noEditPoints="1" noAdjustHandles="1" noChangeArrowheads="1" noChangeShapeType="1" noTextEdit="1"/>
+          </p:cNvSpPr>
+          <p:nvPr>
+            <p:extLst>
+              <p:ext uri="{386F3935-93C4-4BCD-93E2-E3B085C9AB24}">
+                <p16:designElem xmlns:p16="http://schemas.microsoft.com/office/powerpoint/2015/main" val="1"/>
+              </p:ext>
+            </p:extLst>
+          </p:nvPr>
+        </p:nvSpPr>
+        <p:spPr>
+          <a:xfrm>
+            <a:off x="-1" y="0"/>
+            <a:ext cx="4818889" cy="6858000"/>
+          </a:xfrm>
+          <a:custGeom>
+            <a:avLst/>
+            <a:gdLst>
+              <a:gd name="connsiteX0" fmla="*/ 0 w 4818889"/>
+              <a:gd name="connsiteY0" fmla="*/ 0 h 6858000"/>
+              <a:gd name="connsiteX1" fmla="*/ 3605911 w 4818889"/>
+              <a:gd name="connsiteY1" fmla="*/ 0 h 6858000"/>
+              <a:gd name="connsiteX2" fmla="*/ 3668894 w 4818889"/>
+              <a:gd name="connsiteY2" fmla="*/ 69271 h 6858000"/>
+              <a:gd name="connsiteX3" fmla="*/ 4818889 w 4818889"/>
+              <a:gd name="connsiteY3" fmla="*/ 3429000 h 6858000"/>
+              <a:gd name="connsiteX4" fmla="*/ 3668894 w 4818889"/>
+              <a:gd name="connsiteY4" fmla="*/ 6788730 h 6858000"/>
+              <a:gd name="connsiteX5" fmla="*/ 3605911 w 4818889"/>
+              <a:gd name="connsiteY5" fmla="*/ 6858000 h 6858000"/>
+              <a:gd name="connsiteX6" fmla="*/ 0 w 4818889"/>
+              <a:gd name="connsiteY6" fmla="*/ 6858000 h 6858000"/>
+            </a:gdLst>
+            <a:ahLst/>
+            <a:cxnLst>
+              <a:cxn ang="0">
+                <a:pos x="connsiteX0" y="connsiteY0"/>
+              </a:cxn>
+              <a:cxn ang="0">
+                <a:pos x="connsiteX1" y="connsiteY1"/>
+              </a:cxn>
+              <a:cxn ang="0">
+                <a:pos x="connsiteX2" y="connsiteY2"/>
+              </a:cxn>
+              <a:cxn ang="0">
+                <a:pos x="connsiteX3" y="connsiteY3"/>
+              </a:cxn>
+              <a:cxn ang="0">
+                <a:pos x="connsiteX4" y="connsiteY4"/>
+              </a:cxn>
+              <a:cxn ang="0">
+                <a:pos x="connsiteX5" y="connsiteY5"/>
+              </a:cxn>
+              <a:cxn ang="0">
+                <a:pos x="connsiteX6" y="connsiteY6"/>
+              </a:cxn>
+            </a:cxnLst>
+            <a:rect l="l" t="t" r="r" b="b"/>
+            <a:pathLst>
+              <a:path w="4818889" h="6858000">
+                <a:moveTo>
+                  <a:pt x="0" y="0"/>
+                </a:moveTo>
+                <a:lnTo>
+                  <a:pt x="3605911" y="0"/>
+                </a:lnTo>
+                <a:lnTo>
+                  <a:pt x="3668894" y="69271"/>
+                </a:lnTo>
+                <a:cubicBezTo>
+                  <a:pt x="4379420" y="929100"/>
+                  <a:pt x="4818889" y="2116944"/>
+                  <a:pt x="4818889" y="3429000"/>
+                </a:cubicBezTo>
+                <a:cubicBezTo>
+                  <a:pt x="4818889" y="4741056"/>
+                  <a:pt x="4379420" y="5928900"/>
+                  <a:pt x="3668894" y="6788730"/>
+                </a:cubicBezTo>
+                <a:lnTo>
+                  <a:pt x="3605911" y="6858000"/>
+                </a:lnTo>
+                <a:lnTo>
+                  <a:pt x="0" y="6858000"/>
+                </a:lnTo>
+                <a:close/>
+              </a:path>
+            </a:pathLst>
+          </a:custGeom>
+          <a:ln w="9525">
+            <a:solidFill>
+              <a:schemeClr val="tx2">
+                <a:lumMod val="10000"/>
+                <a:lumOff val="90000"/>
+              </a:schemeClr>
+            </a:solidFill>
+          </a:ln>
+          <a:effectLst>
+            <a:outerShdw blurRad="50800" dist="38100" algn="l" rotWithShape="0">
+              <a:schemeClr val="bg1">
+                <a:lumMod val="85000"/>
+                <a:alpha val="30000"/>
+              </a:schemeClr>
+            </a:outerShdw>
+          </a:effectLst>
+        </p:spPr>
+        <p:style>
+          <a:lnRef idx="2">
+            <a:schemeClr val="accent1">
+              <a:shade val="50000"/>
+            </a:schemeClr>
+          </a:lnRef>
+          <a:fillRef idx="1">
+            <a:schemeClr val="accent1"/>
+          </a:fillRef>
+          <a:effectRef idx="0">
+            <a:schemeClr val="accent1"/>
+          </a:effectRef>
+          <a:fontRef idx="minor">
+            <a:schemeClr val="lt1"/>
+          </a:fontRef>
+        </p:style>
+        <p:txBody>
+          <a:bodyPr wrap="square" rtlCol="0" anchor="ctr">
+            <a:noAutofit/>
+          </a:bodyPr>
           <a:lstStyle/>
           <a:p>
             <a:pPr marL="0" marR="0" lvl="0" indent="0" algn="ctr" defTabSz="914400" rtl="0" eaLnBrk="1" fontAlgn="auto" latinLnBrk="0" hangingPunct="1">
@@ -13596,12 +14802,12 @@
           </a:p>
         </p:txBody>
       </p:sp>
-      <p:sp>
+      <p:sp useBgFill="1">
         <p:nvSpPr>
-          <p:cNvPr id="72" name="Rectangle 71">
+          <p:cNvPr id="87" name="Freeform: Shape 86">
             <a:extLst>
               <a:ext uri="{FF2B5EF4-FFF2-40B4-BE49-F238E27FC236}">
-                <a16:creationId xmlns:a16="http://schemas.microsoft.com/office/drawing/2014/main" id="{79F3C543-62EC-4433-9C93-A2CD8764E9B4}"/>
+                <a16:creationId xmlns:a16="http://schemas.microsoft.com/office/drawing/2014/main" id="{E1B96AD6-92A9-4273-A62B-96A1C3E0BA95}"/>
               </a:ext>
               <a:ext uri="{C183D7F6-B498-43B3-948B-1728B52AA6E4}">
                 <adec:decorative xmlns:adec="http://schemas.microsoft.com/office/drawing/2017/decorative" val="1"/>
@@ -13620,20 +14826,85 @@
           </p:nvPr>
         </p:nvSpPr>
         <p:spPr>
-          <a:xfrm flipV="1">
-            <a:off x="578652" y="4501201"/>
-            <a:ext cx="11034696" cy="18288"/>
+          <a:xfrm>
+            <a:off x="1" y="0"/>
+            <a:ext cx="4811477" cy="6858000"/>
           </a:xfrm>
-          <a:prstGeom prst="rect">
+          <a:custGeom>
             <a:avLst/>
-          </a:prstGeom>
-          <a:solidFill>
-            <a:schemeClr val="tx2">
-              <a:lumMod val="25000"/>
-              <a:lumOff val="75000"/>
-            </a:schemeClr>
-          </a:solidFill>
-          <a:ln w="3175">
+            <a:gdLst>
+              <a:gd name="connsiteX0" fmla="*/ 0 w 4811477"/>
+              <a:gd name="connsiteY0" fmla="*/ 0 h 6858000"/>
+              <a:gd name="connsiteX1" fmla="*/ 3598499 w 4811477"/>
+              <a:gd name="connsiteY1" fmla="*/ 0 h 6858000"/>
+              <a:gd name="connsiteX2" fmla="*/ 3661482 w 4811477"/>
+              <a:gd name="connsiteY2" fmla="*/ 69271 h 6858000"/>
+              <a:gd name="connsiteX3" fmla="*/ 4811477 w 4811477"/>
+              <a:gd name="connsiteY3" fmla="*/ 3429000 h 6858000"/>
+              <a:gd name="connsiteX4" fmla="*/ 3661482 w 4811477"/>
+              <a:gd name="connsiteY4" fmla="*/ 6788730 h 6858000"/>
+              <a:gd name="connsiteX5" fmla="*/ 3598499 w 4811477"/>
+              <a:gd name="connsiteY5" fmla="*/ 6858000 h 6858000"/>
+              <a:gd name="connsiteX6" fmla="*/ 0 w 4811477"/>
+              <a:gd name="connsiteY6" fmla="*/ 6858000 h 6858000"/>
+            </a:gdLst>
+            <a:ahLst/>
+            <a:cxnLst>
+              <a:cxn ang="0">
+                <a:pos x="connsiteX0" y="connsiteY0"/>
+              </a:cxn>
+              <a:cxn ang="0">
+                <a:pos x="connsiteX1" y="connsiteY1"/>
+              </a:cxn>
+              <a:cxn ang="0">
+                <a:pos x="connsiteX2" y="connsiteY2"/>
+              </a:cxn>
+              <a:cxn ang="0">
+                <a:pos x="connsiteX3" y="connsiteY3"/>
+              </a:cxn>
+              <a:cxn ang="0">
+                <a:pos x="connsiteX4" y="connsiteY4"/>
+              </a:cxn>
+              <a:cxn ang="0">
+                <a:pos x="connsiteX5" y="connsiteY5"/>
+              </a:cxn>
+              <a:cxn ang="0">
+                <a:pos x="connsiteX6" y="connsiteY6"/>
+              </a:cxn>
+            </a:cxnLst>
+            <a:rect l="l" t="t" r="r" b="b"/>
+            <a:pathLst>
+              <a:path w="4811477" h="6858000">
+                <a:moveTo>
+                  <a:pt x="0" y="0"/>
+                </a:moveTo>
+                <a:lnTo>
+                  <a:pt x="3598499" y="0"/>
+                </a:lnTo>
+                <a:lnTo>
+                  <a:pt x="3661482" y="69271"/>
+                </a:lnTo>
+                <a:cubicBezTo>
+                  <a:pt x="4372008" y="929100"/>
+                  <a:pt x="4811477" y="2116944"/>
+                  <a:pt x="4811477" y="3429000"/>
+                </a:cubicBezTo>
+                <a:cubicBezTo>
+                  <a:pt x="4811477" y="4741056"/>
+                  <a:pt x="4372008" y="5928900"/>
+                  <a:pt x="3661482" y="6788730"/>
+                </a:cubicBezTo>
+                <a:lnTo>
+                  <a:pt x="3598499" y="6858000"/>
+                </a:lnTo>
+                <a:lnTo>
+                  <a:pt x="0" y="6858000"/>
+                </a:lnTo>
+                <a:close/>
+              </a:path>
+            </a:pathLst>
+          </a:custGeom>
+          <a:ln w="9525">
             <a:noFill/>
           </a:ln>
           <a:effectLst/>
@@ -13655,7 +14926,9 @@
           </a:fontRef>
         </p:style>
         <p:txBody>
-          <a:bodyPr rtlCol="0" anchor="ctr"/>
+          <a:bodyPr wrap="square" rtlCol="0" anchor="ctr">
+            <a:noAutofit/>
+          </a:bodyPr>
           <a:lstStyle/>
           <a:p>
             <a:pPr marL="0" marR="0" lvl="0" indent="0" algn="ctr" defTabSz="914400" rtl="0" eaLnBrk="1" fontAlgn="auto" latinLnBrk="0" hangingPunct="1">
@@ -13692,12 +14965,47 @@
           </a:p>
         </p:txBody>
       </p:sp>
-      <p:sp useBgFill="1">
+      <p:sp>
         <p:nvSpPr>
-          <p:cNvPr id="74" name="Rectangle 73">
+          <p:cNvPr id="2" name="Title 1">
             <a:extLst>
               <a:ext uri="{FF2B5EF4-FFF2-40B4-BE49-F238E27FC236}">
-                <a16:creationId xmlns:a16="http://schemas.microsoft.com/office/drawing/2014/main" id="{68AF5748-FED8-45BA-8631-26D1D10F3246}"/>
+                <a16:creationId xmlns:a16="http://schemas.microsoft.com/office/drawing/2014/main" id="{D8DA8A77-3D5C-4128-8B2B-79B94B6CB9CE}"/>
+              </a:ext>
+            </a:extLst>
+          </p:cNvPr>
+          <p:cNvSpPr>
+            <a:spLocks noGrp="1"/>
+          </p:cNvSpPr>
+          <p:nvPr>
+            <p:ph type="title"/>
+          </p:nvPr>
+        </p:nvSpPr>
+        <p:spPr>
+          <a:xfrm>
+            <a:off x="621792" y="1161288"/>
+            <a:ext cx="3602736" cy="4526280"/>
+          </a:xfrm>
+        </p:spPr>
+        <p:txBody>
+          <a:bodyPr vert="horz" lIns="91440" tIns="45720" rIns="91440" bIns="45720" rtlCol="0">
+            <a:normAutofit/>
+          </a:bodyPr>
+          <a:lstStyle/>
+          <a:p>
+            <a:r>
+              <a:rPr lang="en-US"/>
+              <a:t>Project Opportunity </a:t>
+            </a:r>
+          </a:p>
+        </p:txBody>
+      </p:sp>
+      <p:sp>
+        <p:nvSpPr>
+          <p:cNvPr id="89" name="Rectangle 88">
+            <a:extLst>
+              <a:ext uri="{FF2B5EF4-FFF2-40B4-BE49-F238E27FC236}">
+                <a16:creationId xmlns:a16="http://schemas.microsoft.com/office/drawing/2014/main" id="{463EEC44-1BA3-44ED-81FC-A644B04B2A44}"/>
               </a:ext>
               <a:ext uri="{C183D7F6-B498-43B3-948B-1728B52AA6E4}">
                 <adec:decorative xmlns:adec="http://schemas.microsoft.com/office/drawing/2017/decorative" val="1"/>
@@ -13717,138 +15025,8 @@
         </p:nvSpPr>
         <p:spPr>
           <a:xfrm>
-            <a:off x="0" y="0"/>
-            <a:ext cx="12192000" cy="6858000"/>
-          </a:xfrm>
-          <a:prstGeom prst="rect">
-            <a:avLst/>
-          </a:prstGeom>
-          <a:ln>
-            <a:noFill/>
-          </a:ln>
-        </p:spPr>
-        <p:style>
-          <a:lnRef idx="2">
-            <a:schemeClr val="accent1">
-              <a:shade val="50000"/>
-            </a:schemeClr>
-          </a:lnRef>
-          <a:fillRef idx="1">
-            <a:schemeClr val="accent1"/>
-          </a:fillRef>
-          <a:effectRef idx="0">
-            <a:schemeClr val="accent1"/>
-          </a:effectRef>
-          <a:fontRef idx="minor">
-            <a:schemeClr val="lt1"/>
-          </a:fontRef>
-        </p:style>
-        <p:txBody>
-          <a:bodyPr rtlCol="0" anchor="ctr"/>
-          <a:lstStyle/>
-          <a:p>
-            <a:pPr algn="ctr"/>
-            <a:endParaRPr lang="en-US"/>
-          </a:p>
-        </p:txBody>
-      </p:sp>
-      <p:sp>
-        <p:nvSpPr>
-          <p:cNvPr id="2" name="Title 1">
-            <a:extLst>
-              <a:ext uri="{FF2B5EF4-FFF2-40B4-BE49-F238E27FC236}">
-                <a16:creationId xmlns:a16="http://schemas.microsoft.com/office/drawing/2014/main" id="{D8DA8A77-3D5C-4128-8B2B-79B94B6CB9CE}"/>
-              </a:ext>
-            </a:extLst>
-          </p:cNvPr>
-          <p:cNvSpPr>
-            <a:spLocks noGrp="1"/>
-          </p:cNvSpPr>
-          <p:nvPr>
-            <p:ph type="title"/>
-          </p:nvPr>
-        </p:nvSpPr>
-        <p:spPr>
-          <a:xfrm>
-            <a:off x="477981" y="1122363"/>
-            <a:ext cx="4023360" cy="3204134"/>
-          </a:xfrm>
-        </p:spPr>
-        <p:txBody>
-          <a:bodyPr vert="horz" lIns="91440" tIns="45720" rIns="91440" bIns="45720" rtlCol="0" anchor="b">
-            <a:normAutofit/>
-          </a:bodyPr>
-          <a:lstStyle/>
-          <a:p>
-            <a:r>
-              <a:rPr lang="en-US" sz="4800" dirty="0"/>
-              <a:t>Project Opportunity </a:t>
-            </a:r>
-          </a:p>
-        </p:txBody>
-      </p:sp>
-      <p:sp>
-        <p:nvSpPr>
-          <p:cNvPr id="3" name="Content Placeholder 2">
-            <a:extLst>
-              <a:ext uri="{FF2B5EF4-FFF2-40B4-BE49-F238E27FC236}">
-                <a16:creationId xmlns:a16="http://schemas.microsoft.com/office/drawing/2014/main" id="{F38787CF-E34F-434A-88EB-F854CA168C88}"/>
-              </a:ext>
-            </a:extLst>
-          </p:cNvPr>
-          <p:cNvSpPr>
-            <a:spLocks noGrp="1"/>
-          </p:cNvSpPr>
-          <p:nvPr>
-            <p:ph idx="1"/>
-          </p:nvPr>
-        </p:nvSpPr>
-        <p:spPr>
-          <a:xfrm>
-            <a:off x="477981" y="4872922"/>
-            <a:ext cx="3933306" cy="1208141"/>
-          </a:xfrm>
-        </p:spPr>
-        <p:txBody>
-          <a:bodyPr vert="horz" lIns="91440" tIns="45720" rIns="91440" bIns="45720" rtlCol="0">
-            <a:normAutofit/>
-          </a:bodyPr>
-          <a:lstStyle/>
-          <a:p>
-            <a:pPr marL="0" indent="0">
-              <a:buNone/>
-            </a:pPr>
-            <a:endParaRPr lang="en-US" sz="2000" dirty="0"/>
-          </a:p>
-        </p:txBody>
-      </p:sp>
-      <p:sp>
-        <p:nvSpPr>
-          <p:cNvPr id="76" name="Rectangle 75">
-            <a:extLst>
-              <a:ext uri="{FF2B5EF4-FFF2-40B4-BE49-F238E27FC236}">
-                <a16:creationId xmlns:a16="http://schemas.microsoft.com/office/drawing/2014/main" id="{AF2F604E-43BE-4DC3-B983-E071523364F8}"/>
-              </a:ext>
-              <a:ext uri="{C183D7F6-B498-43B3-948B-1728B52AA6E4}">
-                <adec:decorative xmlns:adec="http://schemas.microsoft.com/office/drawing/2017/decorative" val="1"/>
-              </a:ext>
-            </a:extLst>
-          </p:cNvPr>
-          <p:cNvSpPr>
-            <a:spLocks noGrp="1" noRot="1" noChangeAspect="1" noMove="1" noResize="1" noEditPoints="1" noAdjustHandles="1" noChangeArrowheads="1" noChangeShapeType="1" noTextEdit="1"/>
-          </p:cNvSpPr>
-          <p:nvPr>
-            <p:extLst>
-              <p:ext uri="{386F3935-93C4-4BCD-93E2-E3B085C9AB24}">
-                <p16:designElem xmlns:p16="http://schemas.microsoft.com/office/powerpoint/2015/main" val="1"/>
-              </p:ext>
-            </p:extLst>
-          </p:nvPr>
-        </p:nvSpPr>
-        <p:spPr>
-          <a:xfrm rot="5400000">
-            <a:off x="759921" y="346791"/>
-            <a:ext cx="146304" cy="704088"/>
+            <a:off x="0" y="3102049"/>
+            <a:ext cx="128016" cy="653903"/>
           </a:xfrm>
           <a:prstGeom prst="rect">
             <a:avLst/>
@@ -13916,97 +15094,36 @@
       </p:sp>
       <p:sp>
         <p:nvSpPr>
-          <p:cNvPr id="78" name="Rectangle 77">
+          <p:cNvPr id="3" name="Content Placeholder 2">
             <a:extLst>
               <a:ext uri="{FF2B5EF4-FFF2-40B4-BE49-F238E27FC236}">
-                <a16:creationId xmlns:a16="http://schemas.microsoft.com/office/drawing/2014/main" id="{08C9B587-E65E-4B52-B37C-ABEBB6E87928}"/>
-              </a:ext>
-              <a:ext uri="{C183D7F6-B498-43B3-948B-1728B52AA6E4}">
-                <adec:decorative xmlns:adec="http://schemas.microsoft.com/office/drawing/2017/decorative" val="1"/>
+                <a16:creationId xmlns:a16="http://schemas.microsoft.com/office/drawing/2014/main" id="{F38787CF-E34F-434A-88EB-F854CA168C88}"/>
               </a:ext>
             </a:extLst>
           </p:cNvPr>
           <p:cNvSpPr>
-            <a:spLocks noGrp="1" noRot="1" noChangeAspect="1" noMove="1" noResize="1" noEditPoints="1" noAdjustHandles="1" noChangeArrowheads="1" noChangeShapeType="1" noTextEdit="1"/>
+            <a:spLocks noGrp="1"/>
           </p:cNvSpPr>
           <p:nvPr>
-            <p:extLst>
-              <p:ext uri="{386F3935-93C4-4BCD-93E2-E3B085C9AB24}">
-                <p16:designElem xmlns:p16="http://schemas.microsoft.com/office/powerpoint/2015/main" val="1"/>
-              </p:ext>
-            </p:extLst>
+            <p:ph idx="1"/>
           </p:nvPr>
         </p:nvSpPr>
         <p:spPr>
           <a:xfrm>
-            <a:off x="481029" y="4546920"/>
-            <a:ext cx="4023360" cy="18288"/>
+            <a:off x="5434149" y="932688"/>
+            <a:ext cx="5916603" cy="4992624"/>
           </a:xfrm>
-          <a:prstGeom prst="rect">
-            <a:avLst/>
-          </a:prstGeom>
-          <a:solidFill>
-            <a:schemeClr val="tx2">
-              <a:lumMod val="25000"/>
-              <a:lumOff val="75000"/>
-            </a:schemeClr>
-          </a:solidFill>
-          <a:ln w="3175">
-            <a:noFill/>
-          </a:ln>
-          <a:effectLst/>
         </p:spPr>
-        <p:style>
-          <a:lnRef idx="2">
-            <a:schemeClr val="accent1">
-              <a:shade val="50000"/>
-            </a:schemeClr>
-          </a:lnRef>
-          <a:fillRef idx="1">
-            <a:schemeClr val="accent1"/>
-          </a:fillRef>
-          <a:effectRef idx="0">
-            <a:schemeClr val="accent1"/>
-          </a:effectRef>
-          <a:fontRef idx="minor">
-            <a:schemeClr val="lt1"/>
-          </a:fontRef>
-        </p:style>
         <p:txBody>
-          <a:bodyPr rtlCol="0" anchor="ctr"/>
+          <a:bodyPr vert="horz" lIns="91440" tIns="45720" rIns="91440" bIns="45720" rtlCol="0" anchor="ctr">
+            <a:normAutofit/>
+          </a:bodyPr>
           <a:lstStyle/>
           <a:p>
-            <a:pPr marL="0" marR="0" lvl="0" indent="0" algn="ctr" defTabSz="914400" rtl="0" eaLnBrk="1" fontAlgn="auto" latinLnBrk="0" hangingPunct="1">
-              <a:lnSpc>
-                <a:spcPct val="100000"/>
-              </a:lnSpc>
-              <a:spcBef>
-                <a:spcPts val="0"/>
-              </a:spcBef>
-              <a:spcAft>
-                <a:spcPts val="0"/>
-              </a:spcAft>
-              <a:buClrTx/>
-              <a:buSzTx/>
-              <a:buFontTx/>
+            <a:pPr marL="0" indent="0">
               <a:buNone/>
-              <a:tabLst/>
-              <a:defRPr/>
             </a:pPr>
-            <a:endParaRPr kumimoji="0" lang="en-US" sz="1800" b="0" i="0" u="none" strike="noStrike" kern="1200" cap="none" spc="0" normalizeH="0" baseline="0" noProof="0">
-              <a:ln>
-                <a:noFill/>
-              </a:ln>
-              <a:solidFill>
-                <a:prstClr val="white"/>
-              </a:solidFill>
-              <a:effectLst/>
-              <a:uLnTx/>
-              <a:uFillTx/>
-              <a:latin typeface="Calibri" panose="020F0502020204030204"/>
-              <a:ea typeface="+mn-ea"/>
-              <a:cs typeface="+mn-cs"/>
-            </a:endParaRPr>
+            <a:endParaRPr lang="en-US" sz="2000" dirty="0"/>
           </a:p>
         </p:txBody>
       </p:sp>
@@ -14028,12 +15145,12 @@
         </p:nvSpPr>
         <p:spPr>
           <a:xfrm>
-            <a:off x="4864608" y="6356350"/>
-            <a:ext cx="4114800" cy="365125"/>
+            <a:off x="5434147" y="6356350"/>
+            <a:ext cx="4572000" cy="365125"/>
           </a:xfrm>
         </p:spPr>
         <p:txBody>
-          <a:bodyPr vert="horz" lIns="91440" tIns="45720" rIns="91440" bIns="45720" rtlCol="0" anchor="ctr">
+          <a:bodyPr vert="horz" lIns="91440" tIns="45720" rIns="91440" bIns="45720" rtlCol="0">
             <a:normAutofit/>
           </a:bodyPr>
           <a:lstStyle/>
@@ -14057,12 +15174,6 @@
                 <a:ln>
                   <a:noFill/>
                 </a:ln>
-                <a:solidFill>
-                  <a:schemeClr val="tx2">
-                    <a:lumMod val="50000"/>
-                    <a:lumOff val="50000"/>
-                  </a:schemeClr>
-                </a:solidFill>
                 <a:effectLst/>
                 <a:uLnTx/>
                 <a:uFillTx/>
@@ -14093,12 +15204,12 @@
         </p:nvSpPr>
         <p:spPr>
           <a:xfrm>
-            <a:off x="9926319" y="6356350"/>
-            <a:ext cx="1787699" cy="365125"/>
+            <a:off x="10351362" y="6356350"/>
+            <a:ext cx="1002437" cy="365125"/>
           </a:xfrm>
         </p:spPr>
         <p:txBody>
-          <a:bodyPr vert="horz" lIns="91440" tIns="45720" rIns="91440" bIns="45720" rtlCol="0" anchor="ctr">
+          <a:bodyPr vert="horz" lIns="91440" tIns="45720" rIns="91440" bIns="45720" rtlCol="0">
             <a:normAutofit/>
           </a:bodyPr>
           <a:lstStyle/>
@@ -14122,12 +15233,6 @@
                 <a:ln>
                   <a:noFill/>
                 </a:ln>
-                <a:solidFill>
-                  <a:schemeClr val="tx2">
-                    <a:lumMod val="50000"/>
-                    <a:lumOff val="50000"/>
-                  </a:schemeClr>
-                </a:solidFill>
                 <a:effectLst/>
                 <a:uLnTx/>
                 <a:uFillTx/>
@@ -14152,12 +15257,6 @@
               <a:ln>
                 <a:noFill/>
               </a:ln>
-              <a:solidFill>
-                <a:schemeClr val="tx2">
-                  <a:lumMod val="50000"/>
-                  <a:lumOff val="50000"/>
-                </a:schemeClr>
-              </a:solidFill>
               <a:effectLst/>
               <a:uLnTx/>
               <a:uFillTx/>
@@ -14295,750 +15394,9 @@
           <a:chExt cx="0" cy="0"/>
         </a:xfrm>
       </p:grpSpPr>
-      <p:sp useBgFill="1">
-        <p:nvSpPr>
-          <p:cNvPr id="7" name="Rectangle 9">
-            <a:extLst>
-              <a:ext uri="{FF2B5EF4-FFF2-40B4-BE49-F238E27FC236}">
-                <a16:creationId xmlns:a16="http://schemas.microsoft.com/office/drawing/2014/main" id="{1C799903-48D5-4A31-A1A2-541072D9771E}"/>
-              </a:ext>
-              <a:ext uri="{C183D7F6-B498-43B3-948B-1728B52AA6E4}">
-                <adec:decorative xmlns:adec="http://schemas.microsoft.com/office/drawing/2017/decorative" val="1"/>
-              </a:ext>
-            </a:extLst>
-          </p:cNvPr>
-          <p:cNvSpPr>
-            <a:spLocks noGrp="1" noRot="1" noChangeAspect="1" noMove="1" noResize="1" noEditPoints="1" noAdjustHandles="1" noChangeArrowheads="1" noChangeShapeType="1" noTextEdit="1"/>
-          </p:cNvSpPr>
-          <p:nvPr>
-            <p:extLst>
-              <p:ext uri="{386F3935-93C4-4BCD-93E2-E3B085C9AB24}">
-                <p16:designElem xmlns:p16="http://schemas.microsoft.com/office/powerpoint/2015/main" val="1"/>
-              </p:ext>
-            </p:extLst>
-          </p:nvPr>
-        </p:nvSpPr>
-        <p:spPr>
-          <a:xfrm>
-            <a:off x="0" y="0"/>
-            <a:ext cx="12192002" cy="6858000"/>
-          </a:xfrm>
-          <a:prstGeom prst="rect">
-            <a:avLst/>
-          </a:prstGeom>
-          <a:ln>
-            <a:noFill/>
-          </a:ln>
-        </p:spPr>
-        <p:style>
-          <a:lnRef idx="2">
-            <a:schemeClr val="accent1">
-              <a:shade val="50000"/>
-            </a:schemeClr>
-          </a:lnRef>
-          <a:fillRef idx="1">
-            <a:schemeClr val="accent1"/>
-          </a:fillRef>
-          <a:effectRef idx="0">
-            <a:schemeClr val="accent1"/>
-          </a:effectRef>
-          <a:fontRef idx="minor">
-            <a:schemeClr val="lt1"/>
-          </a:fontRef>
-        </p:style>
-        <p:txBody>
-          <a:bodyPr rtlCol="0" anchor="ctr"/>
-          <a:lstStyle/>
-          <a:p>
-            <a:pPr algn="ctr"/>
-            <a:endParaRPr lang="en-US"/>
-          </a:p>
-        </p:txBody>
-      </p:sp>
-      <p:sp useBgFill="1">
-        <p:nvSpPr>
-          <p:cNvPr id="9" name="Freeform: Shape 11">
-            <a:extLst>
-              <a:ext uri="{FF2B5EF4-FFF2-40B4-BE49-F238E27FC236}">
-                <a16:creationId xmlns:a16="http://schemas.microsoft.com/office/drawing/2014/main" id="{8EFFF109-FC58-4FD3-BE05-9775A1310F55}"/>
-              </a:ext>
-              <a:ext uri="{C183D7F6-B498-43B3-948B-1728B52AA6E4}">
-                <adec:decorative xmlns:adec="http://schemas.microsoft.com/office/drawing/2017/decorative" val="1"/>
-              </a:ext>
-            </a:extLst>
-          </p:cNvPr>
-          <p:cNvSpPr>
-            <a:spLocks noGrp="1" noRot="1" noChangeAspect="1" noMove="1" noResize="1" noEditPoints="1" noAdjustHandles="1" noChangeArrowheads="1" noChangeShapeType="1" noTextEdit="1"/>
-          </p:cNvSpPr>
-          <p:nvPr>
-            <p:extLst>
-              <p:ext uri="{386F3935-93C4-4BCD-93E2-E3B085C9AB24}">
-                <p16:designElem xmlns:p16="http://schemas.microsoft.com/office/powerpoint/2015/main" val="1"/>
-              </p:ext>
-            </p:extLst>
-          </p:nvPr>
-        </p:nvSpPr>
-        <p:spPr>
-          <a:xfrm>
-            <a:off x="-1" y="0"/>
-            <a:ext cx="4818889" cy="6858000"/>
-          </a:xfrm>
-          <a:custGeom>
-            <a:avLst/>
-            <a:gdLst>
-              <a:gd name="connsiteX0" fmla="*/ 0 w 4818889"/>
-              <a:gd name="connsiteY0" fmla="*/ 0 h 6858000"/>
-              <a:gd name="connsiteX1" fmla="*/ 3605911 w 4818889"/>
-              <a:gd name="connsiteY1" fmla="*/ 0 h 6858000"/>
-              <a:gd name="connsiteX2" fmla="*/ 3668894 w 4818889"/>
-              <a:gd name="connsiteY2" fmla="*/ 69271 h 6858000"/>
-              <a:gd name="connsiteX3" fmla="*/ 4818889 w 4818889"/>
-              <a:gd name="connsiteY3" fmla="*/ 3429000 h 6858000"/>
-              <a:gd name="connsiteX4" fmla="*/ 3668894 w 4818889"/>
-              <a:gd name="connsiteY4" fmla="*/ 6788730 h 6858000"/>
-              <a:gd name="connsiteX5" fmla="*/ 3605911 w 4818889"/>
-              <a:gd name="connsiteY5" fmla="*/ 6858000 h 6858000"/>
-              <a:gd name="connsiteX6" fmla="*/ 0 w 4818889"/>
-              <a:gd name="connsiteY6" fmla="*/ 6858000 h 6858000"/>
-            </a:gdLst>
-            <a:ahLst/>
-            <a:cxnLst>
-              <a:cxn ang="0">
-                <a:pos x="connsiteX0" y="connsiteY0"/>
-              </a:cxn>
-              <a:cxn ang="0">
-                <a:pos x="connsiteX1" y="connsiteY1"/>
-              </a:cxn>
-              <a:cxn ang="0">
-                <a:pos x="connsiteX2" y="connsiteY2"/>
-              </a:cxn>
-              <a:cxn ang="0">
-                <a:pos x="connsiteX3" y="connsiteY3"/>
-              </a:cxn>
-              <a:cxn ang="0">
-                <a:pos x="connsiteX4" y="connsiteY4"/>
-              </a:cxn>
-              <a:cxn ang="0">
-                <a:pos x="connsiteX5" y="connsiteY5"/>
-              </a:cxn>
-              <a:cxn ang="0">
-                <a:pos x="connsiteX6" y="connsiteY6"/>
-              </a:cxn>
-            </a:cxnLst>
-            <a:rect l="l" t="t" r="r" b="b"/>
-            <a:pathLst>
-              <a:path w="4818889" h="6858000">
-                <a:moveTo>
-                  <a:pt x="0" y="0"/>
-                </a:moveTo>
-                <a:lnTo>
-                  <a:pt x="3605911" y="0"/>
-                </a:lnTo>
-                <a:lnTo>
-                  <a:pt x="3668894" y="69271"/>
-                </a:lnTo>
-                <a:cubicBezTo>
-                  <a:pt x="4379420" y="929100"/>
-                  <a:pt x="4818889" y="2116944"/>
-                  <a:pt x="4818889" y="3429000"/>
-                </a:cubicBezTo>
-                <a:cubicBezTo>
-                  <a:pt x="4818889" y="4741056"/>
-                  <a:pt x="4379420" y="5928900"/>
-                  <a:pt x="3668894" y="6788730"/>
-                </a:cubicBezTo>
-                <a:lnTo>
-                  <a:pt x="3605911" y="6858000"/>
-                </a:lnTo>
-                <a:lnTo>
-                  <a:pt x="0" y="6858000"/>
-                </a:lnTo>
-                <a:close/>
-              </a:path>
-            </a:pathLst>
-          </a:custGeom>
-          <a:ln w="9525">
-            <a:solidFill>
-              <a:schemeClr val="tx2">
-                <a:lumMod val="10000"/>
-                <a:lumOff val="90000"/>
-              </a:schemeClr>
-            </a:solidFill>
-          </a:ln>
-          <a:effectLst>
-            <a:outerShdw blurRad="50800" dist="38100" algn="l" rotWithShape="0">
-              <a:schemeClr val="bg1">
-                <a:lumMod val="85000"/>
-                <a:alpha val="30000"/>
-              </a:schemeClr>
-            </a:outerShdw>
-          </a:effectLst>
-        </p:spPr>
-        <p:style>
-          <a:lnRef idx="2">
-            <a:schemeClr val="accent1">
-              <a:shade val="50000"/>
-            </a:schemeClr>
-          </a:lnRef>
-          <a:fillRef idx="1">
-            <a:schemeClr val="accent1"/>
-          </a:fillRef>
-          <a:effectRef idx="0">
-            <a:schemeClr val="accent1"/>
-          </a:effectRef>
-          <a:fontRef idx="minor">
-            <a:schemeClr val="lt1"/>
-          </a:fontRef>
-        </p:style>
-        <p:txBody>
-          <a:bodyPr wrap="square" rtlCol="0" anchor="ctr">
-            <a:noAutofit/>
-          </a:bodyPr>
-          <a:lstStyle/>
-          <a:p>
-            <a:pPr marL="0" marR="0" lvl="0" indent="0" algn="ctr" defTabSz="914400" rtl="0" eaLnBrk="1" fontAlgn="auto" latinLnBrk="0" hangingPunct="1">
-              <a:lnSpc>
-                <a:spcPct val="100000"/>
-              </a:lnSpc>
-              <a:spcBef>
-                <a:spcPts val="0"/>
-              </a:spcBef>
-              <a:spcAft>
-                <a:spcPts val="0"/>
-              </a:spcAft>
-              <a:buClrTx/>
-              <a:buSzTx/>
-              <a:buFontTx/>
-              <a:buNone/>
-              <a:tabLst/>
-              <a:defRPr/>
-            </a:pPr>
-            <a:endParaRPr kumimoji="0" lang="en-US" sz="1800" b="0" i="0" u="none" strike="noStrike" kern="1200" cap="none" spc="0" normalizeH="0" baseline="0" noProof="0">
-              <a:ln>
-                <a:noFill/>
-              </a:ln>
-              <a:solidFill>
-                <a:prstClr val="white"/>
-              </a:solidFill>
-              <a:effectLst/>
-              <a:uLnTx/>
-              <a:uFillTx/>
-              <a:latin typeface="Calibri" panose="020F0502020204030204"/>
-              <a:ea typeface="+mn-ea"/>
-              <a:cs typeface="+mn-cs"/>
-            </a:endParaRPr>
-          </a:p>
-        </p:txBody>
-      </p:sp>
-      <p:sp useBgFill="1">
-        <p:nvSpPr>
-          <p:cNvPr id="11" name="Freeform: Shape 13">
-            <a:extLst>
-              <a:ext uri="{FF2B5EF4-FFF2-40B4-BE49-F238E27FC236}">
-                <a16:creationId xmlns:a16="http://schemas.microsoft.com/office/drawing/2014/main" id="{E1B96AD6-92A9-4273-A62B-96A1C3E0BA95}"/>
-              </a:ext>
-              <a:ext uri="{C183D7F6-B498-43B3-948B-1728B52AA6E4}">
-                <adec:decorative xmlns:adec="http://schemas.microsoft.com/office/drawing/2017/decorative" val="1"/>
-              </a:ext>
-            </a:extLst>
-          </p:cNvPr>
-          <p:cNvSpPr>
-            <a:spLocks noGrp="1" noRot="1" noChangeAspect="1" noMove="1" noResize="1" noEditPoints="1" noAdjustHandles="1" noChangeArrowheads="1" noChangeShapeType="1" noTextEdit="1"/>
-          </p:cNvSpPr>
-          <p:nvPr>
-            <p:extLst>
-              <p:ext uri="{386F3935-93C4-4BCD-93E2-E3B085C9AB24}">
-                <p16:designElem xmlns:p16="http://schemas.microsoft.com/office/powerpoint/2015/main" val="1"/>
-              </p:ext>
-            </p:extLst>
-          </p:nvPr>
-        </p:nvSpPr>
-        <p:spPr>
-          <a:xfrm>
-            <a:off x="1" y="0"/>
-            <a:ext cx="4811477" cy="6858000"/>
-          </a:xfrm>
-          <a:custGeom>
-            <a:avLst/>
-            <a:gdLst>
-              <a:gd name="connsiteX0" fmla="*/ 0 w 4811477"/>
-              <a:gd name="connsiteY0" fmla="*/ 0 h 6858000"/>
-              <a:gd name="connsiteX1" fmla="*/ 3598499 w 4811477"/>
-              <a:gd name="connsiteY1" fmla="*/ 0 h 6858000"/>
-              <a:gd name="connsiteX2" fmla="*/ 3661482 w 4811477"/>
-              <a:gd name="connsiteY2" fmla="*/ 69271 h 6858000"/>
-              <a:gd name="connsiteX3" fmla="*/ 4811477 w 4811477"/>
-              <a:gd name="connsiteY3" fmla="*/ 3429000 h 6858000"/>
-              <a:gd name="connsiteX4" fmla="*/ 3661482 w 4811477"/>
-              <a:gd name="connsiteY4" fmla="*/ 6788730 h 6858000"/>
-              <a:gd name="connsiteX5" fmla="*/ 3598499 w 4811477"/>
-              <a:gd name="connsiteY5" fmla="*/ 6858000 h 6858000"/>
-              <a:gd name="connsiteX6" fmla="*/ 0 w 4811477"/>
-              <a:gd name="connsiteY6" fmla="*/ 6858000 h 6858000"/>
-            </a:gdLst>
-            <a:ahLst/>
-            <a:cxnLst>
-              <a:cxn ang="0">
-                <a:pos x="connsiteX0" y="connsiteY0"/>
-              </a:cxn>
-              <a:cxn ang="0">
-                <a:pos x="connsiteX1" y="connsiteY1"/>
-              </a:cxn>
-              <a:cxn ang="0">
-                <a:pos x="connsiteX2" y="connsiteY2"/>
-              </a:cxn>
-              <a:cxn ang="0">
-                <a:pos x="connsiteX3" y="connsiteY3"/>
-              </a:cxn>
-              <a:cxn ang="0">
-                <a:pos x="connsiteX4" y="connsiteY4"/>
-              </a:cxn>
-              <a:cxn ang="0">
-                <a:pos x="connsiteX5" y="connsiteY5"/>
-              </a:cxn>
-              <a:cxn ang="0">
-                <a:pos x="connsiteX6" y="connsiteY6"/>
-              </a:cxn>
-            </a:cxnLst>
-            <a:rect l="l" t="t" r="r" b="b"/>
-            <a:pathLst>
-              <a:path w="4811477" h="6858000">
-                <a:moveTo>
-                  <a:pt x="0" y="0"/>
-                </a:moveTo>
-                <a:lnTo>
-                  <a:pt x="3598499" y="0"/>
-                </a:lnTo>
-                <a:lnTo>
-                  <a:pt x="3661482" y="69271"/>
-                </a:lnTo>
-                <a:cubicBezTo>
-                  <a:pt x="4372008" y="929100"/>
-                  <a:pt x="4811477" y="2116944"/>
-                  <a:pt x="4811477" y="3429000"/>
-                </a:cubicBezTo>
-                <a:cubicBezTo>
-                  <a:pt x="4811477" y="4741056"/>
-                  <a:pt x="4372008" y="5928900"/>
-                  <a:pt x="3661482" y="6788730"/>
-                </a:cubicBezTo>
-                <a:lnTo>
-                  <a:pt x="3598499" y="6858000"/>
-                </a:lnTo>
-                <a:lnTo>
-                  <a:pt x="0" y="6858000"/>
-                </a:lnTo>
-                <a:close/>
-              </a:path>
-            </a:pathLst>
-          </a:custGeom>
-          <a:ln w="9525">
-            <a:noFill/>
-          </a:ln>
-          <a:effectLst/>
-        </p:spPr>
-        <p:style>
-          <a:lnRef idx="2">
-            <a:schemeClr val="accent1">
-              <a:shade val="50000"/>
-            </a:schemeClr>
-          </a:lnRef>
-          <a:fillRef idx="1">
-            <a:schemeClr val="accent1"/>
-          </a:fillRef>
-          <a:effectRef idx="0">
-            <a:schemeClr val="accent1"/>
-          </a:effectRef>
-          <a:fontRef idx="minor">
-            <a:schemeClr val="lt1"/>
-          </a:fontRef>
-        </p:style>
-        <p:txBody>
-          <a:bodyPr wrap="square" rtlCol="0" anchor="ctr">
-            <a:noAutofit/>
-          </a:bodyPr>
-          <a:lstStyle/>
-          <a:p>
-            <a:pPr marL="0" marR="0" lvl="0" indent="0" algn="ctr" defTabSz="914400" rtl="0" eaLnBrk="1" fontAlgn="auto" latinLnBrk="0" hangingPunct="1">
-              <a:lnSpc>
-                <a:spcPct val="100000"/>
-              </a:lnSpc>
-              <a:spcBef>
-                <a:spcPts val="0"/>
-              </a:spcBef>
-              <a:spcAft>
-                <a:spcPts val="0"/>
-              </a:spcAft>
-              <a:buClrTx/>
-              <a:buSzTx/>
-              <a:buFontTx/>
-              <a:buNone/>
-              <a:tabLst/>
-              <a:defRPr/>
-            </a:pPr>
-            <a:endParaRPr kumimoji="0" lang="en-US" sz="1800" b="0" i="0" u="none" strike="noStrike" kern="1200" cap="none" spc="0" normalizeH="0" baseline="0" noProof="0">
-              <a:ln>
-                <a:noFill/>
-              </a:ln>
-              <a:solidFill>
-                <a:prstClr val="white"/>
-              </a:solidFill>
-              <a:effectLst/>
-              <a:uLnTx/>
-              <a:uFillTx/>
-              <a:latin typeface="Calibri" panose="020F0502020204030204"/>
-              <a:ea typeface="+mn-ea"/>
-              <a:cs typeface="+mn-cs"/>
-            </a:endParaRPr>
-          </a:p>
-        </p:txBody>
-      </p:sp>
       <p:sp>
         <p:nvSpPr>
-          <p:cNvPr id="2" name="Title 1">
-            <a:extLst>
-              <a:ext uri="{FF2B5EF4-FFF2-40B4-BE49-F238E27FC236}">
-                <a16:creationId xmlns:a16="http://schemas.microsoft.com/office/drawing/2014/main" id="{D5DB5DBF-0759-49DD-8EB7-B5D09D6500EC}"/>
-              </a:ext>
-            </a:extLst>
-          </p:cNvPr>
-          <p:cNvSpPr>
-            <a:spLocks noGrp="1"/>
-          </p:cNvSpPr>
-          <p:nvPr>
-            <p:ph type="title"/>
-          </p:nvPr>
-        </p:nvSpPr>
-        <p:spPr>
-          <a:xfrm>
-            <a:off x="621792" y="1161288"/>
-            <a:ext cx="3602736" cy="4526280"/>
-          </a:xfrm>
-        </p:spPr>
-        <p:txBody>
-          <a:bodyPr>
-            <a:normAutofit/>
-          </a:bodyPr>
-          <a:lstStyle/>
-          <a:p>
-            <a:r>
-              <a:rPr lang="en-US" dirty="0"/>
-              <a:t>Project Sketch </a:t>
-            </a:r>
-          </a:p>
-        </p:txBody>
-      </p:sp>
-      <p:sp>
-        <p:nvSpPr>
-          <p:cNvPr id="16" name="Rectangle 15">
-            <a:extLst>
-              <a:ext uri="{FF2B5EF4-FFF2-40B4-BE49-F238E27FC236}">
-                <a16:creationId xmlns:a16="http://schemas.microsoft.com/office/drawing/2014/main" id="{463EEC44-1BA3-44ED-81FC-A644B04B2A44}"/>
-              </a:ext>
-              <a:ext uri="{C183D7F6-B498-43B3-948B-1728B52AA6E4}">
-                <adec:decorative xmlns:adec="http://schemas.microsoft.com/office/drawing/2017/decorative" val="1"/>
-              </a:ext>
-            </a:extLst>
-          </p:cNvPr>
-          <p:cNvSpPr>
-            <a:spLocks noGrp="1" noRot="1" noChangeAspect="1" noMove="1" noResize="1" noEditPoints="1" noAdjustHandles="1" noChangeArrowheads="1" noChangeShapeType="1" noTextEdit="1"/>
-          </p:cNvSpPr>
-          <p:nvPr>
-            <p:extLst>
-              <p:ext uri="{386F3935-93C4-4BCD-93E2-E3B085C9AB24}">
-                <p16:designElem xmlns:p16="http://schemas.microsoft.com/office/powerpoint/2015/main" val="1"/>
-              </p:ext>
-            </p:extLst>
-          </p:nvPr>
-        </p:nvSpPr>
-        <p:spPr>
-          <a:xfrm>
-            <a:off x="0" y="3102049"/>
-            <a:ext cx="128016" cy="653903"/>
-          </a:xfrm>
-          <a:prstGeom prst="rect">
-            <a:avLst/>
-          </a:prstGeom>
-          <a:solidFill>
-            <a:schemeClr val="accent1"/>
-          </a:solidFill>
-          <a:ln>
-            <a:noFill/>
-          </a:ln>
-        </p:spPr>
-        <p:style>
-          <a:lnRef idx="2">
-            <a:schemeClr val="accent1">
-              <a:shade val="50000"/>
-            </a:schemeClr>
-          </a:lnRef>
-          <a:fillRef idx="1">
-            <a:schemeClr val="accent1"/>
-          </a:fillRef>
-          <a:effectRef idx="0">
-            <a:schemeClr val="accent1"/>
-          </a:effectRef>
-          <a:fontRef idx="minor">
-            <a:schemeClr val="lt1"/>
-          </a:fontRef>
-        </p:style>
-        <p:txBody>
-          <a:bodyPr rtlCol="0" anchor="ctr"/>
-          <a:lstStyle/>
-          <a:p>
-            <a:pPr marL="0" marR="0" lvl="0" indent="0" algn="ctr" defTabSz="914400" rtl="0" eaLnBrk="1" fontAlgn="auto" latinLnBrk="0" hangingPunct="1">
-              <a:lnSpc>
-                <a:spcPct val="100000"/>
-              </a:lnSpc>
-              <a:spcBef>
-                <a:spcPts val="0"/>
-              </a:spcBef>
-              <a:spcAft>
-                <a:spcPts val="0"/>
-              </a:spcAft>
-              <a:buClrTx/>
-              <a:buSzTx/>
-              <a:buFontTx/>
-              <a:buNone/>
-              <a:tabLst/>
-              <a:defRPr/>
-            </a:pPr>
-            <a:endParaRPr kumimoji="0" lang="en-US" sz="1800" b="0" i="0" u="none" strike="noStrike" kern="1200" cap="none" spc="0" normalizeH="0" baseline="0" noProof="0">
-              <a:ln>
-                <a:noFill/>
-              </a:ln>
-              <a:solidFill>
-                <a:prstClr val="white"/>
-              </a:solidFill>
-              <a:effectLst/>
-              <a:uLnTx/>
-              <a:uFillTx/>
-              <a:latin typeface="Calibri" panose="020F0502020204030204"/>
-              <a:ea typeface="+mn-ea"/>
-              <a:cs typeface="+mn-cs"/>
-            </a:endParaRPr>
-          </a:p>
-        </p:txBody>
-      </p:sp>
-      <p:sp>
-        <p:nvSpPr>
-          <p:cNvPr id="3" name="Content Placeholder 2">
-            <a:extLst>
-              <a:ext uri="{FF2B5EF4-FFF2-40B4-BE49-F238E27FC236}">
-                <a16:creationId xmlns:a16="http://schemas.microsoft.com/office/drawing/2014/main" id="{6F020079-CAA6-47D7-86A5-6EE4E5AFFF65}"/>
-              </a:ext>
-            </a:extLst>
-          </p:cNvPr>
-          <p:cNvSpPr>
-            <a:spLocks noGrp="1"/>
-          </p:cNvSpPr>
-          <p:nvPr>
-            <p:ph idx="1"/>
-          </p:nvPr>
-        </p:nvSpPr>
-        <p:spPr>
-          <a:xfrm>
-            <a:off x="5434149" y="932688"/>
-            <a:ext cx="5916603" cy="4992624"/>
-          </a:xfrm>
-        </p:spPr>
-        <p:txBody>
-          <a:bodyPr anchor="ctr">
-            <a:normAutofit/>
-          </a:bodyPr>
-          <a:lstStyle/>
-          <a:p>
-            <a:pPr marL="0" indent="0">
-              <a:buNone/>
-            </a:pPr>
-            <a:endParaRPr lang="en-US" sz="2000" dirty="0"/>
-          </a:p>
-        </p:txBody>
-      </p:sp>
-      <p:sp>
-        <p:nvSpPr>
-          <p:cNvPr id="4" name="Footer Placeholder 3">
-            <a:extLst>
-              <a:ext uri="{FF2B5EF4-FFF2-40B4-BE49-F238E27FC236}">
-                <a16:creationId xmlns:a16="http://schemas.microsoft.com/office/drawing/2014/main" id="{8CA1E675-9E0E-453C-912A-F3A6E3DE5FA7}"/>
-              </a:ext>
-            </a:extLst>
-          </p:cNvPr>
-          <p:cNvSpPr>
-            <a:spLocks noGrp="1"/>
-          </p:cNvSpPr>
-          <p:nvPr>
-            <p:ph type="ftr" sz="quarter" idx="11"/>
-          </p:nvPr>
-        </p:nvSpPr>
-        <p:spPr>
-          <a:xfrm>
-            <a:off x="5434147" y="6356350"/>
-            <a:ext cx="4572000" cy="365125"/>
-          </a:xfrm>
-        </p:spPr>
-        <p:txBody>
-          <a:bodyPr>
-            <a:normAutofit/>
-          </a:bodyPr>
-          <a:lstStyle/>
-          <a:p>
-            <a:pPr marL="0" marR="0" lvl="0" indent="0" algn="l" defTabSz="914400" rtl="0" eaLnBrk="1" fontAlgn="auto" latinLnBrk="0" hangingPunct="1">
-              <a:spcBef>
-                <a:spcPts val="0"/>
-              </a:spcBef>
-              <a:spcAft>
-                <a:spcPts val="600"/>
-              </a:spcAft>
-              <a:buClrTx/>
-              <a:buSzTx/>
-              <a:buFontTx/>
-              <a:buNone/>
-              <a:tabLst/>
-              <a:defRPr/>
-            </a:pPr>
-            <a:r>
-              <a:rPr kumimoji="0" lang="en-US" b="0" i="0" u="none" strike="noStrike" kern="1200" cap="none" spc="0" normalizeH="0" baseline="0" noProof="0">
-                <a:ln>
-                  <a:noFill/>
-                </a:ln>
-                <a:effectLst/>
-                <a:uLnTx/>
-                <a:uFillTx/>
-                <a:latin typeface="Avenir Next LT Pro"/>
-                <a:ea typeface="+mn-ea"/>
-                <a:cs typeface="+mn-cs"/>
-              </a:rPr>
-              <a:t>Erik Manis</a:t>
-            </a:r>
-          </a:p>
-        </p:txBody>
-      </p:sp>
-      <p:sp>
-        <p:nvSpPr>
-          <p:cNvPr id="5" name="Slide Number Placeholder 4">
-            <a:extLst>
-              <a:ext uri="{FF2B5EF4-FFF2-40B4-BE49-F238E27FC236}">
-                <a16:creationId xmlns:a16="http://schemas.microsoft.com/office/drawing/2014/main" id="{110D54E4-2654-4905-AD29-DAF52E0E1FBB}"/>
-              </a:ext>
-            </a:extLst>
-          </p:cNvPr>
-          <p:cNvSpPr>
-            <a:spLocks noGrp="1"/>
-          </p:cNvSpPr>
-          <p:nvPr>
-            <p:ph type="sldNum" sz="quarter" idx="12"/>
-          </p:nvPr>
-        </p:nvSpPr>
-        <p:spPr>
-          <a:xfrm>
-            <a:off x="10351362" y="6356350"/>
-            <a:ext cx="1002437" cy="365125"/>
-          </a:xfrm>
-        </p:spPr>
-        <p:txBody>
-          <a:bodyPr>
-            <a:normAutofit/>
-          </a:bodyPr>
-          <a:lstStyle/>
-          <a:p>
-            <a:pPr marL="0" marR="0" lvl="0" indent="0" defTabSz="914400" rtl="0" eaLnBrk="1" fontAlgn="auto" latinLnBrk="0" hangingPunct="1">
-              <a:spcBef>
-                <a:spcPts val="0"/>
-              </a:spcBef>
-              <a:spcAft>
-                <a:spcPts val="600"/>
-              </a:spcAft>
-              <a:buClrTx/>
-              <a:buSzTx/>
-              <a:buFontTx/>
-              <a:buNone/>
-              <a:tabLst/>
-              <a:defRPr/>
-            </a:pPr>
-            <a:fld id="{B2DC25EE-239B-4C5F-AAD1-255A7D5F1EE2}" type="slidenum">
-              <a:rPr kumimoji="0" lang="en-US" b="0" i="0" u="none" strike="noStrike" kern="1200" cap="none" spc="0" normalizeH="0" baseline="0" noProof="0" smtClean="0">
-                <a:ln>
-                  <a:noFill/>
-                </a:ln>
-                <a:effectLst/>
-                <a:uLnTx/>
-                <a:uFillTx/>
-                <a:latin typeface="Avenir Next LT Pro"/>
-                <a:ea typeface="+mn-ea"/>
-                <a:cs typeface="+mn-cs"/>
-              </a:rPr>
-              <a:pPr marL="0" marR="0" lvl="0" indent="0" defTabSz="914400" rtl="0" eaLnBrk="1" fontAlgn="auto" latinLnBrk="0" hangingPunct="1">
-                <a:spcBef>
-                  <a:spcPts val="0"/>
-                </a:spcBef>
-                <a:spcAft>
-                  <a:spcPts val="600"/>
-                </a:spcAft>
-                <a:buClrTx/>
-                <a:buSzTx/>
-                <a:buFontTx/>
-                <a:buNone/>
-                <a:tabLst/>
-                <a:defRPr/>
-              </a:pPr>
-              <a:t>5</a:t>
-            </a:fld>
-            <a:endParaRPr kumimoji="0" lang="en-US" b="0" i="0" u="none" strike="noStrike" kern="1200" cap="none" spc="0" normalizeH="0" baseline="0" noProof="0">
-              <a:ln>
-                <a:noFill/>
-              </a:ln>
-              <a:effectLst/>
-              <a:uLnTx/>
-              <a:uFillTx/>
-              <a:latin typeface="Avenir Next LT Pro"/>
-              <a:ea typeface="+mn-ea"/>
-              <a:cs typeface="+mn-cs"/>
-            </a:endParaRPr>
-          </a:p>
-        </p:txBody>
-      </p:sp>
-    </p:spTree>
-    <p:extLst>
-      <p:ext uri="{BB962C8B-B14F-4D97-AF65-F5344CB8AC3E}">
-        <p14:creationId xmlns:p14="http://schemas.microsoft.com/office/powerpoint/2010/main" val="553810613"/>
-      </p:ext>
-    </p:extLst>
-  </p:cSld>
-  <p:clrMapOvr>
-    <a:masterClrMapping/>
-  </p:clrMapOvr>
-</p:sld>
-</file>
-
-<file path=ppt/slides/slide6.xml><?xml version="1.0" encoding="utf-8"?>
-<p:sld xmlns:a="http://schemas.openxmlformats.org/drawingml/2006/main" xmlns:r="http://schemas.openxmlformats.org/officeDocument/2006/relationships" xmlns:p="http://schemas.openxmlformats.org/presentationml/2006/main">
-  <p:cSld>
-    <p:bg>
-      <p:bgPr>
-        <a:solidFill>
-          <a:schemeClr val="bg1"/>
-        </a:solidFill>
-        <a:effectLst/>
-      </p:bgPr>
-    </p:bg>
-    <p:spTree>
-      <p:nvGrpSpPr>
-        <p:cNvPr id="1" name=""/>
-        <p:cNvGrpSpPr/>
-        <p:nvPr/>
-      </p:nvGrpSpPr>
-      <p:grpSpPr>
-        <a:xfrm>
-          <a:off x="0" y="0"/>
-          <a:ext cx="0" cy="0"/>
-          <a:chOff x="0" y="0"/>
-          <a:chExt cx="0" cy="0"/>
-        </a:xfrm>
-      </p:grpSpPr>
-      <p:sp>
-        <p:nvSpPr>
-          <p:cNvPr id="65" name="Rectangle 53">
+          <p:cNvPr id="63" name="Rectangle 42">
             <a:extLst>
               <a:ext uri="{FF2B5EF4-FFF2-40B4-BE49-F238E27FC236}">
                 <a16:creationId xmlns:a16="http://schemas.microsoft.com/office/drawing/2014/main" id="{8D06CE56-3881-4ADA-8CEF-D18B02C242A3}"/>
@@ -15130,7 +15488,7 @@
       </p:sp>
       <p:sp>
         <p:nvSpPr>
-          <p:cNvPr id="67" name="Rectangle 55">
+          <p:cNvPr id="64" name="Rectangle 44">
             <a:extLst>
               <a:ext uri="{FF2B5EF4-FFF2-40B4-BE49-F238E27FC236}">
                 <a16:creationId xmlns:a16="http://schemas.microsoft.com/office/drawing/2014/main" id="{79F3C543-62EC-4433-9C93-A2CD8764E9B4}"/>
@@ -15226,10 +15584,10 @@
       </p:sp>
       <p:sp useBgFill="1">
         <p:nvSpPr>
-          <p:cNvPr id="68" name="Rectangle 57">
+          <p:cNvPr id="65" name="Rectangle 46">
             <a:extLst>
               <a:ext uri="{FF2B5EF4-FFF2-40B4-BE49-F238E27FC236}">
-                <a16:creationId xmlns:a16="http://schemas.microsoft.com/office/drawing/2014/main" id="{55666830-9A19-4E01-8505-D6C7F9AC5665}"/>
+                <a16:creationId xmlns:a16="http://schemas.microsoft.com/office/drawing/2014/main" id="{5DCB5928-DC7D-4612-9922-441966E15627}"/>
               </a:ext>
               <a:ext uri="{C183D7F6-B498-43B3-948B-1728B52AA6E4}">
                 <adec:decorative xmlns:adec="http://schemas.microsoft.com/office/drawing/2017/decorative" val="1"/>
@@ -15286,10 +15644,10 @@
       </p:sp>
       <p:sp useBgFill="1">
         <p:nvSpPr>
-          <p:cNvPr id="69" name="Freeform: Shape 59">
+          <p:cNvPr id="66" name="Freeform: Shape 48">
             <a:extLst>
               <a:ext uri="{FF2B5EF4-FFF2-40B4-BE49-F238E27FC236}">
-                <a16:creationId xmlns:a16="http://schemas.microsoft.com/office/drawing/2014/main" id="{AE9FC877-7FB6-4D22-9988-35420644E202}"/>
+                <a16:creationId xmlns:a16="http://schemas.microsoft.com/office/drawing/2014/main" id="{682C1161-1736-45EC-99B7-33F3CAE9D517}"/>
               </a:ext>
               <a:ext uri="{C183D7F6-B498-43B3-948B-1728B52AA6E4}">
                 <adec:decorative xmlns:adec="http://schemas.microsoft.com/office/drawing/2017/decorative" val="1"/>
@@ -15461,10 +15819,10 @@
       </p:sp>
       <p:sp useBgFill="1">
         <p:nvSpPr>
-          <p:cNvPr id="70" name="Freeform: Shape 61">
+          <p:cNvPr id="67" name="Freeform: Shape 50">
             <a:extLst>
               <a:ext uri="{FF2B5EF4-FFF2-40B4-BE49-F238E27FC236}">
-                <a16:creationId xmlns:a16="http://schemas.microsoft.com/office/drawing/2014/main" id="{E41809D1-F12E-46BB-B804-5F209D325E8B}"/>
+                <a16:creationId xmlns:a16="http://schemas.microsoft.com/office/drawing/2014/main" id="{84D4DDB8-B68F-45B0-9F62-C4279996F672}"/>
               </a:ext>
               <a:ext uri="{C183D7F6-B498-43B3-948B-1728B52AA6E4}">
                 <adec:decorative xmlns:adec="http://schemas.microsoft.com/office/drawing/2017/decorative" val="1"/>
@@ -15627,7 +15985,7 @@
           <p:cNvPr id="2" name="Title 1">
             <a:extLst>
               <a:ext uri="{FF2B5EF4-FFF2-40B4-BE49-F238E27FC236}">
-                <a16:creationId xmlns:a16="http://schemas.microsoft.com/office/drawing/2014/main" id="{176630BE-B2CD-4315-B187-0E55B8DE490D}"/>
+                <a16:creationId xmlns:a16="http://schemas.microsoft.com/office/drawing/2014/main" id="{D5DB5DBF-0759-49DD-8EB7-B5D09D6500EC}"/>
               </a:ext>
             </a:extLst>
           </p:cNvPr>
@@ -15651,15 +16009,15 @@
           <a:lstStyle/>
           <a:p>
             <a:r>
-              <a:rPr lang="en-US" sz="4800" dirty="0"/>
-              <a:t>Hardware</a:t>
+              <a:rPr lang="en-US" sz="4800"/>
+              <a:t>Project Sketch </a:t>
             </a:r>
           </a:p>
         </p:txBody>
       </p:sp>
       <p:sp>
         <p:nvSpPr>
-          <p:cNvPr id="64" name="Rectangle 63">
+          <p:cNvPr id="68" name="Rectangle 52">
             <a:extLst>
               <a:ext uri="{FF2B5EF4-FFF2-40B4-BE49-F238E27FC236}">
                 <a16:creationId xmlns:a16="http://schemas.microsoft.com/office/drawing/2014/main" id="{AF2F604E-43BE-4DC3-B983-E071523364F8}"/>
@@ -15751,7 +16109,7 @@
       </p:sp>
       <p:sp>
         <p:nvSpPr>
-          <p:cNvPr id="66" name="Rectangle 65">
+          <p:cNvPr id="69" name="Rectangle 54">
             <a:extLst>
               <a:ext uri="{FF2B5EF4-FFF2-40B4-BE49-F238E27FC236}">
                 <a16:creationId xmlns:a16="http://schemas.microsoft.com/office/drawing/2014/main" id="{08C9B587-E65E-4B52-B37C-ABEBB6E87928}"/>
@@ -15850,7 +16208,7 @@
           <p:cNvPr id="4" name="Footer Placeholder 3">
             <a:extLst>
               <a:ext uri="{FF2B5EF4-FFF2-40B4-BE49-F238E27FC236}">
-                <a16:creationId xmlns:a16="http://schemas.microsoft.com/office/drawing/2014/main" id="{34ABAFFD-EC79-41CB-BF61-6F44AE15D414}"/>
+                <a16:creationId xmlns:a16="http://schemas.microsoft.com/office/drawing/2014/main" id="{8CA1E675-9E0E-453C-912A-F3A6E3DE5FA7}"/>
               </a:ext>
             </a:extLst>
           </p:cNvPr>
@@ -15863,7 +16221,7 @@
         </p:nvSpPr>
         <p:spPr>
           <a:xfrm>
-            <a:off x="5374178" y="6356350"/>
+            <a:off x="5418374" y="6356350"/>
             <a:ext cx="4114800" cy="365125"/>
           </a:xfrm>
         </p:spPr>
@@ -15888,12 +16246,15 @@
               <a:defRPr/>
             </a:pPr>
             <a:r>
-              <a:rPr kumimoji="0" lang="en-US" b="0" i="0" u="none" strike="noStrike" kern="1200" cap="none" spc="0" normalizeH="0" baseline="0" noProof="0" dirty="0">
+              <a:rPr kumimoji="0" lang="en-US" b="0" i="0" u="none" strike="noStrike" kern="1200" cap="none" spc="0" normalizeH="0" baseline="0" noProof="0">
                 <a:ln>
                   <a:noFill/>
                 </a:ln>
                 <a:solidFill>
-                  <a:srgbClr val="FFFFFF"/>
+                  <a:schemeClr val="tx2">
+                    <a:lumMod val="50000"/>
+                    <a:lumOff val="50000"/>
+                  </a:schemeClr>
                 </a:solidFill>
                 <a:effectLst/>
                 <a:uLnTx/>
@@ -15902,17 +16263,17 @@
                 <a:ea typeface="+mn-ea"/>
                 <a:cs typeface="+mn-cs"/>
               </a:rPr>
-              <a:t>Dirk Thieme</a:t>
+              <a:t>Erik Manis</a:t>
             </a:r>
           </a:p>
         </p:txBody>
       </p:sp>
       <p:sp>
         <p:nvSpPr>
-          <p:cNvPr id="6" name="Slide Number Placeholder 5">
+          <p:cNvPr id="5" name="Slide Number Placeholder 4">
             <a:extLst>
               <a:ext uri="{FF2B5EF4-FFF2-40B4-BE49-F238E27FC236}">
-                <a16:creationId xmlns:a16="http://schemas.microsoft.com/office/drawing/2014/main" id="{E816B3EC-23F6-42E4-8F67-EF353FC2D5F9}"/>
+                <a16:creationId xmlns:a16="http://schemas.microsoft.com/office/drawing/2014/main" id="{110D54E4-2654-4905-AD29-DAF52E0E1FBB}"/>
               </a:ext>
             </a:extLst>
           </p:cNvPr>
@@ -15925,8 +16286,8 @@
         </p:nvSpPr>
         <p:spPr>
           <a:xfrm>
-            <a:off x="10113819" y="6356350"/>
-            <a:ext cx="1600200" cy="365125"/>
+            <a:off x="9847810" y="6356350"/>
+            <a:ext cx="1505989" cy="365125"/>
           </a:xfrm>
         </p:spPr>
         <p:txBody>
@@ -15955,8 +16316,1187 @@
                   <a:noFill/>
                 </a:ln>
                 <a:solidFill>
-                  <a:srgbClr val="FFFFFF"/>
+                  <a:schemeClr val="tx2">
+                    <a:lumMod val="50000"/>
+                    <a:lumOff val="50000"/>
+                  </a:schemeClr>
                 </a:solidFill>
+                <a:effectLst/>
+                <a:uLnTx/>
+                <a:uFillTx/>
+              </a:rPr>
+              <a:pPr marR="0" lvl="0" indent="0" fontAlgn="auto">
+                <a:spcBef>
+                  <a:spcPts val="0"/>
+                </a:spcBef>
+                <a:spcAft>
+                  <a:spcPts val="600"/>
+                </a:spcAft>
+                <a:buClrTx/>
+                <a:buSzTx/>
+                <a:buFontTx/>
+                <a:buNone/>
+                <a:tabLst/>
+                <a:defRPr/>
+              </a:pPr>
+              <a:t>5</a:t>
+            </a:fld>
+            <a:endParaRPr kumimoji="0" lang="en-US" b="0" i="0" u="none" strike="noStrike" cap="none" spc="0" normalizeH="0" baseline="0" noProof="0">
+              <a:ln>
+                <a:noFill/>
+              </a:ln>
+              <a:solidFill>
+                <a:schemeClr val="tx2">
+                  <a:lumMod val="50000"/>
+                  <a:lumOff val="50000"/>
+                </a:schemeClr>
+              </a:solidFill>
+              <a:effectLst/>
+              <a:uLnTx/>
+              <a:uFillTx/>
+            </a:endParaRPr>
+          </a:p>
+        </p:txBody>
+      </p:sp>
+      <p:pic>
+        <p:nvPicPr>
+          <p:cNvPr id="8" name="Content Placeholder 7" descr="Diagram&#10;&#10;Description automatically generated">
+            <a:extLst>
+              <a:ext uri="{FF2B5EF4-FFF2-40B4-BE49-F238E27FC236}">
+                <a16:creationId xmlns:a16="http://schemas.microsoft.com/office/drawing/2014/main" id="{C0BF9186-0A5F-46DC-8779-C5D19B707AA8}"/>
+              </a:ext>
+            </a:extLst>
+          </p:cNvPr>
+          <p:cNvPicPr>
+            <a:picLocks noGrp="1" noChangeAspect="1"/>
+          </p:cNvPicPr>
+          <p:nvPr>
+            <p:ph idx="1"/>
+          </p:nvPr>
+        </p:nvPicPr>
+        <p:blipFill rotWithShape="1">
+          <a:blip r:embed="rId2">
+            <a:extLst>
+              <a:ext uri="{28A0092B-C50C-407E-A947-70E740481C1C}">
+                <a14:useLocalDpi xmlns:a14="http://schemas.microsoft.com/office/drawing/2010/main" val="0"/>
+              </a:ext>
+            </a:extLst>
+          </a:blip>
+          <a:srcRect l="12585" t="10957" r="13834" b="16462"/>
+          <a:stretch/>
+        </p:blipFill>
+        <p:spPr>
+          <a:xfrm>
+            <a:off x="5172075" y="1057626"/>
+            <a:ext cx="6943156" cy="4742748"/>
+          </a:xfrm>
+          <a:prstGeom prst="rect">
+            <a:avLst/>
+          </a:prstGeom>
+        </p:spPr>
+      </p:pic>
+    </p:spTree>
+    <p:extLst>
+      <p:ext uri="{BB962C8B-B14F-4D97-AF65-F5344CB8AC3E}">
+        <p14:creationId xmlns:p14="http://schemas.microsoft.com/office/powerpoint/2010/main" val="553810613"/>
+      </p:ext>
+    </p:extLst>
+  </p:cSld>
+  <p:clrMapOvr>
+    <a:masterClrMapping/>
+  </p:clrMapOvr>
+</p:sld>
+</file>
+
+<file path=ppt/slides/slide6.xml><?xml version="1.0" encoding="utf-8"?>
+<p:sld xmlns:a="http://schemas.openxmlformats.org/drawingml/2006/main" xmlns:r="http://schemas.openxmlformats.org/officeDocument/2006/relationships" xmlns:p="http://schemas.openxmlformats.org/presentationml/2006/main">
+  <p:cSld>
+    <p:bg>
+      <p:bgPr>
+        <a:solidFill>
+          <a:schemeClr val="bg1"/>
+        </a:solidFill>
+        <a:effectLst/>
+      </p:bgPr>
+    </p:bg>
+    <p:spTree>
+      <p:nvGrpSpPr>
+        <p:cNvPr id="1" name=""/>
+        <p:cNvGrpSpPr/>
+        <p:nvPr/>
+      </p:nvGrpSpPr>
+      <p:grpSpPr>
+        <a:xfrm>
+          <a:off x="0" y="0"/>
+          <a:ext cx="0" cy="0"/>
+          <a:chOff x="0" y="0"/>
+          <a:chExt cx="0" cy="0"/>
+        </a:xfrm>
+      </p:grpSpPr>
+      <p:sp>
+        <p:nvSpPr>
+          <p:cNvPr id="152" name="Rectangle 84">
+            <a:extLst>
+              <a:ext uri="{FF2B5EF4-FFF2-40B4-BE49-F238E27FC236}">
+                <a16:creationId xmlns:a16="http://schemas.microsoft.com/office/drawing/2014/main" id="{8D06CE56-3881-4ADA-8CEF-D18B02C242A3}"/>
+              </a:ext>
+              <a:ext uri="{C183D7F6-B498-43B3-948B-1728B52AA6E4}">
+                <adec:decorative xmlns:adec="http://schemas.microsoft.com/office/drawing/2017/decorative" val="1"/>
+              </a:ext>
+            </a:extLst>
+          </p:cNvPr>
+          <p:cNvSpPr>
+            <a:spLocks noGrp="1" noRot="1" noChangeAspect="1" noMove="1" noResize="1" noEditPoints="1" noAdjustHandles="1" noChangeArrowheads="1" noChangeShapeType="1" noTextEdit="1"/>
+          </p:cNvSpPr>
+          <p:nvPr>
+            <p:extLst>
+              <p:ext uri="{386F3935-93C4-4BCD-93E2-E3B085C9AB24}">
+                <p16:designElem xmlns:p16="http://schemas.microsoft.com/office/powerpoint/2015/main" val="1"/>
+              </p:ext>
+            </p:extLst>
+          </p:nvPr>
+        </p:nvSpPr>
+        <p:spPr>
+          <a:xfrm rot="5400000">
+            <a:off x="857544" y="346791"/>
+            <a:ext cx="146304" cy="704088"/>
+          </a:xfrm>
+          <a:prstGeom prst="rect">
+            <a:avLst/>
+          </a:prstGeom>
+          <a:solidFill>
+            <a:schemeClr val="accent1"/>
+          </a:solidFill>
+          <a:ln>
+            <a:noFill/>
+          </a:ln>
+        </p:spPr>
+        <p:style>
+          <a:lnRef idx="2">
+            <a:schemeClr val="accent1">
+              <a:shade val="50000"/>
+            </a:schemeClr>
+          </a:lnRef>
+          <a:fillRef idx="1">
+            <a:schemeClr val="accent1"/>
+          </a:fillRef>
+          <a:effectRef idx="0">
+            <a:schemeClr val="accent1"/>
+          </a:effectRef>
+          <a:fontRef idx="minor">
+            <a:schemeClr val="lt1"/>
+          </a:fontRef>
+        </p:style>
+        <p:txBody>
+          <a:bodyPr rtlCol="0" anchor="ctr"/>
+          <a:lstStyle/>
+          <a:p>
+            <a:pPr marL="0" marR="0" lvl="0" indent="0" algn="ctr" defTabSz="914400" rtl="0" eaLnBrk="1" fontAlgn="auto" latinLnBrk="0" hangingPunct="1">
+              <a:lnSpc>
+                <a:spcPct val="100000"/>
+              </a:lnSpc>
+              <a:spcBef>
+                <a:spcPts val="0"/>
+              </a:spcBef>
+              <a:spcAft>
+                <a:spcPts val="0"/>
+              </a:spcAft>
+              <a:buClrTx/>
+              <a:buSzTx/>
+              <a:buFontTx/>
+              <a:buNone/>
+              <a:tabLst/>
+              <a:defRPr/>
+            </a:pPr>
+            <a:endParaRPr kumimoji="0" lang="en-US" sz="1800" b="0" i="0" u="none" strike="noStrike" kern="1200" cap="none" spc="0" normalizeH="0" baseline="0" noProof="0">
+              <a:ln>
+                <a:noFill/>
+              </a:ln>
+              <a:solidFill>
+                <a:prstClr val="white"/>
+              </a:solidFill>
+              <a:effectLst/>
+              <a:uLnTx/>
+              <a:uFillTx/>
+              <a:latin typeface="Calibri" panose="020F0502020204030204"/>
+              <a:ea typeface="+mn-ea"/>
+              <a:cs typeface="+mn-cs"/>
+            </a:endParaRPr>
+          </a:p>
+        </p:txBody>
+      </p:sp>
+      <p:sp>
+        <p:nvSpPr>
+          <p:cNvPr id="153" name="Rectangle 86">
+            <a:extLst>
+              <a:ext uri="{FF2B5EF4-FFF2-40B4-BE49-F238E27FC236}">
+                <a16:creationId xmlns:a16="http://schemas.microsoft.com/office/drawing/2014/main" id="{79F3C543-62EC-4433-9C93-A2CD8764E9B4}"/>
+              </a:ext>
+              <a:ext uri="{C183D7F6-B498-43B3-948B-1728B52AA6E4}">
+                <adec:decorative xmlns:adec="http://schemas.microsoft.com/office/drawing/2017/decorative" val="1"/>
+              </a:ext>
+            </a:extLst>
+          </p:cNvPr>
+          <p:cNvSpPr>
+            <a:spLocks noGrp="1" noRot="1" noChangeAspect="1" noMove="1" noResize="1" noEditPoints="1" noAdjustHandles="1" noChangeArrowheads="1" noChangeShapeType="1" noTextEdit="1"/>
+          </p:cNvSpPr>
+          <p:nvPr>
+            <p:extLst>
+              <p:ext uri="{386F3935-93C4-4BCD-93E2-E3B085C9AB24}">
+                <p16:designElem xmlns:p16="http://schemas.microsoft.com/office/powerpoint/2015/main" val="1"/>
+              </p:ext>
+            </p:extLst>
+          </p:nvPr>
+        </p:nvSpPr>
+        <p:spPr>
+          <a:xfrm flipV="1">
+            <a:off x="578652" y="4501201"/>
+            <a:ext cx="11034696" cy="18288"/>
+          </a:xfrm>
+          <a:prstGeom prst="rect">
+            <a:avLst/>
+          </a:prstGeom>
+          <a:solidFill>
+            <a:schemeClr val="tx2">
+              <a:lumMod val="25000"/>
+              <a:lumOff val="75000"/>
+            </a:schemeClr>
+          </a:solidFill>
+          <a:ln w="3175">
+            <a:noFill/>
+          </a:ln>
+          <a:effectLst/>
+        </p:spPr>
+        <p:style>
+          <a:lnRef idx="2">
+            <a:schemeClr val="accent1">
+              <a:shade val="50000"/>
+            </a:schemeClr>
+          </a:lnRef>
+          <a:fillRef idx="1">
+            <a:schemeClr val="accent1"/>
+          </a:fillRef>
+          <a:effectRef idx="0">
+            <a:schemeClr val="accent1"/>
+          </a:effectRef>
+          <a:fontRef idx="minor">
+            <a:schemeClr val="lt1"/>
+          </a:fontRef>
+        </p:style>
+        <p:txBody>
+          <a:bodyPr rtlCol="0" anchor="ctr"/>
+          <a:lstStyle/>
+          <a:p>
+            <a:pPr marL="0" marR="0" lvl="0" indent="0" algn="ctr" defTabSz="914400" rtl="0" eaLnBrk="1" fontAlgn="auto" latinLnBrk="0" hangingPunct="1">
+              <a:lnSpc>
+                <a:spcPct val="100000"/>
+              </a:lnSpc>
+              <a:spcBef>
+                <a:spcPts val="0"/>
+              </a:spcBef>
+              <a:spcAft>
+                <a:spcPts val="0"/>
+              </a:spcAft>
+              <a:buClrTx/>
+              <a:buSzTx/>
+              <a:buFontTx/>
+              <a:buNone/>
+              <a:tabLst/>
+              <a:defRPr/>
+            </a:pPr>
+            <a:endParaRPr kumimoji="0" lang="en-US" sz="1800" b="0" i="0" u="none" strike="noStrike" kern="1200" cap="none" spc="0" normalizeH="0" baseline="0" noProof="0">
+              <a:ln>
+                <a:noFill/>
+              </a:ln>
+              <a:solidFill>
+                <a:prstClr val="white"/>
+              </a:solidFill>
+              <a:effectLst/>
+              <a:uLnTx/>
+              <a:uFillTx/>
+              <a:latin typeface="Calibri" panose="020F0502020204030204"/>
+              <a:ea typeface="+mn-ea"/>
+              <a:cs typeface="+mn-cs"/>
+            </a:endParaRPr>
+          </a:p>
+        </p:txBody>
+      </p:sp>
+      <p:sp useBgFill="1">
+        <p:nvSpPr>
+          <p:cNvPr id="154" name="Rectangle 88">
+            <a:extLst>
+              <a:ext uri="{FF2B5EF4-FFF2-40B4-BE49-F238E27FC236}">
+                <a16:creationId xmlns:a16="http://schemas.microsoft.com/office/drawing/2014/main" id="{D898B8EB-E53C-4E72-9817-B4BFCAD73600}"/>
+              </a:ext>
+              <a:ext uri="{C183D7F6-B498-43B3-948B-1728B52AA6E4}">
+                <adec:decorative xmlns:adec="http://schemas.microsoft.com/office/drawing/2017/decorative" val="1"/>
+              </a:ext>
+            </a:extLst>
+          </p:cNvPr>
+          <p:cNvSpPr>
+            <a:spLocks noGrp="1" noRot="1" noChangeAspect="1" noMove="1" noResize="1" noEditPoints="1" noAdjustHandles="1" noChangeArrowheads="1" noChangeShapeType="1" noTextEdit="1"/>
+          </p:cNvSpPr>
+          <p:nvPr>
+            <p:extLst>
+              <p:ext uri="{386F3935-93C4-4BCD-93E2-E3B085C9AB24}">
+                <p16:designElem xmlns:p16="http://schemas.microsoft.com/office/powerpoint/2015/main" val="1"/>
+              </p:ext>
+            </p:extLst>
+          </p:nvPr>
+        </p:nvSpPr>
+        <p:spPr>
+          <a:xfrm>
+            <a:off x="0" y="0"/>
+            <a:ext cx="12192000" cy="6858000"/>
+          </a:xfrm>
+          <a:prstGeom prst="rect">
+            <a:avLst/>
+          </a:prstGeom>
+          <a:ln>
+            <a:noFill/>
+          </a:ln>
+        </p:spPr>
+        <p:style>
+          <a:lnRef idx="2">
+            <a:schemeClr val="accent1">
+              <a:shade val="50000"/>
+            </a:schemeClr>
+          </a:lnRef>
+          <a:fillRef idx="1">
+            <a:schemeClr val="accent1"/>
+          </a:fillRef>
+          <a:effectRef idx="0">
+            <a:schemeClr val="accent1"/>
+          </a:effectRef>
+          <a:fontRef idx="minor">
+            <a:schemeClr val="lt1"/>
+          </a:fontRef>
+        </p:style>
+        <p:txBody>
+          <a:bodyPr rtlCol="0" anchor="ctr"/>
+          <a:lstStyle/>
+          <a:p>
+            <a:pPr algn="ctr"/>
+            <a:endParaRPr lang="en-US"/>
+          </a:p>
+        </p:txBody>
+      </p:sp>
+      <p:sp useBgFill="1">
+        <p:nvSpPr>
+          <p:cNvPr id="155" name="Freeform: Shape 90">
+            <a:extLst>
+              <a:ext uri="{FF2B5EF4-FFF2-40B4-BE49-F238E27FC236}">
+                <a16:creationId xmlns:a16="http://schemas.microsoft.com/office/drawing/2014/main" id="{4E130362-2F35-4AB7-9EA5-DBC0F771A58D}"/>
+              </a:ext>
+              <a:ext uri="{C183D7F6-B498-43B3-948B-1728B52AA6E4}">
+                <adec:decorative xmlns:adec="http://schemas.microsoft.com/office/drawing/2017/decorative" val="1"/>
+              </a:ext>
+            </a:extLst>
+          </p:cNvPr>
+          <p:cNvSpPr>
+            <a:spLocks noGrp="1" noRot="1" noChangeAspect="1" noMove="1" noResize="1" noEditPoints="1" noAdjustHandles="1" noChangeArrowheads="1" noChangeShapeType="1" noTextEdit="1"/>
+          </p:cNvSpPr>
+          <p:nvPr>
+            <p:extLst>
+              <p:ext uri="{386F3935-93C4-4BCD-93E2-E3B085C9AB24}">
+                <p16:designElem xmlns:p16="http://schemas.microsoft.com/office/powerpoint/2015/main" val="1"/>
+              </p:ext>
+            </p:extLst>
+          </p:nvPr>
+        </p:nvSpPr>
+        <p:spPr>
+          <a:xfrm>
+            <a:off x="0" y="0"/>
+            <a:ext cx="4959047" cy="6858000"/>
+          </a:xfrm>
+          <a:custGeom>
+            <a:avLst/>
+            <a:gdLst>
+              <a:gd name="connsiteX0" fmla="*/ 0 w 4959047"/>
+              <a:gd name="connsiteY0" fmla="*/ 0 h 6858000"/>
+              <a:gd name="connsiteX1" fmla="*/ 4110127 w 4959047"/>
+              <a:gd name="connsiteY1" fmla="*/ 0 h 6858000"/>
+              <a:gd name="connsiteX2" fmla="*/ 4179024 w 4959047"/>
+              <a:gd name="connsiteY2" fmla="*/ 123368 h 6858000"/>
+              <a:gd name="connsiteX3" fmla="*/ 4959047 w 4959047"/>
+              <a:gd name="connsiteY3" fmla="*/ 3429000 h 6858000"/>
+              <a:gd name="connsiteX4" fmla="*/ 4179024 w 4959047"/>
+              <a:gd name="connsiteY4" fmla="*/ 6734633 h 6858000"/>
+              <a:gd name="connsiteX5" fmla="*/ 4110127 w 4959047"/>
+              <a:gd name="connsiteY5" fmla="*/ 6858000 h 6858000"/>
+              <a:gd name="connsiteX6" fmla="*/ 0 w 4959047"/>
+              <a:gd name="connsiteY6" fmla="*/ 6858000 h 6858000"/>
+            </a:gdLst>
+            <a:ahLst/>
+            <a:cxnLst>
+              <a:cxn ang="0">
+                <a:pos x="connsiteX0" y="connsiteY0"/>
+              </a:cxn>
+              <a:cxn ang="0">
+                <a:pos x="connsiteX1" y="connsiteY1"/>
+              </a:cxn>
+              <a:cxn ang="0">
+                <a:pos x="connsiteX2" y="connsiteY2"/>
+              </a:cxn>
+              <a:cxn ang="0">
+                <a:pos x="connsiteX3" y="connsiteY3"/>
+              </a:cxn>
+              <a:cxn ang="0">
+                <a:pos x="connsiteX4" y="connsiteY4"/>
+              </a:cxn>
+              <a:cxn ang="0">
+                <a:pos x="connsiteX5" y="connsiteY5"/>
+              </a:cxn>
+              <a:cxn ang="0">
+                <a:pos x="connsiteX6" y="connsiteY6"/>
+              </a:cxn>
+            </a:cxnLst>
+            <a:rect l="l" t="t" r="r" b="b"/>
+            <a:pathLst>
+              <a:path w="4959047" h="6858000">
+                <a:moveTo>
+                  <a:pt x="0" y="0"/>
+                </a:moveTo>
+                <a:lnTo>
+                  <a:pt x="4110127" y="0"/>
+                </a:lnTo>
+                <a:lnTo>
+                  <a:pt x="4179024" y="123368"/>
+                </a:lnTo>
+                <a:cubicBezTo>
+                  <a:pt x="4668929" y="1045156"/>
+                  <a:pt x="4959047" y="2189404"/>
+                  <a:pt x="4959047" y="3429000"/>
+                </a:cubicBezTo>
+                <a:cubicBezTo>
+                  <a:pt x="4959047" y="4668597"/>
+                  <a:pt x="4668929" y="5812845"/>
+                  <a:pt x="4179024" y="6734633"/>
+                </a:cubicBezTo>
+                <a:lnTo>
+                  <a:pt x="4110127" y="6858000"/>
+                </a:lnTo>
+                <a:lnTo>
+                  <a:pt x="0" y="6858000"/>
+                </a:lnTo>
+                <a:close/>
+              </a:path>
+            </a:pathLst>
+          </a:custGeom>
+          <a:ln w="9525">
+            <a:solidFill>
+              <a:schemeClr val="tx2">
+                <a:lumMod val="10000"/>
+                <a:lumOff val="90000"/>
+              </a:schemeClr>
+            </a:solidFill>
+          </a:ln>
+          <a:effectLst>
+            <a:outerShdw blurRad="50800" dist="38100" algn="l" rotWithShape="0">
+              <a:schemeClr val="bg1">
+                <a:lumMod val="85000"/>
+                <a:alpha val="30000"/>
+              </a:schemeClr>
+            </a:outerShdw>
+          </a:effectLst>
+        </p:spPr>
+        <p:style>
+          <a:lnRef idx="2">
+            <a:schemeClr val="accent1">
+              <a:shade val="50000"/>
+            </a:schemeClr>
+          </a:lnRef>
+          <a:fillRef idx="1">
+            <a:schemeClr val="accent1"/>
+          </a:fillRef>
+          <a:effectRef idx="0">
+            <a:schemeClr val="accent1"/>
+          </a:effectRef>
+          <a:fontRef idx="minor">
+            <a:schemeClr val="lt1"/>
+          </a:fontRef>
+        </p:style>
+        <p:txBody>
+          <a:bodyPr wrap="square" rtlCol="0" anchor="ctr">
+            <a:noAutofit/>
+          </a:bodyPr>
+          <a:lstStyle/>
+          <a:p>
+            <a:pPr marL="0" marR="0" lvl="0" indent="0" algn="ctr" defTabSz="914400" rtl="0" eaLnBrk="1" fontAlgn="auto" latinLnBrk="0" hangingPunct="1">
+              <a:lnSpc>
+                <a:spcPct val="100000"/>
+              </a:lnSpc>
+              <a:spcBef>
+                <a:spcPts val="0"/>
+              </a:spcBef>
+              <a:spcAft>
+                <a:spcPts val="0"/>
+              </a:spcAft>
+              <a:buClrTx/>
+              <a:buSzTx/>
+              <a:buFontTx/>
+              <a:buNone/>
+              <a:tabLst/>
+              <a:defRPr/>
+            </a:pPr>
+            <a:endParaRPr kumimoji="0" lang="en-US" sz="1800" b="0" i="0" u="none" strike="noStrike" kern="1200" cap="none" spc="0" normalizeH="0" baseline="0" noProof="0">
+              <a:ln>
+                <a:noFill/>
+              </a:ln>
+              <a:solidFill>
+                <a:prstClr val="white"/>
+              </a:solidFill>
+              <a:effectLst/>
+              <a:uLnTx/>
+              <a:uFillTx/>
+              <a:latin typeface="Calibri" panose="020F0502020204030204"/>
+              <a:ea typeface="+mn-ea"/>
+              <a:cs typeface="+mn-cs"/>
+            </a:endParaRPr>
+          </a:p>
+        </p:txBody>
+      </p:sp>
+      <p:sp useBgFill="1">
+        <p:nvSpPr>
+          <p:cNvPr id="156" name="Freeform: Shape 92">
+            <a:extLst>
+              <a:ext uri="{FF2B5EF4-FFF2-40B4-BE49-F238E27FC236}">
+                <a16:creationId xmlns:a16="http://schemas.microsoft.com/office/drawing/2014/main" id="{56BE988C-7A5B-41EC-A46C-AEA93D8D32FD}"/>
+              </a:ext>
+              <a:ext uri="{C183D7F6-B498-43B3-948B-1728B52AA6E4}">
+                <adec:decorative xmlns:adec="http://schemas.microsoft.com/office/drawing/2017/decorative" val="1"/>
+              </a:ext>
+            </a:extLst>
+          </p:cNvPr>
+          <p:cNvSpPr>
+            <a:spLocks noGrp="1" noRot="1" noChangeAspect="1" noMove="1" noResize="1" noEditPoints="1" noAdjustHandles="1" noChangeArrowheads="1" noChangeShapeType="1" noTextEdit="1"/>
+          </p:cNvSpPr>
+          <p:nvPr>
+            <p:extLst>
+              <p:ext uri="{386F3935-93C4-4BCD-93E2-E3B085C9AB24}">
+                <p16:designElem xmlns:p16="http://schemas.microsoft.com/office/powerpoint/2015/main" val="1"/>
+              </p:ext>
+            </p:extLst>
+          </p:nvPr>
+        </p:nvSpPr>
+        <p:spPr>
+          <a:xfrm>
+            <a:off x="0" y="0"/>
+            <a:ext cx="4948887" cy="6858000"/>
+          </a:xfrm>
+          <a:custGeom>
+            <a:avLst/>
+            <a:gdLst>
+              <a:gd name="connsiteX0" fmla="*/ 0 w 4948887"/>
+              <a:gd name="connsiteY0" fmla="*/ 0 h 6858000"/>
+              <a:gd name="connsiteX1" fmla="*/ 4099967 w 4948887"/>
+              <a:gd name="connsiteY1" fmla="*/ 0 h 6858000"/>
+              <a:gd name="connsiteX2" fmla="*/ 4168864 w 4948887"/>
+              <a:gd name="connsiteY2" fmla="*/ 123368 h 6858000"/>
+              <a:gd name="connsiteX3" fmla="*/ 4948887 w 4948887"/>
+              <a:gd name="connsiteY3" fmla="*/ 3429000 h 6858000"/>
+              <a:gd name="connsiteX4" fmla="*/ 4168864 w 4948887"/>
+              <a:gd name="connsiteY4" fmla="*/ 6734633 h 6858000"/>
+              <a:gd name="connsiteX5" fmla="*/ 4099967 w 4948887"/>
+              <a:gd name="connsiteY5" fmla="*/ 6858000 h 6858000"/>
+              <a:gd name="connsiteX6" fmla="*/ 0 w 4948887"/>
+              <a:gd name="connsiteY6" fmla="*/ 6858000 h 6858000"/>
+            </a:gdLst>
+            <a:ahLst/>
+            <a:cxnLst>
+              <a:cxn ang="0">
+                <a:pos x="connsiteX0" y="connsiteY0"/>
+              </a:cxn>
+              <a:cxn ang="0">
+                <a:pos x="connsiteX1" y="connsiteY1"/>
+              </a:cxn>
+              <a:cxn ang="0">
+                <a:pos x="connsiteX2" y="connsiteY2"/>
+              </a:cxn>
+              <a:cxn ang="0">
+                <a:pos x="connsiteX3" y="connsiteY3"/>
+              </a:cxn>
+              <a:cxn ang="0">
+                <a:pos x="connsiteX4" y="connsiteY4"/>
+              </a:cxn>
+              <a:cxn ang="0">
+                <a:pos x="connsiteX5" y="connsiteY5"/>
+              </a:cxn>
+              <a:cxn ang="0">
+                <a:pos x="connsiteX6" y="connsiteY6"/>
+              </a:cxn>
+            </a:cxnLst>
+            <a:rect l="l" t="t" r="r" b="b"/>
+            <a:pathLst>
+              <a:path w="4948887" h="6858000">
+                <a:moveTo>
+                  <a:pt x="0" y="0"/>
+                </a:moveTo>
+                <a:lnTo>
+                  <a:pt x="4099967" y="0"/>
+                </a:lnTo>
+                <a:lnTo>
+                  <a:pt x="4168864" y="123368"/>
+                </a:lnTo>
+                <a:cubicBezTo>
+                  <a:pt x="4658769" y="1045156"/>
+                  <a:pt x="4948887" y="2189404"/>
+                  <a:pt x="4948887" y="3429000"/>
+                </a:cubicBezTo>
+                <a:cubicBezTo>
+                  <a:pt x="4948887" y="4668597"/>
+                  <a:pt x="4658769" y="5812845"/>
+                  <a:pt x="4168864" y="6734633"/>
+                </a:cubicBezTo>
+                <a:lnTo>
+                  <a:pt x="4099967" y="6858000"/>
+                </a:lnTo>
+                <a:lnTo>
+                  <a:pt x="0" y="6858000"/>
+                </a:lnTo>
+                <a:close/>
+              </a:path>
+            </a:pathLst>
+          </a:custGeom>
+          <a:ln w="9525">
+            <a:noFill/>
+          </a:ln>
+          <a:effectLst/>
+        </p:spPr>
+        <p:style>
+          <a:lnRef idx="2">
+            <a:schemeClr val="accent1">
+              <a:shade val="50000"/>
+            </a:schemeClr>
+          </a:lnRef>
+          <a:fillRef idx="1">
+            <a:schemeClr val="accent1"/>
+          </a:fillRef>
+          <a:effectRef idx="0">
+            <a:schemeClr val="accent1"/>
+          </a:effectRef>
+          <a:fontRef idx="minor">
+            <a:schemeClr val="lt1"/>
+          </a:fontRef>
+        </p:style>
+        <p:txBody>
+          <a:bodyPr wrap="square" rtlCol="0" anchor="ctr">
+            <a:noAutofit/>
+          </a:bodyPr>
+          <a:lstStyle/>
+          <a:p>
+            <a:pPr marL="0" marR="0" lvl="0" indent="0" algn="ctr" defTabSz="914400" rtl="0" eaLnBrk="1" fontAlgn="auto" latinLnBrk="0" hangingPunct="1">
+              <a:lnSpc>
+                <a:spcPct val="100000"/>
+              </a:lnSpc>
+              <a:spcBef>
+                <a:spcPts val="0"/>
+              </a:spcBef>
+              <a:spcAft>
+                <a:spcPts val="0"/>
+              </a:spcAft>
+              <a:buClrTx/>
+              <a:buSzTx/>
+              <a:buFontTx/>
+              <a:buNone/>
+              <a:tabLst/>
+              <a:defRPr/>
+            </a:pPr>
+            <a:endParaRPr kumimoji="0" lang="en-US" sz="1800" b="0" i="0" u="none" strike="noStrike" kern="1200" cap="none" spc="0" normalizeH="0" baseline="0" noProof="0">
+              <a:ln>
+                <a:noFill/>
+              </a:ln>
+              <a:solidFill>
+                <a:prstClr val="white"/>
+              </a:solidFill>
+              <a:effectLst/>
+              <a:uLnTx/>
+              <a:uFillTx/>
+              <a:latin typeface="Calibri" panose="020F0502020204030204"/>
+              <a:ea typeface="+mn-ea"/>
+              <a:cs typeface="+mn-cs"/>
+            </a:endParaRPr>
+          </a:p>
+        </p:txBody>
+      </p:sp>
+      <p:sp>
+        <p:nvSpPr>
+          <p:cNvPr id="2" name="Title 1">
+            <a:extLst>
+              <a:ext uri="{FF2B5EF4-FFF2-40B4-BE49-F238E27FC236}">
+                <a16:creationId xmlns:a16="http://schemas.microsoft.com/office/drawing/2014/main" id="{176630BE-B2CD-4315-B187-0E55B8DE490D}"/>
+              </a:ext>
+            </a:extLst>
+          </p:cNvPr>
+          <p:cNvSpPr>
+            <a:spLocks noGrp="1"/>
+          </p:cNvSpPr>
+          <p:nvPr>
+            <p:ph type="title"/>
+          </p:nvPr>
+        </p:nvSpPr>
+        <p:spPr>
+          <a:xfrm>
+            <a:off x="475488" y="1124712"/>
+            <a:ext cx="4023360" cy="3200400"/>
+          </a:xfrm>
+        </p:spPr>
+        <p:txBody>
+          <a:bodyPr vert="horz" lIns="91440" tIns="45720" rIns="91440" bIns="45720" rtlCol="0" anchor="b">
+            <a:normAutofit/>
+          </a:bodyPr>
+          <a:lstStyle/>
+          <a:p>
+            <a:r>
+              <a:rPr lang="en-US" sz="4800"/>
+              <a:t>Hardware</a:t>
+            </a:r>
+          </a:p>
+        </p:txBody>
+      </p:sp>
+      <p:sp>
+        <p:nvSpPr>
+          <p:cNvPr id="157" name="Rectangle 94">
+            <a:extLst>
+              <a:ext uri="{FF2B5EF4-FFF2-40B4-BE49-F238E27FC236}">
+                <a16:creationId xmlns:a16="http://schemas.microsoft.com/office/drawing/2014/main" id="{E3CB1EC0-40A9-4D5E-B7E2-6E3423CE28B2}"/>
+              </a:ext>
+              <a:ext uri="{C183D7F6-B498-43B3-948B-1728B52AA6E4}">
+                <adec:decorative xmlns:adec="http://schemas.microsoft.com/office/drawing/2017/decorative" val="1"/>
+              </a:ext>
+            </a:extLst>
+          </p:cNvPr>
+          <p:cNvSpPr>
+            <a:spLocks noGrp="1" noRot="1" noChangeAspect="1" noMove="1" noResize="1" noEditPoints="1" noAdjustHandles="1" noChangeArrowheads="1" noChangeShapeType="1" noTextEdit="1"/>
+          </p:cNvSpPr>
+          <p:nvPr>
+            <p:extLst>
+              <p:ext uri="{386F3935-93C4-4BCD-93E2-E3B085C9AB24}">
+                <p16:designElem xmlns:p16="http://schemas.microsoft.com/office/powerpoint/2015/main" val="1"/>
+              </p:ext>
+            </p:extLst>
+          </p:nvPr>
+        </p:nvSpPr>
+        <p:spPr>
+          <a:xfrm rot="5400000">
+            <a:off x="759921" y="346791"/>
+            <a:ext cx="146304" cy="704088"/>
+          </a:xfrm>
+          <a:prstGeom prst="rect">
+            <a:avLst/>
+          </a:prstGeom>
+          <a:solidFill>
+            <a:schemeClr val="accent1"/>
+          </a:solidFill>
+          <a:ln>
+            <a:noFill/>
+          </a:ln>
+        </p:spPr>
+        <p:style>
+          <a:lnRef idx="2">
+            <a:schemeClr val="accent1">
+              <a:shade val="50000"/>
+            </a:schemeClr>
+          </a:lnRef>
+          <a:fillRef idx="1">
+            <a:schemeClr val="accent1"/>
+          </a:fillRef>
+          <a:effectRef idx="0">
+            <a:schemeClr val="accent1"/>
+          </a:effectRef>
+          <a:fontRef idx="minor">
+            <a:schemeClr val="lt1"/>
+          </a:fontRef>
+        </p:style>
+        <p:txBody>
+          <a:bodyPr rtlCol="0" anchor="ctr"/>
+          <a:lstStyle/>
+          <a:p>
+            <a:pPr marL="0" marR="0" lvl="0" indent="0" algn="ctr" defTabSz="914400" rtl="0" eaLnBrk="1" fontAlgn="auto" latinLnBrk="0" hangingPunct="1">
+              <a:lnSpc>
+                <a:spcPct val="100000"/>
+              </a:lnSpc>
+              <a:spcBef>
+                <a:spcPts val="0"/>
+              </a:spcBef>
+              <a:spcAft>
+                <a:spcPts val="0"/>
+              </a:spcAft>
+              <a:buClrTx/>
+              <a:buSzTx/>
+              <a:buFontTx/>
+              <a:buNone/>
+              <a:tabLst/>
+              <a:defRPr/>
+            </a:pPr>
+            <a:endParaRPr kumimoji="0" lang="en-US" sz="1800" b="0" i="0" u="none" strike="noStrike" kern="1200" cap="none" spc="0" normalizeH="0" baseline="0" noProof="0">
+              <a:ln>
+                <a:noFill/>
+              </a:ln>
+              <a:solidFill>
+                <a:prstClr val="white"/>
+              </a:solidFill>
+              <a:effectLst/>
+              <a:uLnTx/>
+              <a:uFillTx/>
+              <a:latin typeface="Calibri" panose="020F0502020204030204"/>
+              <a:ea typeface="+mn-ea"/>
+              <a:cs typeface="+mn-cs"/>
+            </a:endParaRPr>
+          </a:p>
+        </p:txBody>
+      </p:sp>
+      <p:pic>
+        <p:nvPicPr>
+          <p:cNvPr id="5" name="Picture 4" descr="Diagram&#10;&#10;Description automatically generated">
+            <a:extLst>
+              <a:ext uri="{FF2B5EF4-FFF2-40B4-BE49-F238E27FC236}">
+                <a16:creationId xmlns:a16="http://schemas.microsoft.com/office/drawing/2014/main" id="{0CDA4094-7ED9-4B52-A059-43635606B92D}"/>
+              </a:ext>
+            </a:extLst>
+          </p:cNvPr>
+          <p:cNvPicPr>
+            <a:picLocks noChangeAspect="1"/>
+          </p:cNvPicPr>
+          <p:nvPr/>
+        </p:nvPicPr>
+        <p:blipFill>
+          <a:blip r:embed="rId2">
+            <a:extLst>
+              <a:ext uri="{28A0092B-C50C-407E-A947-70E740481C1C}">
+                <a14:useLocalDpi xmlns:a14="http://schemas.microsoft.com/office/drawing/2010/main" val="0"/>
+              </a:ext>
+            </a:extLst>
+          </a:blip>
+          <a:stretch>
+            <a:fillRect/>
+          </a:stretch>
+        </p:blipFill>
+        <p:spPr>
+          <a:xfrm>
+            <a:off x="5028331" y="293799"/>
+            <a:ext cx="1909084" cy="2670048"/>
+          </a:xfrm>
+          <a:prstGeom prst="rect">
+            <a:avLst/>
+          </a:prstGeom>
+        </p:spPr>
+      </p:pic>
+      <p:pic>
+        <p:nvPicPr>
+          <p:cNvPr id="10" name="Picture 9">
+            <a:extLst>
+              <a:ext uri="{FF2B5EF4-FFF2-40B4-BE49-F238E27FC236}">
+                <a16:creationId xmlns:a16="http://schemas.microsoft.com/office/drawing/2014/main" id="{B7292ACD-CD12-4F8D-93B0-1FA049722873}"/>
+              </a:ext>
+            </a:extLst>
+          </p:cNvPr>
+          <p:cNvPicPr>
+            <a:picLocks noChangeAspect="1"/>
+          </p:cNvPicPr>
+          <p:nvPr/>
+        </p:nvPicPr>
+        <p:blipFill>
+          <a:blip r:embed="rId3">
+            <a:extLst>
+              <a:ext uri="{28A0092B-C50C-407E-A947-70E740481C1C}">
+                <a14:useLocalDpi xmlns:a14="http://schemas.microsoft.com/office/drawing/2010/main" val="0"/>
+              </a:ext>
+            </a:extLst>
+          </a:blip>
+          <a:stretch>
+            <a:fillRect/>
+          </a:stretch>
+        </p:blipFill>
+        <p:spPr>
+          <a:xfrm>
+            <a:off x="6711424" y="305979"/>
+            <a:ext cx="2670048" cy="2670048"/>
+          </a:xfrm>
+          <a:prstGeom prst="rect">
+            <a:avLst/>
+          </a:prstGeom>
+        </p:spPr>
+      </p:pic>
+      <p:sp>
+        <p:nvSpPr>
+          <p:cNvPr id="158" name="Rectangle 96">
+            <a:extLst>
+              <a:ext uri="{FF2B5EF4-FFF2-40B4-BE49-F238E27FC236}">
+                <a16:creationId xmlns:a16="http://schemas.microsoft.com/office/drawing/2014/main" id="{DCBE52EF-2889-423F-947C-0E44A760D696}"/>
+              </a:ext>
+              <a:ext uri="{C183D7F6-B498-43B3-948B-1728B52AA6E4}">
+                <adec:decorative xmlns:adec="http://schemas.microsoft.com/office/drawing/2017/decorative" val="1"/>
+              </a:ext>
+            </a:extLst>
+          </p:cNvPr>
+          <p:cNvSpPr>
+            <a:spLocks noGrp="1" noRot="1" noChangeAspect="1" noMove="1" noResize="1" noEditPoints="1" noAdjustHandles="1" noChangeArrowheads="1" noChangeShapeType="1" noTextEdit="1"/>
+          </p:cNvSpPr>
+          <p:nvPr>
+            <p:extLst>
+              <p:ext uri="{386F3935-93C4-4BCD-93E2-E3B085C9AB24}">
+                <p16:designElem xmlns:p16="http://schemas.microsoft.com/office/powerpoint/2015/main" val="1"/>
+              </p:ext>
+            </p:extLst>
+          </p:nvPr>
+        </p:nvSpPr>
+        <p:spPr>
+          <a:xfrm>
+            <a:off x="481029" y="4546920"/>
+            <a:ext cx="4023360" cy="18288"/>
+          </a:xfrm>
+          <a:prstGeom prst="rect">
+            <a:avLst/>
+          </a:prstGeom>
+          <a:solidFill>
+            <a:schemeClr val="tx2">
+              <a:lumMod val="25000"/>
+              <a:lumOff val="75000"/>
+            </a:schemeClr>
+          </a:solidFill>
+          <a:ln w="3175">
+            <a:noFill/>
+          </a:ln>
+          <a:effectLst/>
+        </p:spPr>
+        <p:style>
+          <a:lnRef idx="2">
+            <a:schemeClr val="accent1">
+              <a:shade val="50000"/>
+            </a:schemeClr>
+          </a:lnRef>
+          <a:fillRef idx="1">
+            <a:schemeClr val="accent1"/>
+          </a:fillRef>
+          <a:effectRef idx="0">
+            <a:schemeClr val="accent1"/>
+          </a:effectRef>
+          <a:fontRef idx="minor">
+            <a:schemeClr val="lt1"/>
+          </a:fontRef>
+        </p:style>
+        <p:txBody>
+          <a:bodyPr rtlCol="0" anchor="ctr"/>
+          <a:lstStyle/>
+          <a:p>
+            <a:pPr marL="0" marR="0" lvl="0" indent="0" algn="ctr" defTabSz="914400" rtl="0" eaLnBrk="1" fontAlgn="auto" latinLnBrk="0" hangingPunct="1">
+              <a:lnSpc>
+                <a:spcPct val="100000"/>
+              </a:lnSpc>
+              <a:spcBef>
+                <a:spcPts val="0"/>
+              </a:spcBef>
+              <a:spcAft>
+                <a:spcPts val="0"/>
+              </a:spcAft>
+              <a:buClrTx/>
+              <a:buSzTx/>
+              <a:buFontTx/>
+              <a:buNone/>
+              <a:tabLst/>
+              <a:defRPr/>
+            </a:pPr>
+            <a:endParaRPr kumimoji="0" lang="en-US" sz="1800" b="0" i="0" u="none" strike="noStrike" kern="1200" cap="none" spc="0" normalizeH="0" baseline="0" noProof="0">
+              <a:ln>
+                <a:noFill/>
+              </a:ln>
+              <a:solidFill>
+                <a:prstClr val="white"/>
+              </a:solidFill>
+              <a:effectLst/>
+              <a:uLnTx/>
+              <a:uFillTx/>
+              <a:latin typeface="Calibri" panose="020F0502020204030204"/>
+              <a:ea typeface="+mn-ea"/>
+              <a:cs typeface="+mn-cs"/>
+            </a:endParaRPr>
+          </a:p>
+        </p:txBody>
+      </p:sp>
+      <p:pic>
+        <p:nvPicPr>
+          <p:cNvPr id="14" name="Picture 13" descr="A picture containing text, electronics&#10;&#10;Description automatically generated">
+            <a:extLst>
+              <a:ext uri="{FF2B5EF4-FFF2-40B4-BE49-F238E27FC236}">
+                <a16:creationId xmlns:a16="http://schemas.microsoft.com/office/drawing/2014/main" id="{F531CD27-F670-4877-B5F9-19D4950DE495}"/>
+              </a:ext>
+            </a:extLst>
+          </p:cNvPr>
+          <p:cNvPicPr>
+            <a:picLocks noChangeAspect="1"/>
+          </p:cNvPicPr>
+          <p:nvPr/>
+        </p:nvPicPr>
+        <p:blipFill>
+          <a:blip r:embed="rId4">
+            <a:extLst>
+              <a:ext uri="{28A0092B-C50C-407E-A947-70E740481C1C}">
+                <a14:useLocalDpi xmlns:a14="http://schemas.microsoft.com/office/drawing/2010/main" val="0"/>
+              </a:ext>
+            </a:extLst>
+          </a:blip>
+          <a:stretch>
+            <a:fillRect/>
+          </a:stretch>
+        </p:blipFill>
+        <p:spPr>
+          <a:xfrm>
+            <a:off x="9488424" y="485413"/>
+            <a:ext cx="2496855" cy="2490614"/>
+          </a:xfrm>
+          <a:prstGeom prst="rect">
+            <a:avLst/>
+          </a:prstGeom>
+        </p:spPr>
+      </p:pic>
+      <p:pic>
+        <p:nvPicPr>
+          <p:cNvPr id="12" name="Picture 11" descr="A picture containing light&#10;&#10;Description automatically generated">
+            <a:extLst>
+              <a:ext uri="{FF2B5EF4-FFF2-40B4-BE49-F238E27FC236}">
+                <a16:creationId xmlns:a16="http://schemas.microsoft.com/office/drawing/2014/main" id="{92A8F141-0ABB-4C05-8ECE-768A4ABD014E}"/>
+              </a:ext>
+            </a:extLst>
+          </p:cNvPr>
+          <p:cNvPicPr>
+            <a:picLocks noChangeAspect="1"/>
+          </p:cNvPicPr>
+          <p:nvPr/>
+        </p:nvPicPr>
+        <p:blipFill>
+          <a:blip r:embed="rId5">
+            <a:extLst>
+              <a:ext uri="{28A0092B-C50C-407E-A947-70E740481C1C}">
+                <a14:useLocalDpi xmlns:a14="http://schemas.microsoft.com/office/drawing/2010/main" val="0"/>
+              </a:ext>
+            </a:extLst>
+          </a:blip>
+          <a:stretch>
+            <a:fillRect/>
+          </a:stretch>
+        </p:blipFill>
+        <p:spPr>
+          <a:xfrm>
+            <a:off x="9975886" y="3424114"/>
+            <a:ext cx="2038698" cy="1753281"/>
+          </a:xfrm>
+          <a:prstGeom prst="rect">
+            <a:avLst/>
+          </a:prstGeom>
+        </p:spPr>
+      </p:pic>
+      <p:sp>
+        <p:nvSpPr>
+          <p:cNvPr id="4" name="Footer Placeholder 3">
+            <a:extLst>
+              <a:ext uri="{FF2B5EF4-FFF2-40B4-BE49-F238E27FC236}">
+                <a16:creationId xmlns:a16="http://schemas.microsoft.com/office/drawing/2014/main" id="{34ABAFFD-EC79-41CB-BF61-6F44AE15D414}"/>
+              </a:ext>
+            </a:extLst>
+          </p:cNvPr>
+          <p:cNvSpPr>
+            <a:spLocks noGrp="1"/>
+          </p:cNvSpPr>
+          <p:nvPr>
+            <p:ph type="ftr" sz="quarter" idx="11"/>
+          </p:nvPr>
+        </p:nvSpPr>
+        <p:spPr>
+          <a:xfrm>
+            <a:off x="5373624" y="6356350"/>
+            <a:ext cx="4114800" cy="365125"/>
+          </a:xfrm>
+        </p:spPr>
+        <p:txBody>
+          <a:bodyPr vert="horz" lIns="91440" tIns="45720" rIns="91440" bIns="45720" rtlCol="0" anchor="ctr">
+            <a:normAutofit/>
+          </a:bodyPr>
+          <a:lstStyle/>
+          <a:p>
+            <a:pPr marR="0" lvl="0" indent="0" algn="l" fontAlgn="auto">
+              <a:spcBef>
+                <a:spcPts val="0"/>
+              </a:spcBef>
+              <a:spcAft>
+                <a:spcPts val="600"/>
+              </a:spcAft>
+              <a:buClrTx/>
+              <a:buSzTx/>
+              <a:buFontTx/>
+              <a:buNone/>
+              <a:tabLst/>
+              <a:defRPr/>
+            </a:pPr>
+            <a:r>
+              <a:rPr kumimoji="0" lang="en-US" b="0" i="0" u="none" strike="noStrike" kern="1200" cap="none" spc="0" normalizeH="0" baseline="0" noProof="0">
+                <a:ln>
+                  <a:noFill/>
+                </a:ln>
+                <a:solidFill>
+                  <a:schemeClr val="tx1">
+                    <a:tint val="75000"/>
+                  </a:schemeClr>
+                </a:solidFill>
+                <a:effectLst/>
+                <a:uLnTx/>
+                <a:uFillTx/>
+                <a:latin typeface="+mn-lt"/>
+                <a:ea typeface="+mn-ea"/>
+                <a:cs typeface="+mn-cs"/>
+              </a:rPr>
+              <a:t>Dirk Thieme</a:t>
+            </a:r>
+          </a:p>
+        </p:txBody>
+      </p:sp>
+      <p:sp>
+        <p:nvSpPr>
+          <p:cNvPr id="6" name="Slide Number Placeholder 5">
+            <a:extLst>
+              <a:ext uri="{FF2B5EF4-FFF2-40B4-BE49-F238E27FC236}">
+                <a16:creationId xmlns:a16="http://schemas.microsoft.com/office/drawing/2014/main" id="{E816B3EC-23F6-42E4-8F67-EF353FC2D5F9}"/>
+              </a:ext>
+            </a:extLst>
+          </p:cNvPr>
+          <p:cNvSpPr>
+            <a:spLocks noGrp="1"/>
+          </p:cNvSpPr>
+          <p:nvPr>
+            <p:ph type="sldNum" sz="quarter" idx="12"/>
+          </p:nvPr>
+        </p:nvSpPr>
+        <p:spPr>
+          <a:xfrm>
+            <a:off x="9843588" y="6356350"/>
+            <a:ext cx="1865376" cy="365125"/>
+          </a:xfrm>
+        </p:spPr>
+        <p:txBody>
+          <a:bodyPr vert="horz" lIns="91440" tIns="45720" rIns="91440" bIns="45720" rtlCol="0" anchor="ctr">
+            <a:normAutofit/>
+          </a:bodyPr>
+          <a:lstStyle/>
+          <a:p>
+            <a:pPr marR="0" lvl="0" indent="0" fontAlgn="auto">
+              <a:spcBef>
+                <a:spcPts val="0"/>
+              </a:spcBef>
+              <a:spcAft>
+                <a:spcPts val="600"/>
+              </a:spcAft>
+              <a:buClrTx/>
+              <a:buSzTx/>
+              <a:buFontTx/>
+              <a:buNone/>
+              <a:tabLst/>
+              <a:defRPr/>
+            </a:pPr>
+            <a:fld id="{B2DC25EE-239B-4C5F-AAD1-255A7D5F1EE2}" type="slidenum">
+              <a:rPr kumimoji="0" lang="en-US" b="0" i="0" u="none" strike="noStrike" cap="none" spc="0" normalizeH="0" baseline="0" noProof="0">
+                <a:ln>
+                  <a:noFill/>
+                </a:ln>
                 <a:effectLst/>
                 <a:uLnTx/>
                 <a:uFillTx/>
@@ -15981,9 +17521,6 @@
               <a:ln>
                 <a:noFill/>
               </a:ln>
-              <a:solidFill>
-                <a:srgbClr val="FFFFFF"/>
-              </a:solidFill>
               <a:effectLst/>
               <a:uLnTx/>
               <a:uFillTx/>
@@ -15991,6 +17528,78 @@
           </a:p>
         </p:txBody>
       </p:sp>
+      <p:pic>
+        <p:nvPicPr>
+          <p:cNvPr id="16" name="Picture 15" descr="A sword with a long handle&#10;&#10;Description automatically generated with low confidence">
+            <a:extLst>
+              <a:ext uri="{FF2B5EF4-FFF2-40B4-BE49-F238E27FC236}">
+                <a16:creationId xmlns:a16="http://schemas.microsoft.com/office/drawing/2014/main" id="{63C8C322-B479-4AF8-B1D5-C72D2EB45164}"/>
+              </a:ext>
+            </a:extLst>
+          </p:cNvPr>
+          <p:cNvPicPr>
+            <a:picLocks noChangeAspect="1"/>
+          </p:cNvPicPr>
+          <p:nvPr/>
+        </p:nvPicPr>
+        <p:blipFill>
+          <a:blip r:embed="rId6">
+            <a:extLst>
+              <a:ext uri="{28A0092B-C50C-407E-A947-70E740481C1C}">
+                <a14:useLocalDpi xmlns:a14="http://schemas.microsoft.com/office/drawing/2010/main" val="0"/>
+              </a:ext>
+            </a:extLst>
+          </a:blip>
+          <a:stretch>
+            <a:fillRect/>
+          </a:stretch>
+        </p:blipFill>
+        <p:spPr>
+          <a:xfrm>
+            <a:off x="8046448" y="4935445"/>
+            <a:ext cx="2038699" cy="1284380"/>
+          </a:xfrm>
+          <a:prstGeom prst="rect">
+            <a:avLst/>
+          </a:prstGeom>
+        </p:spPr>
+      </p:pic>
+      <p:pic>
+        <p:nvPicPr>
+          <p:cNvPr id="18" name="Picture 17" descr="A picture containing text, indoor&#10;&#10;Description automatically generated">
+            <a:extLst>
+              <a:ext uri="{FF2B5EF4-FFF2-40B4-BE49-F238E27FC236}">
+                <a16:creationId xmlns:a16="http://schemas.microsoft.com/office/drawing/2014/main" id="{8F0C703D-558F-4A16-AC28-74AD569FD58C}"/>
+              </a:ext>
+            </a:extLst>
+          </p:cNvPr>
+          <p:cNvPicPr>
+            <a:picLocks noChangeAspect="1"/>
+          </p:cNvPicPr>
+          <p:nvPr/>
+        </p:nvPicPr>
+        <p:blipFill>
+          <a:blip r:embed="rId7">
+            <a:extLst>
+              <a:ext uri="{28A0092B-C50C-407E-A947-70E740481C1C}">
+                <a14:useLocalDpi xmlns:a14="http://schemas.microsoft.com/office/drawing/2010/main" val="0"/>
+              </a:ext>
+            </a:extLst>
+          </a:blip>
+          <a:stretch>
+            <a:fillRect/>
+          </a:stretch>
+        </p:blipFill>
+        <p:spPr>
+          <a:xfrm>
+            <a:off x="5527539" y="3124697"/>
+            <a:ext cx="2496855" cy="2492929"/>
+          </a:xfrm>
+          <a:prstGeom prst="rect">
+            <a:avLst/>
+          </a:prstGeom>
+        </p:spPr>
+      </p:pic>
     </p:spTree>
     <p:extLst>
       <p:ext uri="{BB962C8B-B14F-4D97-AF65-F5344CB8AC3E}">

</xml_diff>